<commit_message>
Added Supporting Materials for Day 5
</commit_message>
<xml_diff>
--- a/Day 5/Slides/1. JUnit 4/junit4-for-unit-testing-slides.pptx
+++ b/Day 5/Slides/1. JUnit 4/junit4-for-unit-testing-slides.pptx
@@ -5,7 +5,7 @@
     <p:sldMasterId id="2147483648" r:id="rId1"/>
   </p:sldMasterIdLst>
   <p:notesMasterIdLst>
-    <p:notesMasterId r:id="rId33"/>
+    <p:notesMasterId r:id="rId31"/>
   </p:notesMasterIdLst>
   <p:sldIdLst>
     <p:sldId id="258" r:id="rId3"/>
@@ -22,22 +22,20 @@
     <p:sldId id="275" r:id="rId14"/>
     <p:sldId id="270" r:id="rId15"/>
     <p:sldId id="274" r:id="rId16"/>
-    <p:sldId id="276" r:id="rId17"/>
-    <p:sldId id="277" r:id="rId18"/>
-    <p:sldId id="278" r:id="rId19"/>
-    <p:sldId id="271" r:id="rId20"/>
-    <p:sldId id="267" r:id="rId21"/>
-    <p:sldId id="268" r:id="rId22"/>
-    <p:sldId id="284" r:id="rId23"/>
-    <p:sldId id="285" r:id="rId24"/>
-    <p:sldId id="287" r:id="rId25"/>
-    <p:sldId id="286" r:id="rId26"/>
-    <p:sldId id="288" r:id="rId27"/>
-    <p:sldId id="289" r:id="rId28"/>
-    <p:sldId id="290" r:id="rId29"/>
-    <p:sldId id="291" r:id="rId30"/>
-    <p:sldId id="292" r:id="rId31"/>
-    <p:sldId id="295" r:id="rId32"/>
+    <p:sldId id="278" r:id="rId17"/>
+    <p:sldId id="271" r:id="rId18"/>
+    <p:sldId id="267" r:id="rId19"/>
+    <p:sldId id="268" r:id="rId20"/>
+    <p:sldId id="284" r:id="rId21"/>
+    <p:sldId id="285" r:id="rId22"/>
+    <p:sldId id="287" r:id="rId23"/>
+    <p:sldId id="286" r:id="rId24"/>
+    <p:sldId id="288" r:id="rId25"/>
+    <p:sldId id="289" r:id="rId26"/>
+    <p:sldId id="290" r:id="rId27"/>
+    <p:sldId id="291" r:id="rId28"/>
+    <p:sldId id="292" r:id="rId29"/>
+    <p:sldId id="295" r:id="rId30"/>
   </p:sldIdLst>
   <p:sldSz cx="12192000" cy="6858000"/>
   <p:notesSz cx="6858000" cy="9144000"/>
@@ -4417,6 +4415,677 @@
           <a:chExt cx="0" cy="0"/>
         </a:xfrm>
       </p:grpSpPr>
+      <p:sp>
+        <p:nvSpPr>
+          <p:cNvPr id="2" name="Title 1"/>
+          <p:cNvSpPr>
+            <a:spLocks noGrp="1"/>
+          </p:cNvSpPr>
+          <p:nvPr>
+            <p:ph type="ctrTitle"/>
+          </p:nvPr>
+        </p:nvSpPr>
+        <p:spPr>
+          <a:xfrm>
+            <a:off x="1524000" y="249555"/>
+            <a:ext cx="9144000" cy="554990"/>
+          </a:xfrm>
+        </p:spPr>
+        <p:txBody>
+          <a:bodyPr>
+            <a:normAutofit fontScale="90000"/>
+          </a:bodyPr>
+          <a:lstStyle/>
+          <a:p>
+            <a:pPr marL="12700" algn="ctr">
+              <a:lnSpc>
+                <a:spcPct val="100000"/>
+              </a:lnSpc>
+              <a:spcBef>
+                <a:spcPts val="100"/>
+              </a:spcBef>
+              <a:buClrTx/>
+              <a:buSzTx/>
+              <a:buFontTx/>
+            </a:pPr>
+            <a:r>
+              <a:rPr sz="3600" kern="0" spc="35" dirty="0">
+                <a:solidFill>
+                  <a:srgbClr val="404040"/>
+                </a:solidFill>
+                <a:latin typeface="Verdana" panose="020B0604030504040204"/>
+                <a:cs typeface="Verdana" panose="020B0604030504040204"/>
+              </a:rPr>
+              <a:t>Test </a:t>
+            </a:r>
+            <a:r>
+              <a:rPr lang="en-US" sz="3600" kern="0" spc="35" dirty="0">
+                <a:solidFill>
+                  <a:srgbClr val="404040"/>
+                </a:solidFill>
+                <a:latin typeface="Verdana" panose="020B0604030504040204"/>
+                <a:cs typeface="Verdana" panose="020B0604030504040204"/>
+              </a:rPr>
+              <a:t>Suites</a:t>
+            </a:r>
+            <a:endParaRPr lang="en-US" sz="3600" kern="0" spc="35" dirty="0">
+              <a:solidFill>
+                <a:srgbClr val="404040"/>
+              </a:solidFill>
+              <a:latin typeface="Verdana" panose="020B0604030504040204"/>
+              <a:cs typeface="Verdana" panose="020B0604030504040204"/>
+            </a:endParaRPr>
+          </a:p>
+        </p:txBody>
+      </p:sp>
+      <p:sp>
+        <p:nvSpPr>
+          <p:cNvPr id="4" name="Slide Number Placeholder 3"/>
+          <p:cNvSpPr>
+            <a:spLocks noGrp="1"/>
+          </p:cNvSpPr>
+          <p:nvPr>
+            <p:ph type="sldNum" sz="quarter" idx="12"/>
+          </p:nvPr>
+        </p:nvSpPr>
+        <p:spPr/>
+        <p:txBody>
+          <a:bodyPr/>
+          <a:p>
+            <a:fld id="{9B618960-8005-486C-9A75-10CB2AAC16F9}" type="slidenum">
+              <a:rPr lang="en-US" smtClean="0"/>
+            </a:fld>
+            <a:endParaRPr lang="en-US"/>
+          </a:p>
+        </p:txBody>
+      </p:sp>
+      <p:graphicFrame>
+        <p:nvGraphicFramePr>
+          <p:cNvPr id="5" name="Object 4"/>
+          <p:cNvGraphicFramePr/>
+          <p:nvPr/>
+        </p:nvGraphicFramePr>
+        <p:xfrm>
+          <a:off x="2853690" y="1170305"/>
+          <a:ext cx="6941185" cy="4819650"/>
+        </p:xfrm>
+        <a:graphic>
+          <a:graphicData uri="http://schemas.openxmlformats.org/presentationml/2006/ole">
+            <mc:AlternateContent xmlns:mc="http://schemas.openxmlformats.org/markup-compatibility/2006">
+              <mc:Choice xmlns:v="urn:schemas-microsoft-com:vml" Requires="v">
+                <p:oleObj spid="_x0000_s6" name="" r:id="rId1" imgW="5191125" imgH="3781425" progId="Paint.Picture">
+                  <p:embed/>
+                </p:oleObj>
+              </mc:Choice>
+              <mc:Fallback>
+                <p:oleObj name="" r:id="rId1" imgW="5191125" imgH="3781425" progId="Paint.Picture">
+                  <p:embed/>
+                  <p:pic>
+                    <p:nvPicPr>
+                      <p:cNvPr id="0" name="Picture 5"/>
+                      <p:cNvPicPr/>
+                      <p:nvPr/>
+                    </p:nvPicPr>
+                    <p:blipFill>
+                      <a:blip r:embed="rId2"/>
+                      <a:stretch>
+                        <a:fillRect/>
+                      </a:stretch>
+                    </p:blipFill>
+                    <p:spPr>
+                      <a:xfrm>
+                        <a:off x="2853690" y="1170305"/>
+                        <a:ext cx="6941185" cy="4819650"/>
+                      </a:xfrm>
+                      <a:prstGeom prst="rect">
+                        <a:avLst/>
+                      </a:prstGeom>
+                    </p:spPr>
+                  </p:pic>
+                </p:oleObj>
+              </mc:Fallback>
+            </mc:AlternateContent>
+          </a:graphicData>
+        </a:graphic>
+      </p:graphicFrame>
+    </p:spTree>
+  </p:cSld>
+  <p:clrMapOvr>
+    <a:masterClrMapping/>
+  </p:clrMapOvr>
+</p:sld>
+</file>
+
+<file path=ppt/slides/slide17.xml><?xml version="1.0" encoding="utf-8"?>
+<p:sld xmlns:a="http://schemas.openxmlformats.org/drawingml/2006/main" xmlns:r="http://schemas.openxmlformats.org/officeDocument/2006/relationships" xmlns:p="http://schemas.openxmlformats.org/presentationml/2006/main">
+  <p:cSld>
+    <p:spTree>
+      <p:nvGrpSpPr>
+        <p:cNvPr id="1" name=""/>
+        <p:cNvGrpSpPr/>
+        <p:nvPr/>
+      </p:nvGrpSpPr>
+      <p:grpSpPr>
+        <a:xfrm>
+          <a:off x="0" y="0"/>
+          <a:ext cx="0" cy="0"/>
+          <a:chOff x="0" y="0"/>
+          <a:chExt cx="0" cy="0"/>
+        </a:xfrm>
+      </p:grpSpPr>
+      <p:sp>
+        <p:nvSpPr>
+          <p:cNvPr id="2" name="Title 1"/>
+          <p:cNvSpPr>
+            <a:spLocks noGrp="1"/>
+          </p:cNvSpPr>
+          <p:nvPr>
+            <p:ph type="ctrTitle"/>
+          </p:nvPr>
+        </p:nvSpPr>
+        <p:spPr>
+          <a:xfrm>
+            <a:off x="1524000" y="249555"/>
+            <a:ext cx="9144000" cy="554990"/>
+          </a:xfrm>
+        </p:spPr>
+        <p:txBody>
+          <a:bodyPr>
+            <a:normAutofit fontScale="90000"/>
+          </a:bodyPr>
+          <a:lstStyle/>
+          <a:p>
+            <a:pPr marL="12700" algn="ctr">
+              <a:lnSpc>
+                <a:spcPct val="100000"/>
+              </a:lnSpc>
+              <a:spcBef>
+                <a:spcPts val="100"/>
+              </a:spcBef>
+              <a:buClrTx/>
+              <a:buSzTx/>
+              <a:buFontTx/>
+            </a:pPr>
+            <a:r>
+              <a:rPr sz="3600" kern="0" spc="35" dirty="0">
+                <a:solidFill>
+                  <a:srgbClr val="404040"/>
+                </a:solidFill>
+                <a:latin typeface="Verdana" panose="020B0604030504040204"/>
+                <a:cs typeface="Verdana" panose="020B0604030504040204"/>
+              </a:rPr>
+              <a:t>What Is a Parameterized Test?</a:t>
+            </a:r>
+            <a:endParaRPr sz="3600" kern="0" spc="35" dirty="0">
+              <a:solidFill>
+                <a:srgbClr val="404040"/>
+              </a:solidFill>
+              <a:latin typeface="Verdana" panose="020B0604030504040204"/>
+              <a:cs typeface="Verdana" panose="020B0604030504040204"/>
+            </a:endParaRPr>
+          </a:p>
+        </p:txBody>
+      </p:sp>
+      <p:sp>
+        <p:nvSpPr>
+          <p:cNvPr id="4" name="Slide Number Placeholder 3"/>
+          <p:cNvSpPr>
+            <a:spLocks noGrp="1"/>
+          </p:cNvSpPr>
+          <p:nvPr>
+            <p:ph type="sldNum" sz="quarter" idx="12"/>
+          </p:nvPr>
+        </p:nvSpPr>
+        <p:spPr/>
+        <p:txBody>
+          <a:bodyPr/>
+          <a:p>
+            <a:fld id="{9B618960-8005-486C-9A75-10CB2AAC16F9}" type="slidenum">
+              <a:rPr lang="en-US" smtClean="0"/>
+            </a:fld>
+            <a:endParaRPr lang="en-US"/>
+          </a:p>
+        </p:txBody>
+      </p:sp>
+      <p:sp>
+        <p:nvSpPr>
+          <p:cNvPr id="19" name="object 3"/>
+          <p:cNvSpPr txBox="1"/>
+          <p:nvPr/>
+        </p:nvSpPr>
+        <p:spPr>
+          <a:xfrm>
+            <a:off x="2266950" y="928370"/>
+            <a:ext cx="9351645" cy="5729605"/>
+          </a:xfrm>
+          <a:prstGeom prst="rect">
+            <a:avLst/>
+          </a:prstGeom>
+        </p:spPr>
+        <p:txBody>
+          <a:bodyPr vert="horz" wrap="square" lIns="0" tIns="12700" rIns="0" bIns="0" rtlCol="0">
+            <a:spAutoFit/>
+          </a:bodyPr>
+          <a:p>
+            <a:pPr marL="12700" marR="5080" algn="l">
+              <a:lnSpc>
+                <a:spcPct val="163000"/>
+              </a:lnSpc>
+              <a:buClrTx/>
+              <a:buSzTx/>
+              <a:buFontTx/>
+            </a:pPr>
+            <a:r>
+              <a:rPr lang="en-US" sz="2400" dirty="0">
+                <a:solidFill>
+                  <a:srgbClr val="EF5A28"/>
+                </a:solidFill>
+                <a:latin typeface="Verdana" panose="020B0604030504040204"/>
+                <a:cs typeface="Verdana" panose="020B0604030504040204"/>
+              </a:rPr>
+              <a:t>W</a:t>
+            </a:r>
+            <a:r>
+              <a:rPr sz="2400" dirty="0">
+                <a:solidFill>
+                  <a:srgbClr val="EF5A28"/>
+                </a:solidFill>
+                <a:latin typeface="Verdana" panose="020B0604030504040204"/>
+                <a:cs typeface="Verdana" panose="020B0604030504040204"/>
+              </a:rPr>
+              <a:t>hen it fullfills all the following requirements:</a:t>
+            </a:r>
+            <a:r>
+              <a:rPr lang="en-US" sz="1800" spc="40" dirty="0">
+                <a:solidFill>
+                  <a:srgbClr val="EF5A28"/>
+                </a:solidFill>
+                <a:latin typeface="Verdana" panose="020B0604030504040204"/>
+                <a:cs typeface="Verdana" panose="020B0604030504040204"/>
+              </a:rPr>
+              <a:t>	</a:t>
+            </a:r>
+            <a:endParaRPr lang="en-US" sz="1800" spc="40" dirty="0">
+              <a:solidFill>
+                <a:srgbClr val="EF5A28"/>
+              </a:solidFill>
+              <a:latin typeface="Verdana" panose="020B0604030504040204"/>
+              <a:cs typeface="Verdana" panose="020B0604030504040204"/>
+            </a:endParaRPr>
+          </a:p>
+          <a:p>
+            <a:pPr marL="12700" marR="5080" algn="l">
+              <a:lnSpc>
+                <a:spcPct val="163000"/>
+              </a:lnSpc>
+              <a:buClrTx/>
+              <a:buSzTx/>
+              <a:buFontTx/>
+            </a:pPr>
+            <a:endParaRPr lang="en-US" sz="1800" spc="40" dirty="0">
+              <a:solidFill>
+                <a:srgbClr val="EF5A28"/>
+              </a:solidFill>
+              <a:latin typeface="Verdana" panose="020B0604030504040204"/>
+              <a:cs typeface="Verdana" panose="020B0604030504040204"/>
+            </a:endParaRPr>
+          </a:p>
+          <a:p>
+            <a:pPr marL="12700" marR="5080" algn="l">
+              <a:lnSpc>
+                <a:spcPct val="163000"/>
+              </a:lnSpc>
+              <a:buClrTx/>
+              <a:buSzTx/>
+              <a:buFontTx/>
+            </a:pPr>
+            <a:r>
+              <a:rPr lang="en-US" sz="1800" spc="40" dirty="0">
+                <a:solidFill>
+                  <a:srgbClr val="EF5A28"/>
+                </a:solidFill>
+                <a:latin typeface="Verdana" panose="020B0604030504040204"/>
+                <a:cs typeface="Verdana" panose="020B0604030504040204"/>
+              </a:rPr>
+              <a:t>	- The class is annotated with @RunWith(Parameterized.class).</a:t>
+            </a:r>
+            <a:endParaRPr lang="en-US" sz="1800" spc="40" dirty="0">
+              <a:solidFill>
+                <a:srgbClr val="EF5A28"/>
+              </a:solidFill>
+              <a:latin typeface="Verdana" panose="020B0604030504040204"/>
+              <a:cs typeface="Verdana" panose="020B0604030504040204"/>
+            </a:endParaRPr>
+          </a:p>
+          <a:p>
+            <a:pPr marL="12700" marR="5080" algn="l">
+              <a:lnSpc>
+                <a:spcPct val="163000"/>
+              </a:lnSpc>
+              <a:buClrTx/>
+              <a:buSzTx/>
+              <a:buFontTx/>
+            </a:pPr>
+            <a:endParaRPr lang="en-US" sz="1800" spc="40" dirty="0">
+              <a:solidFill>
+                <a:srgbClr val="EF5A28"/>
+              </a:solidFill>
+              <a:latin typeface="Verdana" panose="020B0604030504040204"/>
+              <a:cs typeface="Verdana" panose="020B0604030504040204"/>
+            </a:endParaRPr>
+          </a:p>
+          <a:p>
+            <a:pPr marL="12700" marR="5080" algn="l">
+              <a:lnSpc>
+                <a:spcPct val="163000"/>
+              </a:lnSpc>
+              <a:buClrTx/>
+              <a:buSzTx/>
+              <a:buFontTx/>
+            </a:pPr>
+            <a:r>
+              <a:rPr lang="en-US" sz="1800" spc="40" dirty="0">
+                <a:solidFill>
+                  <a:srgbClr val="EF5A28"/>
+                </a:solidFill>
+                <a:latin typeface="Verdana" panose="020B0604030504040204"/>
+                <a:cs typeface="Verdana" panose="020B0604030504040204"/>
+              </a:rPr>
+              <a:t>	- The class has a single constructor that stores the test data</a:t>
+            </a:r>
+            <a:endParaRPr lang="en-US" sz="1800" spc="40" dirty="0">
+              <a:solidFill>
+                <a:srgbClr val="EF5A28"/>
+              </a:solidFill>
+              <a:latin typeface="Verdana" panose="020B0604030504040204"/>
+              <a:cs typeface="Verdana" panose="020B0604030504040204"/>
+            </a:endParaRPr>
+          </a:p>
+          <a:p>
+            <a:pPr marL="12700" marR="5080" algn="l">
+              <a:lnSpc>
+                <a:spcPct val="163000"/>
+              </a:lnSpc>
+              <a:buClrTx/>
+              <a:buSzTx/>
+              <a:buFontTx/>
+            </a:pPr>
+            <a:endParaRPr lang="en-US" sz="1800" spc="40" dirty="0">
+              <a:solidFill>
+                <a:srgbClr val="EF5A28"/>
+              </a:solidFill>
+              <a:latin typeface="Verdana" panose="020B0604030504040204"/>
+              <a:cs typeface="Verdana" panose="020B0604030504040204"/>
+            </a:endParaRPr>
+          </a:p>
+          <a:p>
+            <a:pPr marL="12700" marR="5080" algn="l">
+              <a:lnSpc>
+                <a:spcPct val="163000"/>
+              </a:lnSpc>
+              <a:buClrTx/>
+              <a:buSzTx/>
+              <a:buFontTx/>
+            </a:pPr>
+            <a:r>
+              <a:rPr sz="2400" dirty="0">
+                <a:solidFill>
+                  <a:srgbClr val="EF5A28"/>
+                </a:solidFill>
+                <a:latin typeface="Verdana" panose="020B0604030504040204"/>
+                <a:cs typeface="Verdana" panose="020B0604030504040204"/>
+              </a:rPr>
+              <a:t>	</a:t>
+            </a:r>
+            <a:r>
+              <a:rPr lang="en-US" sz="2400" dirty="0">
+                <a:solidFill>
+                  <a:srgbClr val="EF5A28"/>
+                </a:solidFill>
+                <a:latin typeface="Verdana" panose="020B0604030504040204"/>
+                <a:cs typeface="Verdana" panose="020B0604030504040204"/>
+              </a:rPr>
+              <a:t>- </a:t>
+            </a:r>
+            <a:r>
+              <a:rPr lang="en-US" sz="1800" spc="40" dirty="0">
+                <a:solidFill>
+                  <a:srgbClr val="EF5A28"/>
+                </a:solidFill>
+                <a:latin typeface="Verdana" panose="020B0604030504040204"/>
+                <a:cs typeface="Verdana" panose="020B0604030504040204"/>
+              </a:rPr>
+              <a:t>The class has a static method that generates and returns test data   	   and is annotated with the @Parameters annotation.</a:t>
+            </a:r>
+            <a:endParaRPr lang="en-US" sz="1800" spc="40" dirty="0">
+              <a:solidFill>
+                <a:srgbClr val="EF5A28"/>
+              </a:solidFill>
+              <a:latin typeface="Verdana" panose="020B0604030504040204"/>
+              <a:cs typeface="Verdana" panose="020B0604030504040204"/>
+            </a:endParaRPr>
+          </a:p>
+          <a:p>
+            <a:pPr marL="12700" marR="5080" algn="l">
+              <a:lnSpc>
+                <a:spcPct val="163000"/>
+              </a:lnSpc>
+              <a:buClrTx/>
+              <a:buSzTx/>
+              <a:buFontTx/>
+            </a:pPr>
+            <a:endParaRPr lang="en-US" sz="1800" spc="40" dirty="0">
+              <a:solidFill>
+                <a:srgbClr val="EF5A28"/>
+              </a:solidFill>
+              <a:latin typeface="Verdana" panose="020B0604030504040204"/>
+              <a:cs typeface="Verdana" panose="020B0604030504040204"/>
+            </a:endParaRPr>
+          </a:p>
+          <a:p>
+            <a:pPr marL="12700" marR="5080" algn="l">
+              <a:lnSpc>
+                <a:spcPct val="163000"/>
+              </a:lnSpc>
+              <a:buClrTx/>
+              <a:buSzTx/>
+              <a:buFontTx/>
+            </a:pPr>
+            <a:r>
+              <a:rPr lang="en-US" sz="1800" spc="40" dirty="0">
+                <a:solidFill>
+                  <a:srgbClr val="EF5A28"/>
+                </a:solidFill>
+                <a:latin typeface="Verdana" panose="020B0604030504040204"/>
+                <a:cs typeface="Verdana" panose="020B0604030504040204"/>
+              </a:rPr>
+              <a:t>	- The class has a test, which obviously means that it needs a method          	   annotated with the @Test annotation.</a:t>
+            </a:r>
+            <a:endParaRPr lang="en-US" sz="1800" spc="40" dirty="0">
+              <a:solidFill>
+                <a:srgbClr val="EF5A28"/>
+              </a:solidFill>
+              <a:latin typeface="Verdana" panose="020B0604030504040204"/>
+              <a:cs typeface="Verdana" panose="020B0604030504040204"/>
+            </a:endParaRPr>
+          </a:p>
+          <a:p>
+            <a:pPr marL="12700" marR="5080" algn="l">
+              <a:lnSpc>
+                <a:spcPct val="163000"/>
+              </a:lnSpc>
+              <a:buClrTx/>
+              <a:buSzTx/>
+              <a:buFontTx/>
+            </a:pPr>
+            <a:r>
+              <a:rPr lang="en-US" sz="1800" spc="40" dirty="0">
+                <a:solidFill>
+                  <a:srgbClr val="EF5A28"/>
+                </a:solidFill>
+                <a:latin typeface="Verdana" panose="020B0604030504040204"/>
+                <a:cs typeface="Verdana" panose="020B0604030504040204"/>
+              </a:rPr>
+              <a:t>	</a:t>
+            </a:r>
+            <a:endParaRPr sz="2400" dirty="0">
+              <a:solidFill>
+                <a:srgbClr val="EF5A28"/>
+              </a:solidFill>
+              <a:latin typeface="Verdana" panose="020B0604030504040204"/>
+              <a:cs typeface="Verdana" panose="020B0604030504040204"/>
+            </a:endParaRPr>
+          </a:p>
+        </p:txBody>
+      </p:sp>
+    </p:spTree>
+  </p:cSld>
+  <p:clrMapOvr>
+    <a:masterClrMapping/>
+  </p:clrMapOvr>
+</p:sld>
+</file>
+
+<file path=ppt/slides/slide18.xml><?xml version="1.0" encoding="utf-8"?>
+<p:sld xmlns:a="http://schemas.openxmlformats.org/drawingml/2006/main" xmlns:r="http://schemas.openxmlformats.org/officeDocument/2006/relationships" xmlns:p="http://schemas.openxmlformats.org/presentationml/2006/main">
+  <p:cSld>
+    <p:spTree>
+      <p:nvGrpSpPr>
+        <p:cNvPr id="1" name=""/>
+        <p:cNvGrpSpPr/>
+        <p:nvPr/>
+      </p:nvGrpSpPr>
+      <p:grpSpPr>
+        <a:xfrm>
+          <a:off x="0" y="0"/>
+          <a:ext cx="0" cy="0"/>
+          <a:chOff x="0" y="0"/>
+          <a:chExt cx="0" cy="0"/>
+        </a:xfrm>
+      </p:grpSpPr>
+      <p:sp>
+        <p:nvSpPr>
+          <p:cNvPr id="2" name="Title 1"/>
+          <p:cNvSpPr>
+            <a:spLocks noGrp="1"/>
+          </p:cNvSpPr>
+          <p:nvPr>
+            <p:ph type="ctrTitle"/>
+          </p:nvPr>
+        </p:nvSpPr>
+        <p:spPr>
+          <a:xfrm>
+            <a:off x="1524000" y="249555"/>
+            <a:ext cx="9144000" cy="554990"/>
+          </a:xfrm>
+        </p:spPr>
+        <p:txBody>
+          <a:bodyPr>
+            <a:normAutofit fontScale="90000"/>
+          </a:bodyPr>
+          <a:lstStyle/>
+          <a:p>
+            <a:pPr marL="12700" algn="ctr">
+              <a:lnSpc>
+                <a:spcPct val="100000"/>
+              </a:lnSpc>
+              <a:spcBef>
+                <a:spcPts val="100"/>
+              </a:spcBef>
+              <a:buClrTx/>
+              <a:buSzTx/>
+              <a:buFontTx/>
+            </a:pPr>
+            <a:r>
+              <a:rPr lang="en-US" sz="3600" kern="0" spc="35" dirty="0">
+                <a:solidFill>
+                  <a:srgbClr val="404040"/>
+                </a:solidFill>
+                <a:latin typeface="Verdana" panose="020B0604030504040204"/>
+                <a:cs typeface="Verdana" panose="020B0604030504040204"/>
+              </a:rPr>
+              <a:t>Rules</a:t>
+            </a:r>
+            <a:endParaRPr lang="en-US" sz="3600" kern="0" spc="35" dirty="0">
+              <a:solidFill>
+                <a:srgbClr val="404040"/>
+              </a:solidFill>
+              <a:latin typeface="Verdana" panose="020B0604030504040204"/>
+              <a:cs typeface="Verdana" panose="020B0604030504040204"/>
+            </a:endParaRPr>
+          </a:p>
+        </p:txBody>
+      </p:sp>
+      <p:sp>
+        <p:nvSpPr>
+          <p:cNvPr id="4" name="Slide Number Placeholder 3"/>
+          <p:cNvSpPr>
+            <a:spLocks noGrp="1"/>
+          </p:cNvSpPr>
+          <p:nvPr>
+            <p:ph type="sldNum" sz="quarter" idx="12"/>
+          </p:nvPr>
+        </p:nvSpPr>
+        <p:spPr/>
+        <p:txBody>
+          <a:bodyPr/>
+          <a:p>
+            <a:fld id="{9B618960-8005-486C-9A75-10CB2AAC16F9}" type="slidenum">
+              <a:rPr lang="en-US" smtClean="0"/>
+            </a:fld>
+            <a:endParaRPr lang="en-US"/>
+          </a:p>
+        </p:txBody>
+      </p:sp>
+      <p:pic>
+        <p:nvPicPr>
+          <p:cNvPr id="5" name="Picture 4"/>
+          <p:cNvPicPr>
+            <a:picLocks noChangeAspect="1"/>
+          </p:cNvPicPr>
+          <p:nvPr/>
+        </p:nvPicPr>
+        <p:blipFill>
+          <a:blip r:embed="rId1"/>
+          <a:stretch>
+            <a:fillRect/>
+          </a:stretch>
+        </p:blipFill>
+        <p:spPr>
+          <a:xfrm>
+            <a:off x="3718560" y="806450"/>
+            <a:ext cx="5857240" cy="5815330"/>
+          </a:xfrm>
+          <a:prstGeom prst="rect">
+            <a:avLst/>
+          </a:prstGeom>
+        </p:spPr>
+      </p:pic>
+    </p:spTree>
+  </p:cSld>
+  <p:clrMapOvr>
+    <a:masterClrMapping/>
+  </p:clrMapOvr>
+</p:sld>
+</file>
+
+<file path=ppt/slides/slide19.xml><?xml version="1.0" encoding="utf-8"?>
+<p:sld xmlns:a="http://schemas.openxmlformats.org/drawingml/2006/main" xmlns:r="http://schemas.openxmlformats.org/officeDocument/2006/relationships" xmlns:p="http://schemas.openxmlformats.org/presentationml/2006/main">
+  <p:cSld>
+    <p:spTree>
+      <p:nvGrpSpPr>
+        <p:cNvPr id="1" name=""/>
+        <p:cNvGrpSpPr/>
+        <p:nvPr/>
+      </p:nvGrpSpPr>
+      <p:grpSpPr>
+        <a:xfrm>
+          <a:off x="0" y="0"/>
+          <a:ext cx="0" cy="0"/>
+          <a:chOff x="0" y="0"/>
+          <a:chExt cx="0" cy="0"/>
+        </a:xfrm>
+      </p:grpSpPr>
       <p:grpSp>
         <p:nvGrpSpPr>
           <p:cNvPr id="2" name="object 2"/>
@@ -4508,7 +5177,12 @@
             <p:ph type="sldNum" sz="quarter" idx="7"/>
           </p:nvPr>
         </p:nvSpPr>
-        <p:spPr/>
+        <p:spPr>
+          <a:xfrm>
+            <a:off x="8610600" y="4847590"/>
+            <a:ext cx="2743200" cy="365125"/>
+          </a:xfrm>
+        </p:spPr>
         <p:txBody>
           <a:bodyPr/>
           <a:p>
@@ -4527,7 +5201,7 @@
         </p:nvSpPr>
         <p:spPr>
           <a:xfrm>
-            <a:off x="5024755" y="2905125"/>
+            <a:off x="4756785" y="887095"/>
             <a:ext cx="6628765" cy="592455"/>
           </a:xfrm>
           <a:prstGeom prst="rect">
@@ -4549,26 +5223,15 @@
               <a:buFontTx/>
             </a:pPr>
             <a:r>
-              <a:rPr lang="en-US" sz="2000" dirty="0">
-                <a:solidFill>
-                  <a:srgbClr val="EF5A28"/>
+              <a:rPr lang="en-US" sz="2000" b="1" spc="40" dirty="0">
+                <a:solidFill>
+                  <a:srgbClr val="00B0F0"/>
                 </a:solidFill>
                 <a:latin typeface="Verdana" panose="020B0604030504040204"/>
                 <a:cs typeface="Verdana" panose="020B0604030504040204"/>
                 <a:sym typeface="+mn-ea"/>
               </a:rPr>
-              <a:t> </a:t>
-            </a:r>
-            <a:r>
-              <a:rPr lang="en-US" sz="2000" b="1" spc="40" dirty="0">
-                <a:solidFill>
-                  <a:srgbClr val="00B0F0"/>
-                </a:solidFill>
-                <a:latin typeface="Verdana" panose="020B0604030504040204"/>
-                <a:cs typeface="Verdana" panose="020B0604030504040204"/>
-                <a:sym typeface="+mn-ea"/>
-              </a:rPr>
-              <a:t>Using @Ignore annotation </a:t>
+              <a:t>TestName Rule</a:t>
             </a:r>
             <a:endParaRPr lang="en-US" sz="2000" b="1" spc="40" dirty="0">
               <a:solidFill>
@@ -4581,143 +5244,16 @@
           </a:p>
         </p:txBody>
       </p:sp>
-    </p:spTree>
-  </p:cSld>
-  <p:clrMapOvr>
-    <a:masterClrMapping/>
-  </p:clrMapOvr>
-</p:sld>
-</file>
-
-<file path=ppt/slides/slide17.xml><?xml version="1.0" encoding="utf-8"?>
-<p:sld xmlns:a="http://schemas.openxmlformats.org/drawingml/2006/main" xmlns:r="http://schemas.openxmlformats.org/officeDocument/2006/relationships" xmlns:p="http://schemas.openxmlformats.org/presentationml/2006/main">
-  <p:cSld>
-    <p:spTree>
-      <p:nvGrpSpPr>
-        <p:cNvPr id="1" name=""/>
-        <p:cNvGrpSpPr/>
-        <p:nvPr/>
-      </p:nvGrpSpPr>
-      <p:grpSpPr>
-        <a:xfrm>
-          <a:off x="0" y="0"/>
-          <a:ext cx="0" cy="0"/>
-          <a:chOff x="0" y="0"/>
-          <a:chExt cx="0" cy="0"/>
-        </a:xfrm>
-      </p:grpSpPr>
-      <p:grpSp>
-        <p:nvGrpSpPr>
-          <p:cNvPr id="2" name="object 2"/>
-          <p:cNvGrpSpPr/>
-          <p:nvPr/>
-        </p:nvGrpSpPr>
-        <p:grpSpPr>
-          <a:xfrm>
-            <a:off x="0" y="0"/>
-            <a:ext cx="4636135" cy="6858000"/>
-            <a:chOff x="0" y="0"/>
-            <a:chExt cx="4636135" cy="6858000"/>
-          </a:xfrm>
-        </p:grpSpPr>
-        <p:pic>
-          <p:nvPicPr>
-            <p:cNvPr id="3" name="object 3"/>
-            <p:cNvPicPr/>
-            <p:nvPr/>
-          </p:nvPicPr>
-          <p:blipFill>
-            <a:blip r:embed="rId1" cstate="print"/>
-            <a:stretch>
-              <a:fillRect/>
-            </a:stretch>
-          </p:blipFill>
-          <p:spPr>
-            <a:xfrm>
-              <a:off x="0" y="0"/>
-              <a:ext cx="4636008" cy="6858000"/>
-            </a:xfrm>
-            <a:prstGeom prst="rect">
-              <a:avLst/>
-            </a:prstGeom>
-          </p:spPr>
-        </p:pic>
-        <p:pic>
-          <p:nvPicPr>
-            <p:cNvPr id="4" name="object 4"/>
-            <p:cNvPicPr/>
-            <p:nvPr/>
-          </p:nvPicPr>
-          <p:blipFill>
-            <a:blip r:embed="rId2" cstate="print"/>
-            <a:stretch>
-              <a:fillRect/>
-            </a:stretch>
-          </p:blipFill>
-          <p:spPr>
-            <a:xfrm>
-              <a:off x="1639189" y="1948560"/>
-              <a:ext cx="1689735" cy="548639"/>
-            </a:xfrm>
-            <a:prstGeom prst="rect">
-              <a:avLst/>
-            </a:prstGeom>
-          </p:spPr>
-        </p:pic>
-        <p:pic>
-          <p:nvPicPr>
-            <p:cNvPr id="5" name="object 5"/>
-            <p:cNvPicPr/>
-            <p:nvPr/>
-          </p:nvPicPr>
-          <p:blipFill>
-            <a:blip r:embed="rId3" cstate="print"/>
-            <a:stretch>
-              <a:fillRect/>
-            </a:stretch>
-          </p:blipFill>
-          <p:spPr>
-            <a:xfrm>
-              <a:off x="0" y="45719"/>
-              <a:ext cx="48463" cy="640333"/>
-            </a:xfrm>
-            <a:prstGeom prst="rect">
-              <a:avLst/>
-            </a:prstGeom>
-          </p:spPr>
-        </p:pic>
-      </p:grpSp>
-      <p:sp>
-        <p:nvSpPr>
-          <p:cNvPr id="9" name="Slide Number Placeholder 8"/>
-          <p:cNvSpPr>
-            <a:spLocks noGrp="1"/>
-          </p:cNvSpPr>
-          <p:nvPr>
-            <p:ph type="sldNum" sz="quarter" idx="7"/>
-          </p:nvPr>
-        </p:nvSpPr>
-        <p:spPr/>
-        <p:txBody>
-          <a:bodyPr/>
-          <a:p>
-            <a:fld id="{B6F15528-21DE-4FAA-801E-634DDDAF4B2B}" type="slidenum">
-              <a:rPr/>
-            </a:fld>
-            <a:endParaRPr/>
-          </a:p>
-        </p:txBody>
-      </p:sp>
-      <p:sp>
-        <p:nvSpPr>
-          <p:cNvPr id="10" name="Text Box 9"/>
+      <p:sp>
+        <p:nvSpPr>
+          <p:cNvPr id="6" name="Text Box 5"/>
           <p:cNvSpPr txBox="1"/>
           <p:nvPr/>
         </p:nvSpPr>
         <p:spPr>
           <a:xfrm>
-            <a:off x="5024755" y="2905125"/>
-            <a:ext cx="6628765" cy="592455"/>
+            <a:off x="4756785" y="1537335"/>
+            <a:ext cx="7555230" cy="592455"/>
           </a:xfrm>
           <a:prstGeom prst="rect">
             <a:avLst/>
@@ -4729,7 +5265,7 @@
             <a:spAutoFit/>
           </a:bodyPr>
           <a:p>
-            <a:pPr marL="12700" marR="5080" algn="l">
+            <a:pPr marL="12700" marR="5080" lvl="0" algn="l">
               <a:lnSpc>
                 <a:spcPct val="163000"/>
               </a:lnSpc>
@@ -4738,15 +5274,15 @@
               <a:buFontTx/>
             </a:pPr>
             <a:r>
-              <a:rPr lang="en-US" sz="2000" dirty="0">
-                <a:solidFill>
-                  <a:srgbClr val="EF5A28"/>
+              <a:rPr lang="en-US" sz="2000" b="1" spc="40" dirty="0">
+                <a:solidFill>
+                  <a:srgbClr val="00B0F0"/>
                 </a:solidFill>
                 <a:latin typeface="Verdana" panose="020B0604030504040204"/>
                 <a:cs typeface="Verdana" panose="020B0604030504040204"/>
                 <a:sym typeface="+mn-ea"/>
               </a:rPr>
-              <a:t> </a:t>
+              <a:t>TemporaryFolder Rule - </a:t>
             </a:r>
             <a:r>
               <a:rPr lang="en-US" sz="2000" b="1" spc="40" dirty="0">
@@ -4757,7 +5293,18 @@
                 <a:cs typeface="Verdana" panose="020B0604030504040204"/>
                 <a:sym typeface="+mn-ea"/>
               </a:rPr>
-              <a:t>Using @Ignore annotation </a:t>
+              <a:t>How a JUnit Rule Works</a:t>
+            </a:r>
+            <a:r>
+              <a:rPr lang="en-US" sz="2000" b="1" spc="40" dirty="0">
+                <a:solidFill>
+                  <a:srgbClr val="00B0F0"/>
+                </a:solidFill>
+                <a:latin typeface="Verdana" panose="020B0604030504040204"/>
+                <a:cs typeface="Verdana" panose="020B0604030504040204"/>
+                <a:sym typeface="+mn-ea"/>
+              </a:rPr>
+              <a:t> </a:t>
             </a:r>
             <a:endParaRPr lang="en-US" sz="2000" b="1" spc="40" dirty="0">
               <a:solidFill>
@@ -4770,87 +5317,86 @@
           </a:p>
         </p:txBody>
       </p:sp>
-    </p:spTree>
-  </p:cSld>
-  <p:clrMapOvr>
-    <a:masterClrMapping/>
-  </p:clrMapOvr>
-</p:sld>
-</file>
-
-<file path=ppt/slides/slide18.xml><?xml version="1.0" encoding="utf-8"?>
-<p:sld xmlns:a="http://schemas.openxmlformats.org/drawingml/2006/main" xmlns:r="http://schemas.openxmlformats.org/officeDocument/2006/relationships" xmlns:p="http://schemas.openxmlformats.org/presentationml/2006/main">
-  <p:cSld>
-    <p:spTree>
-      <p:nvGrpSpPr>
-        <p:cNvPr id="1" name=""/>
-        <p:cNvGrpSpPr/>
-        <p:nvPr/>
-      </p:nvGrpSpPr>
-      <p:grpSpPr>
-        <a:xfrm>
-          <a:off x="0" y="0"/>
-          <a:ext cx="0" cy="0"/>
-          <a:chOff x="0" y="0"/>
-          <a:chExt cx="0" cy="0"/>
-        </a:xfrm>
-      </p:grpSpPr>
-      <p:sp>
-        <p:nvSpPr>
-          <p:cNvPr id="2" name="Title 1"/>
-          <p:cNvSpPr>
-            <a:spLocks noGrp="1"/>
-          </p:cNvSpPr>
-          <p:nvPr>
-            <p:ph type="ctrTitle"/>
-          </p:nvPr>
+      <p:sp>
+        <p:nvSpPr>
+          <p:cNvPr id="7" name="Text Box 6"/>
+          <p:cNvSpPr txBox="1"/>
+          <p:nvPr/>
         </p:nvSpPr>
         <p:spPr>
           <a:xfrm>
-            <a:off x="1524000" y="249555"/>
-            <a:ext cx="9144000" cy="554990"/>
-          </a:xfrm>
+            <a:off x="4756785" y="2494915"/>
+            <a:ext cx="5912485" cy="398780"/>
+          </a:xfrm>
+          <a:prstGeom prst="rect">
+            <a:avLst/>
+          </a:prstGeom>
+          <a:noFill/>
         </p:spPr>
         <p:txBody>
-          <a:bodyPr>
-            <a:normAutofit fontScale="90000"/>
+          <a:bodyPr wrap="square" rtlCol="0" anchor="t">
+            <a:spAutoFit/>
           </a:bodyPr>
-          <a:lstStyle/>
-          <a:p>
-            <a:pPr marL="12700" algn="ctr">
-              <a:lnSpc>
-                <a:spcPct val="100000"/>
-              </a:lnSpc>
-              <a:spcBef>
-                <a:spcPts val="100"/>
-              </a:spcBef>
+          <a:p>
+            <a:r>
+              <a:rPr lang="en-US" sz="2000" b="1" spc="40" dirty="0">
+                <a:solidFill>
+                  <a:srgbClr val="00B0F0"/>
+                </a:solidFill>
+                <a:latin typeface="Verdana" panose="020B0604030504040204"/>
+                <a:cs typeface="Verdana" panose="020B0604030504040204"/>
+              </a:rPr>
+              <a:t>ExpectedException Rule </a:t>
+            </a:r>
+            <a:endParaRPr lang="en-US" sz="2000" b="1" spc="40" dirty="0">
+              <a:solidFill>
+                <a:srgbClr val="00B0F0"/>
+              </a:solidFill>
+              <a:latin typeface="Verdana" panose="020B0604030504040204"/>
+              <a:cs typeface="Verdana" panose="020B0604030504040204"/>
+            </a:endParaRPr>
+          </a:p>
+        </p:txBody>
+      </p:sp>
+      <p:sp>
+        <p:nvSpPr>
+          <p:cNvPr id="8" name="Text Box 7"/>
+          <p:cNvSpPr txBox="1"/>
+          <p:nvPr/>
+        </p:nvSpPr>
+        <p:spPr>
+          <a:xfrm>
+            <a:off x="4756785" y="4360545"/>
+            <a:ext cx="6338570" cy="398780"/>
+          </a:xfrm>
+          <a:prstGeom prst="rect">
+            <a:avLst/>
+          </a:prstGeom>
+          <a:noFill/>
+        </p:spPr>
+        <p:txBody>
+          <a:bodyPr wrap="square" rtlCol="0" anchor="t">
+            <a:spAutoFit/>
+          </a:bodyPr>
+          <a:p>
+            <a:pPr algn="l">
               <a:buClrTx/>
               <a:buSzTx/>
               <a:buFontTx/>
             </a:pPr>
             <a:r>
-              <a:rPr sz="3600" kern="0" spc="35" dirty="0">
-                <a:solidFill>
-                  <a:srgbClr val="404040"/>
+              <a:rPr lang="en-US" sz="2000" b="1" spc="40" dirty="0">
+                <a:solidFill>
+                  <a:srgbClr val="00B0F0"/>
                 </a:solidFill>
                 <a:latin typeface="Verdana" panose="020B0604030504040204"/>
                 <a:cs typeface="Verdana" panose="020B0604030504040204"/>
               </a:rPr>
-              <a:t>Test </a:t>
-            </a:r>
-            <a:r>
-              <a:rPr lang="en-US" sz="3600" kern="0" spc="35" dirty="0">
-                <a:solidFill>
-                  <a:srgbClr val="404040"/>
-                </a:solidFill>
-                <a:latin typeface="Verdana" panose="020B0604030504040204"/>
-                <a:cs typeface="Verdana" panose="020B0604030504040204"/>
-              </a:rPr>
-              <a:t>Suites</a:t>
-            </a:r>
-            <a:endParaRPr lang="en-US" sz="3600" kern="0" spc="35" dirty="0">
+              <a:t>Creating a Custom JUnit Rule</a:t>
+            </a:r>
+            <a:endParaRPr lang="en-US" sz="2000" b="1" spc="40" dirty="0">
               <a:solidFill>
-                <a:srgbClr val="404040"/>
+                <a:srgbClr val="00B0F0"/>
               </a:solidFill>
               <a:latin typeface="Verdana" panose="020B0604030504040204"/>
               <a:cs typeface="Verdana" panose="020B0604030504040204"/>
@@ -4860,145 +5406,43 @@
       </p:sp>
       <p:sp>
         <p:nvSpPr>
-          <p:cNvPr id="4" name="Slide Number Placeholder 3"/>
-          <p:cNvSpPr>
-            <a:spLocks noGrp="1"/>
-          </p:cNvSpPr>
-          <p:nvPr>
-            <p:ph type="sldNum" sz="quarter" idx="12"/>
-          </p:nvPr>
-        </p:nvSpPr>
-        <p:spPr/>
-        <p:txBody>
-          <a:bodyPr/>
-          <a:p>
-            <a:fld id="{9B618960-8005-486C-9A75-10CB2AAC16F9}" type="slidenum">
-              <a:rPr lang="en-US" smtClean="0"/>
-            </a:fld>
-            <a:endParaRPr lang="en-US"/>
-          </a:p>
-        </p:txBody>
-      </p:sp>
-      <p:graphicFrame>
-        <p:nvGraphicFramePr>
-          <p:cNvPr id="5" name="Object 4"/>
-          <p:cNvGraphicFramePr/>
+          <p:cNvPr id="11" name="Text Box 10"/>
+          <p:cNvSpPr txBox="1"/>
           <p:nvPr/>
-        </p:nvGraphicFramePr>
-        <p:xfrm>
-          <a:off x="2853690" y="1170305"/>
-          <a:ext cx="6941185" cy="4819650"/>
-        </p:xfrm>
-        <a:graphic>
-          <a:graphicData uri="http://schemas.openxmlformats.org/presentationml/2006/ole">
-            <mc:AlternateContent xmlns:mc="http://schemas.openxmlformats.org/markup-compatibility/2006">
-              <mc:Choice xmlns:v="urn:schemas-microsoft-com:vml" Requires="v">
-                <p:oleObj spid="_x0000_s6" name="" r:id="rId1" imgW="5191125" imgH="3781425" progId="Paint.Picture">
-                  <p:embed/>
-                </p:oleObj>
-              </mc:Choice>
-              <mc:Fallback>
-                <p:oleObj name="" r:id="rId1" imgW="5191125" imgH="3781425" progId="Paint.Picture">
-                  <p:embed/>
-                  <p:pic>
-                    <p:nvPicPr>
-                      <p:cNvPr id="0" name="Picture 5"/>
-                      <p:cNvPicPr/>
-                      <p:nvPr/>
-                    </p:nvPicPr>
-                    <p:blipFill>
-                      <a:blip r:embed="rId2"/>
-                      <a:stretch>
-                        <a:fillRect/>
-                      </a:stretch>
-                    </p:blipFill>
-                    <p:spPr>
-                      <a:xfrm>
-                        <a:off x="2853690" y="1170305"/>
-                        <a:ext cx="6941185" cy="4819650"/>
-                      </a:xfrm>
-                      <a:prstGeom prst="rect">
-                        <a:avLst/>
-                      </a:prstGeom>
-                    </p:spPr>
-                  </p:pic>
-                </p:oleObj>
-              </mc:Fallback>
-            </mc:AlternateContent>
-          </a:graphicData>
-        </a:graphic>
-      </p:graphicFrame>
-    </p:spTree>
-  </p:cSld>
-  <p:clrMapOvr>
-    <a:masterClrMapping/>
-  </p:clrMapOvr>
-</p:sld>
-</file>
-
-<file path=ppt/slides/slide19.xml><?xml version="1.0" encoding="utf-8"?>
-<p:sld xmlns:a="http://schemas.openxmlformats.org/drawingml/2006/main" xmlns:r="http://schemas.openxmlformats.org/officeDocument/2006/relationships" xmlns:p="http://schemas.openxmlformats.org/presentationml/2006/main">
-  <p:cSld>
-    <p:spTree>
-      <p:nvGrpSpPr>
-        <p:cNvPr id="1" name=""/>
-        <p:cNvGrpSpPr/>
-        <p:nvPr/>
-      </p:nvGrpSpPr>
-      <p:grpSpPr>
-        <a:xfrm>
-          <a:off x="0" y="0"/>
-          <a:ext cx="0" cy="0"/>
-          <a:chOff x="0" y="0"/>
-          <a:chExt cx="0" cy="0"/>
-        </a:xfrm>
-      </p:grpSpPr>
-      <p:sp>
-        <p:nvSpPr>
-          <p:cNvPr id="2" name="Title 1"/>
-          <p:cNvSpPr>
-            <a:spLocks noGrp="1"/>
-          </p:cNvSpPr>
-          <p:nvPr>
-            <p:ph type="ctrTitle"/>
-          </p:nvPr>
         </p:nvSpPr>
         <p:spPr>
           <a:xfrm>
-            <a:off x="1524000" y="249555"/>
-            <a:ext cx="9144000" cy="554990"/>
-          </a:xfrm>
+            <a:off x="4756785" y="3775075"/>
+            <a:ext cx="6338570" cy="398780"/>
+          </a:xfrm>
+          <a:prstGeom prst="rect">
+            <a:avLst/>
+          </a:prstGeom>
+          <a:noFill/>
         </p:spPr>
         <p:txBody>
-          <a:bodyPr>
-            <a:normAutofit fontScale="90000"/>
+          <a:bodyPr wrap="square" rtlCol="0" anchor="t">
+            <a:spAutoFit/>
           </a:bodyPr>
-          <a:lstStyle/>
-          <a:p>
-            <a:pPr marL="12700" algn="ctr">
-              <a:lnSpc>
-                <a:spcPct val="100000"/>
-              </a:lnSpc>
-              <a:spcBef>
-                <a:spcPts val="100"/>
-              </a:spcBef>
+          <a:p>
+            <a:pPr algn="l">
               <a:buClrTx/>
               <a:buSzTx/>
               <a:buFontTx/>
             </a:pPr>
             <a:r>
-              <a:rPr sz="3600" kern="0" spc="35" dirty="0">
-                <a:solidFill>
-                  <a:srgbClr val="404040"/>
+              <a:rPr lang="en-US" sz="2000" b="1" spc="40" dirty="0">
+                <a:solidFill>
+                  <a:srgbClr val="00B0F0"/>
                 </a:solidFill>
                 <a:latin typeface="Verdana" panose="020B0604030504040204"/>
                 <a:cs typeface="Verdana" panose="020B0604030504040204"/>
               </a:rPr>
-              <a:t>What Is a Parameterized Test?</a:t>
-            </a:r>
-            <a:endParaRPr sz="3600" kern="0" spc="35" dirty="0">
+              <a:t>Error Collector Rule</a:t>
+            </a:r>
+            <a:endParaRPr lang="en-US" sz="2000" b="1" spc="40" dirty="0">
               <a:solidFill>
-                <a:srgbClr val="404040"/>
+                <a:srgbClr val="00B0F0"/>
               </a:solidFill>
               <a:latin typeface="Verdana" panose="020B0604030504040204"/>
               <a:cs typeface="Verdana" panose="020B0604030504040204"/>
@@ -5008,309 +5452,43 @@
       </p:sp>
       <p:sp>
         <p:nvSpPr>
-          <p:cNvPr id="4" name="Slide Number Placeholder 3"/>
-          <p:cNvSpPr>
-            <a:spLocks noGrp="1"/>
-          </p:cNvSpPr>
-          <p:nvPr>
-            <p:ph type="sldNum" sz="quarter" idx="12"/>
-          </p:nvPr>
-        </p:nvSpPr>
-        <p:spPr/>
-        <p:txBody>
-          <a:bodyPr/>
-          <a:p>
-            <a:fld id="{9B618960-8005-486C-9A75-10CB2AAC16F9}" type="slidenum">
-              <a:rPr lang="en-US" smtClean="0"/>
-            </a:fld>
-            <a:endParaRPr lang="en-US"/>
-          </a:p>
-        </p:txBody>
-      </p:sp>
-      <p:sp>
-        <p:nvSpPr>
-          <p:cNvPr id="19" name="object 3"/>
+          <p:cNvPr id="12" name="Text Box 11"/>
           <p:cNvSpPr txBox="1"/>
           <p:nvPr/>
         </p:nvSpPr>
         <p:spPr>
           <a:xfrm>
-            <a:off x="2266950" y="928370"/>
-            <a:ext cx="9351645" cy="5729605"/>
+            <a:off x="4756785" y="3133725"/>
+            <a:ext cx="6338570" cy="398780"/>
           </a:xfrm>
           <a:prstGeom prst="rect">
             <a:avLst/>
           </a:prstGeom>
+          <a:noFill/>
         </p:spPr>
         <p:txBody>
-          <a:bodyPr vert="horz" wrap="square" lIns="0" tIns="12700" rIns="0" bIns="0" rtlCol="0">
+          <a:bodyPr wrap="square" rtlCol="0" anchor="t">
             <a:spAutoFit/>
           </a:bodyPr>
           <a:p>
-            <a:pPr marL="12700" marR="5080" algn="l">
-              <a:lnSpc>
-                <a:spcPct val="163000"/>
-              </a:lnSpc>
+            <a:pPr algn="l">
               <a:buClrTx/>
               <a:buSzTx/>
               <a:buFontTx/>
             </a:pPr>
             <a:r>
-              <a:rPr lang="en-US" sz="2400" dirty="0">
-                <a:solidFill>
-                  <a:srgbClr val="EF5A28"/>
+              <a:rPr lang="en-US" sz="2000" b="1" spc="40" dirty="0">
+                <a:solidFill>
+                  <a:srgbClr val="00B0F0"/>
                 </a:solidFill>
                 <a:latin typeface="Verdana" panose="020B0604030504040204"/>
                 <a:cs typeface="Verdana" panose="020B0604030504040204"/>
               </a:rPr>
-              <a:t>W</a:t>
-            </a:r>
-            <a:r>
-              <a:rPr sz="2400" dirty="0">
-                <a:solidFill>
-                  <a:srgbClr val="EF5A28"/>
-                </a:solidFill>
-                <a:latin typeface="Verdana" panose="020B0604030504040204"/>
-                <a:cs typeface="Verdana" panose="020B0604030504040204"/>
-              </a:rPr>
-              <a:t>hen it fullfills all the following requirements:</a:t>
-            </a:r>
-            <a:r>
-              <a:rPr lang="en-US" sz="1800" spc="40" dirty="0">
-                <a:solidFill>
-                  <a:srgbClr val="EF5A28"/>
-                </a:solidFill>
-                <a:latin typeface="Verdana" panose="020B0604030504040204"/>
-                <a:cs typeface="Verdana" panose="020B0604030504040204"/>
-              </a:rPr>
-              <a:t>	</a:t>
-            </a:r>
-            <a:endParaRPr lang="en-US" sz="1800" spc="40" dirty="0">
+              <a:t>Timeout Rule</a:t>
+            </a:r>
+            <a:endParaRPr lang="en-US" sz="2000" b="1" spc="40" dirty="0">
               <a:solidFill>
-                <a:srgbClr val="EF5A28"/>
-              </a:solidFill>
-              <a:latin typeface="Verdana" panose="020B0604030504040204"/>
-              <a:cs typeface="Verdana" panose="020B0604030504040204"/>
-            </a:endParaRPr>
-          </a:p>
-          <a:p>
-            <a:pPr marL="12700" marR="5080" algn="l">
-              <a:lnSpc>
-                <a:spcPct val="163000"/>
-              </a:lnSpc>
-              <a:buClrTx/>
-              <a:buSzTx/>
-              <a:buFontTx/>
-            </a:pPr>
-            <a:endParaRPr lang="en-US" sz="1800" spc="40" dirty="0">
-              <a:solidFill>
-                <a:srgbClr val="EF5A28"/>
-              </a:solidFill>
-              <a:latin typeface="Verdana" panose="020B0604030504040204"/>
-              <a:cs typeface="Verdana" panose="020B0604030504040204"/>
-            </a:endParaRPr>
-          </a:p>
-          <a:p>
-            <a:pPr marL="12700" marR="5080" algn="l">
-              <a:lnSpc>
-                <a:spcPct val="163000"/>
-              </a:lnSpc>
-              <a:buClrTx/>
-              <a:buSzTx/>
-              <a:buFontTx/>
-            </a:pPr>
-            <a:r>
-              <a:rPr lang="en-US" sz="1800" spc="40" dirty="0">
-                <a:solidFill>
-                  <a:srgbClr val="EF5A28"/>
-                </a:solidFill>
-                <a:latin typeface="Verdana" panose="020B0604030504040204"/>
-                <a:cs typeface="Verdana" panose="020B0604030504040204"/>
-              </a:rPr>
-              <a:t>	- The class is annotated with @RunWith(Parameterized.class).</a:t>
-            </a:r>
-            <a:endParaRPr lang="en-US" sz="1800" spc="40" dirty="0">
-              <a:solidFill>
-                <a:srgbClr val="EF5A28"/>
-              </a:solidFill>
-              <a:latin typeface="Verdana" panose="020B0604030504040204"/>
-              <a:cs typeface="Verdana" panose="020B0604030504040204"/>
-            </a:endParaRPr>
-          </a:p>
-          <a:p>
-            <a:pPr marL="12700" marR="5080" algn="l">
-              <a:lnSpc>
-                <a:spcPct val="163000"/>
-              </a:lnSpc>
-              <a:buClrTx/>
-              <a:buSzTx/>
-              <a:buFontTx/>
-            </a:pPr>
-            <a:endParaRPr lang="en-US" sz="1800" spc="40" dirty="0">
-              <a:solidFill>
-                <a:srgbClr val="EF5A28"/>
-              </a:solidFill>
-              <a:latin typeface="Verdana" panose="020B0604030504040204"/>
-              <a:cs typeface="Verdana" panose="020B0604030504040204"/>
-            </a:endParaRPr>
-          </a:p>
-          <a:p>
-            <a:pPr marL="12700" marR="5080" algn="l">
-              <a:lnSpc>
-                <a:spcPct val="163000"/>
-              </a:lnSpc>
-              <a:buClrTx/>
-              <a:buSzTx/>
-              <a:buFontTx/>
-            </a:pPr>
-            <a:r>
-              <a:rPr lang="en-US" sz="1800" spc="40" dirty="0">
-                <a:solidFill>
-                  <a:srgbClr val="EF5A28"/>
-                </a:solidFill>
-                <a:latin typeface="Verdana" panose="020B0604030504040204"/>
-                <a:cs typeface="Verdana" panose="020B0604030504040204"/>
-              </a:rPr>
-              <a:t>	- The class has a single constructor that stores the test data</a:t>
-            </a:r>
-            <a:endParaRPr lang="en-US" sz="1800" spc="40" dirty="0">
-              <a:solidFill>
-                <a:srgbClr val="EF5A28"/>
-              </a:solidFill>
-              <a:latin typeface="Verdana" panose="020B0604030504040204"/>
-              <a:cs typeface="Verdana" panose="020B0604030504040204"/>
-            </a:endParaRPr>
-          </a:p>
-          <a:p>
-            <a:pPr marL="12700" marR="5080" algn="l">
-              <a:lnSpc>
-                <a:spcPct val="163000"/>
-              </a:lnSpc>
-              <a:buClrTx/>
-              <a:buSzTx/>
-              <a:buFontTx/>
-            </a:pPr>
-            <a:endParaRPr lang="en-US" sz="1800" spc="40" dirty="0">
-              <a:solidFill>
-                <a:srgbClr val="EF5A28"/>
-              </a:solidFill>
-              <a:latin typeface="Verdana" panose="020B0604030504040204"/>
-              <a:cs typeface="Verdana" panose="020B0604030504040204"/>
-            </a:endParaRPr>
-          </a:p>
-          <a:p>
-            <a:pPr marL="12700" marR="5080" algn="l">
-              <a:lnSpc>
-                <a:spcPct val="163000"/>
-              </a:lnSpc>
-              <a:buClrTx/>
-              <a:buSzTx/>
-              <a:buFontTx/>
-            </a:pPr>
-            <a:r>
-              <a:rPr sz="2400" dirty="0">
-                <a:solidFill>
-                  <a:srgbClr val="EF5A28"/>
-                </a:solidFill>
-                <a:latin typeface="Verdana" panose="020B0604030504040204"/>
-                <a:cs typeface="Verdana" panose="020B0604030504040204"/>
-              </a:rPr>
-              <a:t>	</a:t>
-            </a:r>
-            <a:r>
-              <a:rPr lang="en-US" sz="2400" dirty="0">
-                <a:solidFill>
-                  <a:srgbClr val="EF5A28"/>
-                </a:solidFill>
-                <a:latin typeface="Verdana" panose="020B0604030504040204"/>
-                <a:cs typeface="Verdana" panose="020B0604030504040204"/>
-              </a:rPr>
-              <a:t>- </a:t>
-            </a:r>
-            <a:r>
-              <a:rPr lang="en-US" sz="1800" spc="40" dirty="0">
-                <a:solidFill>
-                  <a:srgbClr val="EF5A28"/>
-                </a:solidFill>
-                <a:latin typeface="Verdana" panose="020B0604030504040204"/>
-                <a:cs typeface="Verdana" panose="020B0604030504040204"/>
-              </a:rPr>
-              <a:t>The class has a static method that generates and returns test data   	   and is annotated with the @Parameters annotation.</a:t>
-            </a:r>
-            <a:endParaRPr lang="en-US" sz="1800" spc="40" dirty="0">
-              <a:solidFill>
-                <a:srgbClr val="EF5A28"/>
-              </a:solidFill>
-              <a:latin typeface="Verdana" panose="020B0604030504040204"/>
-              <a:cs typeface="Verdana" panose="020B0604030504040204"/>
-            </a:endParaRPr>
-          </a:p>
-          <a:p>
-            <a:pPr marL="12700" marR="5080" algn="l">
-              <a:lnSpc>
-                <a:spcPct val="163000"/>
-              </a:lnSpc>
-              <a:buClrTx/>
-              <a:buSzTx/>
-              <a:buFontTx/>
-            </a:pPr>
-            <a:endParaRPr lang="en-US" sz="1800" spc="40" dirty="0">
-              <a:solidFill>
-                <a:srgbClr val="EF5A28"/>
-              </a:solidFill>
-              <a:latin typeface="Verdana" panose="020B0604030504040204"/>
-              <a:cs typeface="Verdana" panose="020B0604030504040204"/>
-            </a:endParaRPr>
-          </a:p>
-          <a:p>
-            <a:pPr marL="12700" marR="5080" algn="l">
-              <a:lnSpc>
-                <a:spcPct val="163000"/>
-              </a:lnSpc>
-              <a:buClrTx/>
-              <a:buSzTx/>
-              <a:buFontTx/>
-            </a:pPr>
-            <a:r>
-              <a:rPr lang="en-US" sz="1800" spc="40" dirty="0">
-                <a:solidFill>
-                  <a:srgbClr val="EF5A28"/>
-                </a:solidFill>
-                <a:latin typeface="Verdana" panose="020B0604030504040204"/>
-                <a:cs typeface="Verdana" panose="020B0604030504040204"/>
-              </a:rPr>
-              <a:t>	- The class has a test, which obviously means that it needs a method          	   annotated with the @Test annotation.</a:t>
-            </a:r>
-            <a:endParaRPr lang="en-US" sz="1800" spc="40" dirty="0">
-              <a:solidFill>
-                <a:srgbClr val="EF5A28"/>
-              </a:solidFill>
-              <a:latin typeface="Verdana" panose="020B0604030504040204"/>
-              <a:cs typeface="Verdana" panose="020B0604030504040204"/>
-            </a:endParaRPr>
-          </a:p>
-          <a:p>
-            <a:pPr marL="12700" marR="5080" algn="l">
-              <a:lnSpc>
-                <a:spcPct val="163000"/>
-              </a:lnSpc>
-              <a:buClrTx/>
-              <a:buSzTx/>
-              <a:buFontTx/>
-            </a:pPr>
-            <a:r>
-              <a:rPr lang="en-US" sz="1800" spc="40" dirty="0">
-                <a:solidFill>
-                  <a:srgbClr val="EF5A28"/>
-                </a:solidFill>
-                <a:latin typeface="Verdana" panose="020B0604030504040204"/>
-                <a:cs typeface="Verdana" panose="020B0604030504040204"/>
-              </a:rPr>
-              <a:t>	</a:t>
-            </a:r>
-            <a:endParaRPr sz="2400" dirty="0">
-              <a:solidFill>
-                <a:srgbClr val="EF5A28"/>
+                <a:srgbClr val="00B0F0"/>
               </a:solidFill>
               <a:latin typeface="Verdana" panose="020B0604030504040204"/>
               <a:cs typeface="Verdana" panose="020B0604030504040204"/>
@@ -5861,16 +6039,16 @@
               <a:buFontTx/>
             </a:pPr>
             <a:r>
-              <a:rPr lang="en-US" sz="3600" kern="0" spc="35" dirty="0">
+              <a:rPr sz="3600" kern="0" spc="35" dirty="0">
                 <a:solidFill>
                   <a:srgbClr val="404040"/>
                 </a:solidFill>
                 <a:latin typeface="Verdana" panose="020B0604030504040204"/>
                 <a:cs typeface="Verdana" panose="020B0604030504040204"/>
               </a:rPr>
-              <a:t>Rules</a:t>
-            </a:r>
-            <a:endParaRPr lang="en-US" sz="3600" kern="0" spc="35" dirty="0">
+              <a:t>What is JMH?</a:t>
+            </a:r>
+            <a:endParaRPr sz="3600" kern="0" spc="35" dirty="0">
               <a:solidFill>
                 <a:srgbClr val="404040"/>
               </a:solidFill>
@@ -5901,30 +6079,305 @@
           </a:p>
         </p:txBody>
       </p:sp>
-      <p:pic>
-        <p:nvPicPr>
-          <p:cNvPr id="5" name="Picture 4"/>
-          <p:cNvPicPr>
-            <a:picLocks noChangeAspect="1"/>
-          </p:cNvPicPr>
+      <p:sp>
+        <p:nvSpPr>
+          <p:cNvPr id="19" name="object 3"/>
+          <p:cNvSpPr txBox="1"/>
           <p:nvPr/>
-        </p:nvPicPr>
-        <p:blipFill>
-          <a:blip r:embed="rId1"/>
-          <a:stretch>
-            <a:fillRect/>
-          </a:stretch>
-        </p:blipFill>
+        </p:nvSpPr>
         <p:spPr>
           <a:xfrm>
-            <a:off x="3718560" y="806450"/>
-            <a:ext cx="5857240" cy="5815330"/>
+            <a:off x="191770" y="804545"/>
+            <a:ext cx="12000865" cy="5128260"/>
           </a:xfrm>
           <a:prstGeom prst="rect">
             <a:avLst/>
           </a:prstGeom>
         </p:spPr>
-      </p:pic>
+        <p:txBody>
+          <a:bodyPr vert="horz" wrap="square" lIns="0" tIns="12700" rIns="0" bIns="0" rtlCol="0">
+            <a:spAutoFit/>
+          </a:bodyPr>
+          <a:p>
+            <a:pPr marL="12700" marR="5080" algn="l">
+              <a:lnSpc>
+                <a:spcPct val="163000"/>
+              </a:lnSpc>
+              <a:buClrTx/>
+              <a:buSzTx/>
+              <a:buFontTx/>
+            </a:pPr>
+            <a:r>
+              <a:rPr lang="en-US" sz="1800" spc="40" dirty="0">
+                <a:solidFill>
+                  <a:srgbClr val="EF5A28"/>
+                </a:solidFill>
+                <a:latin typeface="Verdana" panose="020B0604030504040204"/>
+                <a:cs typeface="Verdana" panose="020B0604030504040204"/>
+              </a:rPr>
+              <a:t>	</a:t>
+            </a:r>
+            <a:endParaRPr lang="en-US" sz="1800" spc="40" dirty="0">
+              <a:solidFill>
+                <a:srgbClr val="EF5A28"/>
+              </a:solidFill>
+              <a:latin typeface="Verdana" panose="020B0604030504040204"/>
+              <a:cs typeface="Verdana" panose="020B0604030504040204"/>
+            </a:endParaRPr>
+          </a:p>
+          <a:p>
+            <a:pPr marL="12700" marR="5080" algn="l">
+              <a:lnSpc>
+                <a:spcPct val="163000"/>
+              </a:lnSpc>
+              <a:buClrTx/>
+              <a:buSzTx/>
+              <a:buFontTx/>
+            </a:pPr>
+            <a:endParaRPr lang="en-US" sz="1800" spc="40" dirty="0">
+              <a:solidFill>
+                <a:srgbClr val="EF5A28"/>
+              </a:solidFill>
+              <a:latin typeface="Verdana" panose="020B0604030504040204"/>
+              <a:cs typeface="Verdana" panose="020B0604030504040204"/>
+            </a:endParaRPr>
+          </a:p>
+          <a:p>
+            <a:pPr marL="12700" marR="5080" algn="l">
+              <a:lnSpc>
+                <a:spcPct val="163000"/>
+              </a:lnSpc>
+              <a:buClrTx/>
+              <a:buSzTx/>
+              <a:buFontTx/>
+            </a:pPr>
+            <a:r>
+              <a:rPr lang="en-US" sz="1800" spc="40" dirty="0">
+                <a:solidFill>
+                  <a:srgbClr val="EF5A28"/>
+                </a:solidFill>
+                <a:latin typeface="Verdana" panose="020B0604030504040204"/>
+                <a:cs typeface="Verdana" panose="020B0604030504040204"/>
+              </a:rPr>
+              <a:t>	- JMH is an Open JDK tool that helps to implement benchmarks correctly.</a:t>
+            </a:r>
+            <a:endParaRPr lang="en-US" sz="1800" spc="40" dirty="0">
+              <a:solidFill>
+                <a:srgbClr val="EF5A28"/>
+              </a:solidFill>
+              <a:latin typeface="Verdana" panose="020B0604030504040204"/>
+              <a:cs typeface="Verdana" panose="020B0604030504040204"/>
+            </a:endParaRPr>
+          </a:p>
+          <a:p>
+            <a:pPr marL="12700" marR="5080" algn="l">
+              <a:lnSpc>
+                <a:spcPct val="163000"/>
+              </a:lnSpc>
+              <a:buClrTx/>
+              <a:buSzTx/>
+              <a:buFontTx/>
+            </a:pPr>
+            <a:endParaRPr lang="en-US" sz="1800" spc="40" dirty="0">
+              <a:solidFill>
+                <a:srgbClr val="EF5A28"/>
+              </a:solidFill>
+              <a:latin typeface="Verdana" panose="020B0604030504040204"/>
+              <a:cs typeface="Verdana" panose="020B0604030504040204"/>
+            </a:endParaRPr>
+          </a:p>
+          <a:p>
+            <a:pPr marL="12700" marR="5080" algn="l">
+              <a:lnSpc>
+                <a:spcPct val="163000"/>
+              </a:lnSpc>
+              <a:buClrTx/>
+              <a:buSzTx/>
+              <a:buFontTx/>
+            </a:pPr>
+            <a:r>
+              <a:rPr lang="en-US" sz="1800" spc="40" dirty="0">
+                <a:solidFill>
+                  <a:srgbClr val="EF5A28"/>
+                </a:solidFill>
+                <a:latin typeface="Verdana" panose="020B0604030504040204"/>
+                <a:cs typeface="Verdana" panose="020B0604030504040204"/>
+              </a:rPr>
+              <a:t>	- JMH specializes in micro-benchmarks where low-level performance metrics are measured.</a:t>
+            </a:r>
+            <a:endParaRPr lang="en-US" sz="1800" spc="40" dirty="0">
+              <a:solidFill>
+                <a:srgbClr val="EF5A28"/>
+              </a:solidFill>
+              <a:latin typeface="Verdana" panose="020B0604030504040204"/>
+              <a:cs typeface="Verdana" panose="020B0604030504040204"/>
+            </a:endParaRPr>
+          </a:p>
+          <a:p>
+            <a:pPr marL="12700" marR="5080" algn="l">
+              <a:lnSpc>
+                <a:spcPct val="163000"/>
+              </a:lnSpc>
+              <a:buClrTx/>
+              <a:buSzTx/>
+              <a:buFontTx/>
+            </a:pPr>
+            <a:endParaRPr lang="en-US" sz="1800" spc="40" dirty="0">
+              <a:solidFill>
+                <a:srgbClr val="EF5A28"/>
+              </a:solidFill>
+              <a:latin typeface="Verdana" panose="020B0604030504040204"/>
+              <a:cs typeface="Verdana" panose="020B0604030504040204"/>
+            </a:endParaRPr>
+          </a:p>
+          <a:p>
+            <a:pPr marL="12700" marR="5080" algn="l">
+              <a:lnSpc>
+                <a:spcPct val="163000"/>
+              </a:lnSpc>
+              <a:buClrTx/>
+              <a:buSzTx/>
+              <a:buFontTx/>
+            </a:pPr>
+            <a:r>
+              <a:rPr sz="2400" dirty="0">
+                <a:solidFill>
+                  <a:srgbClr val="EF5A28"/>
+                </a:solidFill>
+                <a:latin typeface="Verdana" panose="020B0604030504040204"/>
+                <a:cs typeface="Verdana" panose="020B0604030504040204"/>
+              </a:rPr>
+              <a:t>	</a:t>
+            </a:r>
+            <a:r>
+              <a:rPr lang="en-US" sz="2400" dirty="0">
+                <a:solidFill>
+                  <a:srgbClr val="EF5A28"/>
+                </a:solidFill>
+                <a:latin typeface="Verdana" panose="020B0604030504040204"/>
+                <a:cs typeface="Verdana" panose="020B0604030504040204"/>
+              </a:rPr>
+              <a:t>- </a:t>
+            </a:r>
+            <a:r>
+              <a:rPr lang="en-US" sz="1800" spc="40" dirty="0">
+                <a:solidFill>
+                  <a:srgbClr val="EF5A28"/>
+                </a:solidFill>
+                <a:latin typeface="Verdana" panose="020B0604030504040204"/>
+                <a:cs typeface="Verdana" panose="020B0604030504040204"/>
+              </a:rPr>
+              <a:t>Micro-benchmarks are useful for in-depth analysis of performance issues. </a:t>
+            </a:r>
+            <a:endParaRPr lang="en-US" sz="1800" spc="40" dirty="0">
+              <a:solidFill>
+                <a:srgbClr val="EF5A28"/>
+              </a:solidFill>
+              <a:latin typeface="Verdana" panose="020B0604030504040204"/>
+              <a:cs typeface="Verdana" panose="020B0604030504040204"/>
+            </a:endParaRPr>
+          </a:p>
+          <a:p>
+            <a:pPr marL="12700" marR="5080" algn="l">
+              <a:lnSpc>
+                <a:spcPct val="163000"/>
+              </a:lnSpc>
+              <a:buClrTx/>
+              <a:buSzTx/>
+              <a:buFontTx/>
+            </a:pPr>
+            <a:endParaRPr lang="en-US" sz="1800" spc="40" dirty="0">
+              <a:solidFill>
+                <a:srgbClr val="EF5A28"/>
+              </a:solidFill>
+              <a:latin typeface="Verdana" panose="020B0604030504040204"/>
+              <a:cs typeface="Verdana" panose="020B0604030504040204"/>
+            </a:endParaRPr>
+          </a:p>
+          <a:p>
+            <a:pPr marL="12700" marR="5080" algn="l">
+              <a:lnSpc>
+                <a:spcPct val="163000"/>
+              </a:lnSpc>
+              <a:buClrTx/>
+              <a:buSzTx/>
+              <a:buFontTx/>
+            </a:pPr>
+            <a:r>
+              <a:rPr lang="en-US" sz="1800" spc="40" dirty="0">
+                <a:solidFill>
+                  <a:srgbClr val="EF5A28"/>
+                </a:solidFill>
+                <a:latin typeface="Verdana" panose="020B0604030504040204"/>
+                <a:cs typeface="Verdana" panose="020B0604030504040204"/>
+              </a:rPr>
+              <a:t>	-  Writing JMH benchmarks are similar to writing JUnit test cases.</a:t>
+            </a:r>
+            <a:endParaRPr lang="en-US" sz="1800" spc="40" dirty="0">
+              <a:solidFill>
+                <a:srgbClr val="EF5A28"/>
+              </a:solidFill>
+              <a:latin typeface="Verdana" panose="020B0604030504040204"/>
+              <a:cs typeface="Verdana" panose="020B0604030504040204"/>
+            </a:endParaRPr>
+          </a:p>
+          <a:p>
+            <a:pPr marL="12700" marR="5080" algn="l">
+              <a:lnSpc>
+                <a:spcPct val="163000"/>
+              </a:lnSpc>
+              <a:buClrTx/>
+              <a:buSzTx/>
+              <a:buFontTx/>
+            </a:pPr>
+            <a:endParaRPr lang="en-US" sz="1800" spc="40" dirty="0">
+              <a:solidFill>
+                <a:srgbClr val="EF5A28"/>
+              </a:solidFill>
+              <a:latin typeface="Verdana" panose="020B0604030504040204"/>
+              <a:cs typeface="Verdana" panose="020B0604030504040204"/>
+            </a:endParaRPr>
+          </a:p>
+          <a:p>
+            <a:pPr marL="12700" marR="5080" algn="l">
+              <a:lnSpc>
+                <a:spcPct val="163000"/>
+              </a:lnSpc>
+              <a:buClrTx/>
+              <a:buSzTx/>
+              <a:buFontTx/>
+            </a:pPr>
+            <a:r>
+              <a:rPr lang="en-US" spc="40" dirty="0">
+                <a:solidFill>
+                  <a:srgbClr val="EF5A28"/>
+                </a:solidFill>
+                <a:latin typeface="Verdana" panose="020B0604030504040204"/>
+                <a:cs typeface="Verdana" panose="020B0604030504040204"/>
+                <a:sym typeface="+mn-ea"/>
+              </a:rPr>
+              <a:t>	-  The only difference is with the annotations used in JMH.</a:t>
+            </a:r>
+            <a:r>
+              <a:rPr lang="en-US" sz="1800" spc="40" dirty="0">
+                <a:solidFill>
+                  <a:srgbClr val="EF5A28"/>
+                </a:solidFill>
+                <a:latin typeface="Verdana" panose="020B0604030504040204"/>
+                <a:cs typeface="Verdana" panose="020B0604030504040204"/>
+              </a:rPr>
+              <a:t>	</a:t>
+            </a:r>
+            <a:endParaRPr sz="2400" dirty="0">
+              <a:solidFill>
+                <a:srgbClr val="EF5A28"/>
+              </a:solidFill>
+              <a:latin typeface="Verdana" panose="020B0604030504040204"/>
+              <a:cs typeface="Verdana" panose="020B0604030504040204"/>
+            </a:endParaRPr>
+          </a:p>
+        </p:txBody>
+      </p:sp>
     </p:spTree>
   </p:cSld>
   <p:clrMapOvr>
@@ -5942,424 +6395,77 @@
         <p:cNvGrpSpPr/>
         <p:nvPr/>
       </p:nvGrpSpPr>
-      <p:grpSpPr>
-        <a:xfrm>
-          <a:off x="0" y="0"/>
-          <a:ext cx="0" cy="0"/>
-          <a:chOff x="0" y="0"/>
-          <a:chExt cx="0" cy="0"/>
-        </a:xfrm>
-      </p:grpSpPr>
-      <p:grpSp>
-        <p:nvGrpSpPr>
-          <p:cNvPr id="2" name="object 2"/>
-          <p:cNvGrpSpPr/>
-          <p:nvPr/>
-        </p:nvGrpSpPr>
-        <p:grpSpPr>
-          <a:xfrm>
-            <a:off x="0" y="0"/>
-            <a:ext cx="4636135" cy="6858000"/>
-            <a:chOff x="0" y="0"/>
-            <a:chExt cx="4636135" cy="6858000"/>
-          </a:xfrm>
-        </p:grpSpPr>
-        <p:pic>
-          <p:nvPicPr>
-            <p:cNvPr id="3" name="object 3"/>
-            <p:cNvPicPr/>
-            <p:nvPr/>
-          </p:nvPicPr>
-          <p:blipFill>
-            <a:blip r:embed="rId1" cstate="print"/>
-            <a:stretch>
-              <a:fillRect/>
-            </a:stretch>
-          </p:blipFill>
-          <p:spPr>
-            <a:xfrm>
-              <a:off x="0" y="0"/>
-              <a:ext cx="4636008" cy="6858000"/>
-            </a:xfrm>
-            <a:prstGeom prst="rect">
-              <a:avLst/>
-            </a:prstGeom>
-          </p:spPr>
-        </p:pic>
-        <p:pic>
-          <p:nvPicPr>
-            <p:cNvPr id="4" name="object 4"/>
-            <p:cNvPicPr/>
-            <p:nvPr/>
-          </p:nvPicPr>
-          <p:blipFill>
-            <a:blip r:embed="rId2" cstate="print"/>
-            <a:stretch>
-              <a:fillRect/>
-            </a:stretch>
-          </p:blipFill>
-          <p:spPr>
-            <a:xfrm>
-              <a:off x="1639189" y="1948560"/>
-              <a:ext cx="1689735" cy="548639"/>
-            </a:xfrm>
-            <a:prstGeom prst="rect">
-              <a:avLst/>
-            </a:prstGeom>
-          </p:spPr>
-        </p:pic>
-        <p:pic>
-          <p:nvPicPr>
-            <p:cNvPr id="5" name="object 5"/>
-            <p:cNvPicPr/>
-            <p:nvPr/>
-          </p:nvPicPr>
-          <p:blipFill>
-            <a:blip r:embed="rId3" cstate="print"/>
-            <a:stretch>
-              <a:fillRect/>
-            </a:stretch>
-          </p:blipFill>
-          <p:spPr>
-            <a:xfrm>
-              <a:off x="0" y="45719"/>
-              <a:ext cx="48463" cy="640333"/>
-            </a:xfrm>
-            <a:prstGeom prst="rect">
-              <a:avLst/>
-            </a:prstGeom>
-          </p:spPr>
-        </p:pic>
-      </p:grpSp>
-      <p:sp>
-        <p:nvSpPr>
-          <p:cNvPr id="9" name="Slide Number Placeholder 8"/>
-          <p:cNvSpPr>
-            <a:spLocks noGrp="1"/>
-          </p:cNvSpPr>
-          <p:nvPr>
-            <p:ph type="sldNum" sz="quarter" idx="7"/>
-          </p:nvPr>
-        </p:nvSpPr>
+      <p:grpSpPr/>
+      <p:sp>
+        <p:nvSpPr>
+          <p:cNvPr id="2" name="Title 1"/>
+          <p:cNvSpPr>
+            <a:spLocks noGrp="1"/>
+          </p:cNvSpPr>
+          <p:nvPr>
+            <p:ph type="title"/>
+          </p:nvPr>
+        </p:nvSpPr>
+        <p:spPr/>
+        <p:txBody>
+          <a:bodyPr/>
+          <a:p>
+            <a:pPr algn="ctr"/>
+            <a:r>
+              <a:rPr lang="en-US"/>
+              <a:t>Maven dependency</a:t>
+            </a:r>
+            <a:endParaRPr lang="en-US"/>
+          </a:p>
+        </p:txBody>
+      </p:sp>
+      <p:sp>
+        <p:nvSpPr>
+          <p:cNvPr id="4" name="Slide Number Placeholder 3"/>
+          <p:cNvSpPr>
+            <a:spLocks noGrp="1"/>
+          </p:cNvSpPr>
+          <p:nvPr>
+            <p:ph type="sldNum" sz="quarter" idx="12"/>
+          </p:nvPr>
+        </p:nvSpPr>
+        <p:spPr/>
+        <p:txBody>
+          <a:bodyPr/>
+          <a:p>
+            <a:fld id="{9B618960-8005-486C-9A75-10CB2AAC16F9}" type="slidenum">
+              <a:rPr lang="en-US" smtClean="0"/>
+            </a:fld>
+            <a:endParaRPr lang="en-US"/>
+          </a:p>
+        </p:txBody>
+      </p:sp>
+      <p:pic>
+        <p:nvPicPr>
+          <p:cNvPr id="5" name="Content Placeholder 4"/>
+          <p:cNvPicPr>
+            <a:picLocks noChangeAspect="1"/>
+          </p:cNvPicPr>
+          <p:nvPr>
+            <p:ph idx="1"/>
+          </p:nvPr>
+        </p:nvPicPr>
+        <p:blipFill>
+          <a:blip r:embed="rId1"/>
+          <a:stretch>
+            <a:fillRect/>
+          </a:stretch>
+        </p:blipFill>
         <p:spPr>
           <a:xfrm>
-            <a:off x="8610600" y="4847590"/>
-            <a:ext cx="2743200" cy="365125"/>
-          </a:xfrm>
-        </p:spPr>
-        <p:txBody>
-          <a:bodyPr/>
-          <a:p>
-            <a:fld id="{B6F15528-21DE-4FAA-801E-634DDDAF4B2B}" type="slidenum">
-              <a:rPr/>
-            </a:fld>
-            <a:endParaRPr/>
-          </a:p>
-        </p:txBody>
-      </p:sp>
-      <p:sp>
-        <p:nvSpPr>
-          <p:cNvPr id="10" name="Text Box 9"/>
-          <p:cNvSpPr txBox="1"/>
-          <p:nvPr/>
-        </p:nvSpPr>
-        <p:spPr>
-          <a:xfrm>
-            <a:off x="4756785" y="887095"/>
-            <a:ext cx="6628765" cy="592455"/>
+            <a:off x="1049020" y="2120265"/>
+            <a:ext cx="10093325" cy="2359025"/>
           </a:xfrm>
           <a:prstGeom prst="rect">
             <a:avLst/>
           </a:prstGeom>
-          <a:noFill/>
         </p:spPr>
-        <p:txBody>
-          <a:bodyPr wrap="square" rtlCol="0">
-            <a:spAutoFit/>
-          </a:bodyPr>
-          <a:p>
-            <a:pPr marL="12700" marR="5080" algn="l">
-              <a:lnSpc>
-                <a:spcPct val="163000"/>
-              </a:lnSpc>
-              <a:buClrTx/>
-              <a:buSzTx/>
-              <a:buFontTx/>
-            </a:pPr>
-            <a:r>
-              <a:rPr lang="en-US" sz="2000" b="1" spc="40" dirty="0">
-                <a:solidFill>
-                  <a:srgbClr val="00B0F0"/>
-                </a:solidFill>
-                <a:latin typeface="Verdana" panose="020B0604030504040204"/>
-                <a:cs typeface="Verdana" panose="020B0604030504040204"/>
-                <a:sym typeface="+mn-ea"/>
-              </a:rPr>
-              <a:t>TestName Rule</a:t>
-            </a:r>
-            <a:endParaRPr lang="en-US" sz="2000" b="1" spc="40" dirty="0">
-              <a:solidFill>
-                <a:srgbClr val="00B0F0"/>
-              </a:solidFill>
-              <a:latin typeface="Verdana" panose="020B0604030504040204"/>
-              <a:cs typeface="Verdana" panose="020B0604030504040204"/>
-              <a:sym typeface="+mn-ea"/>
-            </a:endParaRPr>
-          </a:p>
-        </p:txBody>
-      </p:sp>
-      <p:sp>
-        <p:nvSpPr>
-          <p:cNvPr id="6" name="Text Box 5"/>
-          <p:cNvSpPr txBox="1"/>
-          <p:nvPr/>
-        </p:nvSpPr>
-        <p:spPr>
-          <a:xfrm>
-            <a:off x="4756785" y="1537335"/>
-            <a:ext cx="7555230" cy="592455"/>
-          </a:xfrm>
-          <a:prstGeom prst="rect">
-            <a:avLst/>
-          </a:prstGeom>
-          <a:noFill/>
-        </p:spPr>
-        <p:txBody>
-          <a:bodyPr wrap="square" rtlCol="0">
-            <a:spAutoFit/>
-          </a:bodyPr>
-          <a:p>
-            <a:pPr marL="12700" marR="5080" lvl="0" algn="l">
-              <a:lnSpc>
-                <a:spcPct val="163000"/>
-              </a:lnSpc>
-              <a:buClrTx/>
-              <a:buSzTx/>
-              <a:buFontTx/>
-            </a:pPr>
-            <a:r>
-              <a:rPr lang="en-US" sz="2000" b="1" spc="40" dirty="0">
-                <a:solidFill>
-                  <a:srgbClr val="00B0F0"/>
-                </a:solidFill>
-                <a:latin typeface="Verdana" panose="020B0604030504040204"/>
-                <a:cs typeface="Verdana" panose="020B0604030504040204"/>
-                <a:sym typeface="+mn-ea"/>
-              </a:rPr>
-              <a:t>TemporaryFolder Rule - </a:t>
-            </a:r>
-            <a:r>
-              <a:rPr lang="en-US" sz="2000" b="1" spc="40" dirty="0">
-                <a:solidFill>
-                  <a:srgbClr val="00B0F0"/>
-                </a:solidFill>
-                <a:latin typeface="Verdana" panose="020B0604030504040204"/>
-                <a:cs typeface="Verdana" panose="020B0604030504040204"/>
-                <a:sym typeface="+mn-ea"/>
-              </a:rPr>
-              <a:t>How a JUnit Rule Works</a:t>
-            </a:r>
-            <a:r>
-              <a:rPr lang="en-US" sz="2000" b="1" spc="40" dirty="0">
-                <a:solidFill>
-                  <a:srgbClr val="00B0F0"/>
-                </a:solidFill>
-                <a:latin typeface="Verdana" panose="020B0604030504040204"/>
-                <a:cs typeface="Verdana" panose="020B0604030504040204"/>
-                <a:sym typeface="+mn-ea"/>
-              </a:rPr>
-              <a:t> </a:t>
-            </a:r>
-            <a:endParaRPr lang="en-US" sz="2000" b="1" spc="40" dirty="0">
-              <a:solidFill>
-                <a:srgbClr val="00B0F0"/>
-              </a:solidFill>
-              <a:latin typeface="Verdana" panose="020B0604030504040204"/>
-              <a:cs typeface="Verdana" panose="020B0604030504040204"/>
-              <a:sym typeface="+mn-ea"/>
-            </a:endParaRPr>
-          </a:p>
-        </p:txBody>
-      </p:sp>
-      <p:sp>
-        <p:nvSpPr>
-          <p:cNvPr id="7" name="Text Box 6"/>
-          <p:cNvSpPr txBox="1"/>
-          <p:nvPr/>
-        </p:nvSpPr>
-        <p:spPr>
-          <a:xfrm>
-            <a:off x="4756785" y="2494915"/>
-            <a:ext cx="5912485" cy="398780"/>
-          </a:xfrm>
-          <a:prstGeom prst="rect">
-            <a:avLst/>
-          </a:prstGeom>
-          <a:noFill/>
-        </p:spPr>
-        <p:txBody>
-          <a:bodyPr wrap="square" rtlCol="0" anchor="t">
-            <a:spAutoFit/>
-          </a:bodyPr>
-          <a:p>
-            <a:r>
-              <a:rPr lang="en-US" sz="2000" b="1" spc="40" dirty="0">
-                <a:solidFill>
-                  <a:srgbClr val="00B0F0"/>
-                </a:solidFill>
-                <a:latin typeface="Verdana" panose="020B0604030504040204"/>
-                <a:cs typeface="Verdana" panose="020B0604030504040204"/>
-              </a:rPr>
-              <a:t>ExpectedException Rule </a:t>
-            </a:r>
-            <a:endParaRPr lang="en-US" sz="2000" b="1" spc="40" dirty="0">
-              <a:solidFill>
-                <a:srgbClr val="00B0F0"/>
-              </a:solidFill>
-              <a:latin typeface="Verdana" panose="020B0604030504040204"/>
-              <a:cs typeface="Verdana" panose="020B0604030504040204"/>
-            </a:endParaRPr>
-          </a:p>
-        </p:txBody>
-      </p:sp>
-      <p:sp>
-        <p:nvSpPr>
-          <p:cNvPr id="8" name="Text Box 7"/>
-          <p:cNvSpPr txBox="1"/>
-          <p:nvPr/>
-        </p:nvSpPr>
-        <p:spPr>
-          <a:xfrm>
-            <a:off x="4756785" y="4360545"/>
-            <a:ext cx="6338570" cy="398780"/>
-          </a:xfrm>
-          <a:prstGeom prst="rect">
-            <a:avLst/>
-          </a:prstGeom>
-          <a:noFill/>
-        </p:spPr>
-        <p:txBody>
-          <a:bodyPr wrap="square" rtlCol="0" anchor="t">
-            <a:spAutoFit/>
-          </a:bodyPr>
-          <a:p>
-            <a:pPr algn="l">
-              <a:buClrTx/>
-              <a:buSzTx/>
-              <a:buFontTx/>
-            </a:pPr>
-            <a:r>
-              <a:rPr lang="en-US" sz="2000" b="1" spc="40" dirty="0">
-                <a:solidFill>
-                  <a:srgbClr val="00B0F0"/>
-                </a:solidFill>
-                <a:latin typeface="Verdana" panose="020B0604030504040204"/>
-                <a:cs typeface="Verdana" panose="020B0604030504040204"/>
-              </a:rPr>
-              <a:t>Creating a Custom JUnit Rule</a:t>
-            </a:r>
-            <a:endParaRPr lang="en-US" sz="2000" b="1" spc="40" dirty="0">
-              <a:solidFill>
-                <a:srgbClr val="00B0F0"/>
-              </a:solidFill>
-              <a:latin typeface="Verdana" panose="020B0604030504040204"/>
-              <a:cs typeface="Verdana" panose="020B0604030504040204"/>
-            </a:endParaRPr>
-          </a:p>
-        </p:txBody>
-      </p:sp>
-      <p:sp>
-        <p:nvSpPr>
-          <p:cNvPr id="11" name="Text Box 10"/>
-          <p:cNvSpPr txBox="1"/>
-          <p:nvPr/>
-        </p:nvSpPr>
-        <p:spPr>
-          <a:xfrm>
-            <a:off x="4756785" y="3775075"/>
-            <a:ext cx="6338570" cy="398780"/>
-          </a:xfrm>
-          <a:prstGeom prst="rect">
-            <a:avLst/>
-          </a:prstGeom>
-          <a:noFill/>
-        </p:spPr>
-        <p:txBody>
-          <a:bodyPr wrap="square" rtlCol="0" anchor="t">
-            <a:spAutoFit/>
-          </a:bodyPr>
-          <a:p>
-            <a:pPr algn="l">
-              <a:buClrTx/>
-              <a:buSzTx/>
-              <a:buFontTx/>
-            </a:pPr>
-            <a:r>
-              <a:rPr lang="en-US" sz="2000" b="1" spc="40" dirty="0">
-                <a:solidFill>
-                  <a:srgbClr val="00B0F0"/>
-                </a:solidFill>
-                <a:latin typeface="Verdana" panose="020B0604030504040204"/>
-                <a:cs typeface="Verdana" panose="020B0604030504040204"/>
-              </a:rPr>
-              <a:t>Error Collector Rule</a:t>
-            </a:r>
-            <a:endParaRPr lang="en-US" sz="2000" b="1" spc="40" dirty="0">
-              <a:solidFill>
-                <a:srgbClr val="00B0F0"/>
-              </a:solidFill>
-              <a:latin typeface="Verdana" panose="020B0604030504040204"/>
-              <a:cs typeface="Verdana" panose="020B0604030504040204"/>
-            </a:endParaRPr>
-          </a:p>
-        </p:txBody>
-      </p:sp>
-      <p:sp>
-        <p:nvSpPr>
-          <p:cNvPr id="12" name="Text Box 11"/>
-          <p:cNvSpPr txBox="1"/>
-          <p:nvPr/>
-        </p:nvSpPr>
-        <p:spPr>
-          <a:xfrm>
-            <a:off x="4756785" y="3133725"/>
-            <a:ext cx="6338570" cy="398780"/>
-          </a:xfrm>
-          <a:prstGeom prst="rect">
-            <a:avLst/>
-          </a:prstGeom>
-          <a:noFill/>
-        </p:spPr>
-        <p:txBody>
-          <a:bodyPr wrap="square" rtlCol="0" anchor="t">
-            <a:spAutoFit/>
-          </a:bodyPr>
-          <a:p>
-            <a:pPr algn="l">
-              <a:buClrTx/>
-              <a:buSzTx/>
-              <a:buFontTx/>
-            </a:pPr>
-            <a:r>
-              <a:rPr lang="en-US" sz="2000" b="1" spc="40" dirty="0">
-                <a:solidFill>
-                  <a:srgbClr val="00B0F0"/>
-                </a:solidFill>
-                <a:latin typeface="Verdana" panose="020B0604030504040204"/>
-                <a:cs typeface="Verdana" panose="020B0604030504040204"/>
-              </a:rPr>
-              <a:t>Timeout Rule</a:t>
-            </a:r>
-            <a:endParaRPr lang="en-US" sz="2000" b="1" spc="40" dirty="0">
-              <a:solidFill>
-                <a:srgbClr val="00B0F0"/>
-              </a:solidFill>
-              <a:latin typeface="Verdana" panose="020B0604030504040204"/>
-              <a:cs typeface="Verdana" panose="020B0604030504040204"/>
-            </a:endParaRPr>
-          </a:p>
-        </p:txBody>
-      </p:sp>
+      </p:pic>
     </p:spTree>
   </p:cSld>
   <p:clrMapOvr>
@@ -6377,14 +6483,7 @@
         <p:cNvGrpSpPr/>
         <p:nvPr/>
       </p:nvGrpSpPr>
-      <p:grpSpPr>
-        <a:xfrm>
-          <a:off x="0" y="0"/>
-          <a:ext cx="0" cy="0"/>
-          <a:chOff x="0" y="0"/>
-          <a:chExt cx="0" cy="0"/>
-        </a:xfrm>
-      </p:grpSpPr>
+      <p:grpSpPr/>
       <p:sp>
         <p:nvSpPr>
           <p:cNvPr id="2" name="Title 1"/>
@@ -6392,49 +6491,19 @@
             <a:spLocks noGrp="1"/>
           </p:cNvSpPr>
           <p:nvPr>
-            <p:ph type="ctrTitle"/>
-          </p:nvPr>
-        </p:nvSpPr>
-        <p:spPr>
-          <a:xfrm>
-            <a:off x="1524000" y="249555"/>
-            <a:ext cx="9144000" cy="554990"/>
-          </a:xfrm>
-        </p:spPr>
-        <p:txBody>
-          <a:bodyPr>
-            <a:normAutofit fontScale="90000"/>
-          </a:bodyPr>
-          <a:lstStyle/>
-          <a:p>
-            <a:pPr marL="12700" algn="ctr">
-              <a:lnSpc>
-                <a:spcPct val="100000"/>
-              </a:lnSpc>
-              <a:spcBef>
-                <a:spcPts val="100"/>
-              </a:spcBef>
-              <a:buClrTx/>
-              <a:buSzTx/>
-              <a:buFontTx/>
-            </a:pPr>
-            <a:r>
-              <a:rPr sz="3600" kern="0" spc="35" dirty="0">
-                <a:solidFill>
-                  <a:srgbClr val="404040"/>
-                </a:solidFill>
-                <a:latin typeface="Verdana" panose="020B0604030504040204"/>
-                <a:cs typeface="Verdana" panose="020B0604030504040204"/>
-              </a:rPr>
-              <a:t>What is JMH?</a:t>
-            </a:r>
-            <a:endParaRPr sz="3600" kern="0" spc="35" dirty="0">
-              <a:solidFill>
-                <a:srgbClr val="404040"/>
-              </a:solidFill>
-              <a:latin typeface="Verdana" panose="020B0604030504040204"/>
-              <a:cs typeface="Verdana" panose="020B0604030504040204"/>
-            </a:endParaRPr>
+            <p:ph type="title"/>
+          </p:nvPr>
+        </p:nvSpPr>
+        <p:spPr/>
+        <p:txBody>
+          <a:bodyPr/>
+          <a:p>
+            <a:pPr algn="ctr"/>
+            <a:r>
+              <a:rPr lang="en-US"/>
+              <a:t>Writing your first JMH benchmark</a:t>
+            </a:r>
+            <a:endParaRPr lang="en-US"/>
           </a:p>
         </p:txBody>
       </p:sp>
@@ -6459,305 +6528,32 @@
           </a:p>
         </p:txBody>
       </p:sp>
-      <p:sp>
-        <p:nvSpPr>
-          <p:cNvPr id="19" name="object 3"/>
-          <p:cNvSpPr txBox="1"/>
-          <p:nvPr/>
-        </p:nvSpPr>
+      <p:pic>
+        <p:nvPicPr>
+          <p:cNvPr id="7" name="Content Placeholder 6"/>
+          <p:cNvPicPr>
+            <a:picLocks noChangeAspect="1"/>
+          </p:cNvPicPr>
+          <p:nvPr>
+            <p:ph idx="1"/>
+          </p:nvPr>
+        </p:nvPicPr>
+        <p:blipFill>
+          <a:blip r:embed="rId1"/>
+          <a:stretch>
+            <a:fillRect/>
+          </a:stretch>
+        </p:blipFill>
         <p:spPr>
           <a:xfrm>
-            <a:off x="191770" y="804545"/>
-            <a:ext cx="12000865" cy="5128260"/>
+            <a:off x="85725" y="2136140"/>
+            <a:ext cx="12106275" cy="1739265"/>
           </a:xfrm>
           <a:prstGeom prst="rect">
             <a:avLst/>
           </a:prstGeom>
         </p:spPr>
-        <p:txBody>
-          <a:bodyPr vert="horz" wrap="square" lIns="0" tIns="12700" rIns="0" bIns="0" rtlCol="0">
-            <a:spAutoFit/>
-          </a:bodyPr>
-          <a:p>
-            <a:pPr marL="12700" marR="5080" algn="l">
-              <a:lnSpc>
-                <a:spcPct val="163000"/>
-              </a:lnSpc>
-              <a:buClrTx/>
-              <a:buSzTx/>
-              <a:buFontTx/>
-            </a:pPr>
-            <a:r>
-              <a:rPr lang="en-US" sz="1800" spc="40" dirty="0">
-                <a:solidFill>
-                  <a:srgbClr val="EF5A28"/>
-                </a:solidFill>
-                <a:latin typeface="Verdana" panose="020B0604030504040204"/>
-                <a:cs typeface="Verdana" panose="020B0604030504040204"/>
-              </a:rPr>
-              <a:t>	</a:t>
-            </a:r>
-            <a:endParaRPr lang="en-US" sz="1800" spc="40" dirty="0">
-              <a:solidFill>
-                <a:srgbClr val="EF5A28"/>
-              </a:solidFill>
-              <a:latin typeface="Verdana" panose="020B0604030504040204"/>
-              <a:cs typeface="Verdana" panose="020B0604030504040204"/>
-            </a:endParaRPr>
-          </a:p>
-          <a:p>
-            <a:pPr marL="12700" marR="5080" algn="l">
-              <a:lnSpc>
-                <a:spcPct val="163000"/>
-              </a:lnSpc>
-              <a:buClrTx/>
-              <a:buSzTx/>
-              <a:buFontTx/>
-            </a:pPr>
-            <a:endParaRPr lang="en-US" sz="1800" spc="40" dirty="0">
-              <a:solidFill>
-                <a:srgbClr val="EF5A28"/>
-              </a:solidFill>
-              <a:latin typeface="Verdana" panose="020B0604030504040204"/>
-              <a:cs typeface="Verdana" panose="020B0604030504040204"/>
-            </a:endParaRPr>
-          </a:p>
-          <a:p>
-            <a:pPr marL="12700" marR="5080" algn="l">
-              <a:lnSpc>
-                <a:spcPct val="163000"/>
-              </a:lnSpc>
-              <a:buClrTx/>
-              <a:buSzTx/>
-              <a:buFontTx/>
-            </a:pPr>
-            <a:r>
-              <a:rPr lang="en-US" sz="1800" spc="40" dirty="0">
-                <a:solidFill>
-                  <a:srgbClr val="EF5A28"/>
-                </a:solidFill>
-                <a:latin typeface="Verdana" panose="020B0604030504040204"/>
-                <a:cs typeface="Verdana" panose="020B0604030504040204"/>
-              </a:rPr>
-              <a:t>	- JMH is an Open JDK tool that helps to implement benchmarks correctly.</a:t>
-            </a:r>
-            <a:endParaRPr lang="en-US" sz="1800" spc="40" dirty="0">
-              <a:solidFill>
-                <a:srgbClr val="EF5A28"/>
-              </a:solidFill>
-              <a:latin typeface="Verdana" panose="020B0604030504040204"/>
-              <a:cs typeface="Verdana" panose="020B0604030504040204"/>
-            </a:endParaRPr>
-          </a:p>
-          <a:p>
-            <a:pPr marL="12700" marR="5080" algn="l">
-              <a:lnSpc>
-                <a:spcPct val="163000"/>
-              </a:lnSpc>
-              <a:buClrTx/>
-              <a:buSzTx/>
-              <a:buFontTx/>
-            </a:pPr>
-            <a:endParaRPr lang="en-US" sz="1800" spc="40" dirty="0">
-              <a:solidFill>
-                <a:srgbClr val="EF5A28"/>
-              </a:solidFill>
-              <a:latin typeface="Verdana" panose="020B0604030504040204"/>
-              <a:cs typeface="Verdana" panose="020B0604030504040204"/>
-            </a:endParaRPr>
-          </a:p>
-          <a:p>
-            <a:pPr marL="12700" marR="5080" algn="l">
-              <a:lnSpc>
-                <a:spcPct val="163000"/>
-              </a:lnSpc>
-              <a:buClrTx/>
-              <a:buSzTx/>
-              <a:buFontTx/>
-            </a:pPr>
-            <a:r>
-              <a:rPr lang="en-US" sz="1800" spc="40" dirty="0">
-                <a:solidFill>
-                  <a:srgbClr val="EF5A28"/>
-                </a:solidFill>
-                <a:latin typeface="Verdana" panose="020B0604030504040204"/>
-                <a:cs typeface="Verdana" panose="020B0604030504040204"/>
-              </a:rPr>
-              <a:t>	- JMH specializes in micro-benchmarks where low-level performance metrics are measured.</a:t>
-            </a:r>
-            <a:endParaRPr lang="en-US" sz="1800" spc="40" dirty="0">
-              <a:solidFill>
-                <a:srgbClr val="EF5A28"/>
-              </a:solidFill>
-              <a:latin typeface="Verdana" panose="020B0604030504040204"/>
-              <a:cs typeface="Verdana" panose="020B0604030504040204"/>
-            </a:endParaRPr>
-          </a:p>
-          <a:p>
-            <a:pPr marL="12700" marR="5080" algn="l">
-              <a:lnSpc>
-                <a:spcPct val="163000"/>
-              </a:lnSpc>
-              <a:buClrTx/>
-              <a:buSzTx/>
-              <a:buFontTx/>
-            </a:pPr>
-            <a:endParaRPr lang="en-US" sz="1800" spc="40" dirty="0">
-              <a:solidFill>
-                <a:srgbClr val="EF5A28"/>
-              </a:solidFill>
-              <a:latin typeface="Verdana" panose="020B0604030504040204"/>
-              <a:cs typeface="Verdana" panose="020B0604030504040204"/>
-            </a:endParaRPr>
-          </a:p>
-          <a:p>
-            <a:pPr marL="12700" marR="5080" algn="l">
-              <a:lnSpc>
-                <a:spcPct val="163000"/>
-              </a:lnSpc>
-              <a:buClrTx/>
-              <a:buSzTx/>
-              <a:buFontTx/>
-            </a:pPr>
-            <a:r>
-              <a:rPr sz="2400" dirty="0">
-                <a:solidFill>
-                  <a:srgbClr val="EF5A28"/>
-                </a:solidFill>
-                <a:latin typeface="Verdana" panose="020B0604030504040204"/>
-                <a:cs typeface="Verdana" panose="020B0604030504040204"/>
-              </a:rPr>
-              <a:t>	</a:t>
-            </a:r>
-            <a:r>
-              <a:rPr lang="en-US" sz="2400" dirty="0">
-                <a:solidFill>
-                  <a:srgbClr val="EF5A28"/>
-                </a:solidFill>
-                <a:latin typeface="Verdana" panose="020B0604030504040204"/>
-                <a:cs typeface="Verdana" panose="020B0604030504040204"/>
-              </a:rPr>
-              <a:t>- </a:t>
-            </a:r>
-            <a:r>
-              <a:rPr lang="en-US" sz="1800" spc="40" dirty="0">
-                <a:solidFill>
-                  <a:srgbClr val="EF5A28"/>
-                </a:solidFill>
-                <a:latin typeface="Verdana" panose="020B0604030504040204"/>
-                <a:cs typeface="Verdana" panose="020B0604030504040204"/>
-              </a:rPr>
-              <a:t>Micro-benchmarks are useful for in-depth analysis of performance issues. </a:t>
-            </a:r>
-            <a:endParaRPr lang="en-US" sz="1800" spc="40" dirty="0">
-              <a:solidFill>
-                <a:srgbClr val="EF5A28"/>
-              </a:solidFill>
-              <a:latin typeface="Verdana" panose="020B0604030504040204"/>
-              <a:cs typeface="Verdana" panose="020B0604030504040204"/>
-            </a:endParaRPr>
-          </a:p>
-          <a:p>
-            <a:pPr marL="12700" marR="5080" algn="l">
-              <a:lnSpc>
-                <a:spcPct val="163000"/>
-              </a:lnSpc>
-              <a:buClrTx/>
-              <a:buSzTx/>
-              <a:buFontTx/>
-            </a:pPr>
-            <a:endParaRPr lang="en-US" sz="1800" spc="40" dirty="0">
-              <a:solidFill>
-                <a:srgbClr val="EF5A28"/>
-              </a:solidFill>
-              <a:latin typeface="Verdana" panose="020B0604030504040204"/>
-              <a:cs typeface="Verdana" panose="020B0604030504040204"/>
-            </a:endParaRPr>
-          </a:p>
-          <a:p>
-            <a:pPr marL="12700" marR="5080" algn="l">
-              <a:lnSpc>
-                <a:spcPct val="163000"/>
-              </a:lnSpc>
-              <a:buClrTx/>
-              <a:buSzTx/>
-              <a:buFontTx/>
-            </a:pPr>
-            <a:r>
-              <a:rPr lang="en-US" sz="1800" spc="40" dirty="0">
-                <a:solidFill>
-                  <a:srgbClr val="EF5A28"/>
-                </a:solidFill>
-                <a:latin typeface="Verdana" panose="020B0604030504040204"/>
-                <a:cs typeface="Verdana" panose="020B0604030504040204"/>
-              </a:rPr>
-              <a:t>	-  Writing JMH benchmarks are similar to writing JUnit test cases.</a:t>
-            </a:r>
-            <a:endParaRPr lang="en-US" sz="1800" spc="40" dirty="0">
-              <a:solidFill>
-                <a:srgbClr val="EF5A28"/>
-              </a:solidFill>
-              <a:latin typeface="Verdana" panose="020B0604030504040204"/>
-              <a:cs typeface="Verdana" panose="020B0604030504040204"/>
-            </a:endParaRPr>
-          </a:p>
-          <a:p>
-            <a:pPr marL="12700" marR="5080" algn="l">
-              <a:lnSpc>
-                <a:spcPct val="163000"/>
-              </a:lnSpc>
-              <a:buClrTx/>
-              <a:buSzTx/>
-              <a:buFontTx/>
-            </a:pPr>
-            <a:endParaRPr lang="en-US" sz="1800" spc="40" dirty="0">
-              <a:solidFill>
-                <a:srgbClr val="EF5A28"/>
-              </a:solidFill>
-              <a:latin typeface="Verdana" panose="020B0604030504040204"/>
-              <a:cs typeface="Verdana" panose="020B0604030504040204"/>
-            </a:endParaRPr>
-          </a:p>
-          <a:p>
-            <a:pPr marL="12700" marR="5080" algn="l">
-              <a:lnSpc>
-                <a:spcPct val="163000"/>
-              </a:lnSpc>
-              <a:buClrTx/>
-              <a:buSzTx/>
-              <a:buFontTx/>
-            </a:pPr>
-            <a:r>
-              <a:rPr lang="en-US" spc="40" dirty="0">
-                <a:solidFill>
-                  <a:srgbClr val="EF5A28"/>
-                </a:solidFill>
-                <a:latin typeface="Verdana" panose="020B0604030504040204"/>
-                <a:cs typeface="Verdana" panose="020B0604030504040204"/>
-                <a:sym typeface="+mn-ea"/>
-              </a:rPr>
-              <a:t>	-  The only difference is with the annotations used in JMH.</a:t>
-            </a:r>
-            <a:r>
-              <a:rPr lang="en-US" sz="1800" spc="40" dirty="0">
-                <a:solidFill>
-                  <a:srgbClr val="EF5A28"/>
-                </a:solidFill>
-                <a:latin typeface="Verdana" panose="020B0604030504040204"/>
-                <a:cs typeface="Verdana" panose="020B0604030504040204"/>
-              </a:rPr>
-              <a:t>	</a:t>
-            </a:r>
-            <a:endParaRPr sz="2400" dirty="0">
-              <a:solidFill>
-                <a:srgbClr val="EF5A28"/>
-              </a:solidFill>
-              <a:latin typeface="Verdana" panose="020B0604030504040204"/>
-              <a:cs typeface="Verdana" panose="020B0604030504040204"/>
-            </a:endParaRPr>
-          </a:p>
-        </p:txBody>
-      </p:sp>
+      </p:pic>
     </p:spTree>
   </p:cSld>
   <p:clrMapOvr>
@@ -6793,7 +6589,7 @@
             <a:pPr algn="ctr"/>
             <a:r>
               <a:rPr lang="en-US"/>
-              <a:t>Maven dependency</a:t>
+              <a:t>Benchmark Modes </a:t>
             </a:r>
             <a:endParaRPr lang="en-US"/>
           </a:p>
@@ -6838,8 +6634,8 @@
         </p:blipFill>
         <p:spPr>
           <a:xfrm>
-            <a:off x="1049020" y="2120265"/>
-            <a:ext cx="10093325" cy="2359025"/>
+            <a:off x="838200" y="1691005"/>
+            <a:ext cx="10584180" cy="3790950"/>
           </a:xfrm>
           <a:prstGeom prst="rect">
             <a:avLst/>
@@ -6876,12 +6672,14 @@
         </p:nvSpPr>
         <p:spPr/>
         <p:txBody>
-          <a:bodyPr/>
+          <a:bodyPr>
+            <a:normAutofit fontScale="90000"/>
+          </a:bodyPr>
           <a:p>
             <a:pPr algn="ctr"/>
             <a:r>
               <a:rPr lang="en-US"/>
-              <a:t>Writing your first JMH benchmark</a:t>
+              <a:t>Blackhole - benchmark without JVM interference</a:t>
             </a:r>
             <a:endParaRPr lang="en-US"/>
           </a:p>
@@ -6910,7 +6708,7 @@
       </p:sp>
       <p:pic>
         <p:nvPicPr>
-          <p:cNvPr id="7" name="Content Placeholder 6"/>
+          <p:cNvPr id="5" name="Content Placeholder 4"/>
           <p:cNvPicPr>
             <a:picLocks noChangeAspect="1"/>
           </p:cNvPicPr>
@@ -6920,14 +6718,39 @@
         </p:nvPicPr>
         <p:blipFill>
           <a:blip r:embed="rId1"/>
+          <a:srcRect l="-5421" t="-2082" r="5421" b="21888"/>
           <a:stretch>
             <a:fillRect/>
           </a:stretch>
         </p:blipFill>
         <p:spPr>
           <a:xfrm>
-            <a:off x="85725" y="2136140"/>
-            <a:ext cx="12106275" cy="1739265"/>
+            <a:off x="73025" y="1662430"/>
+            <a:ext cx="11620500" cy="1100455"/>
+          </a:xfrm>
+          <a:prstGeom prst="rect">
+            <a:avLst/>
+          </a:prstGeom>
+        </p:spPr>
+      </p:pic>
+      <p:pic>
+        <p:nvPicPr>
+          <p:cNvPr id="6" name="Picture 5"/>
+          <p:cNvPicPr>
+            <a:picLocks noChangeAspect="1"/>
+          </p:cNvPicPr>
+          <p:nvPr/>
+        </p:nvPicPr>
+        <p:blipFill>
+          <a:blip r:embed="rId2"/>
+          <a:stretch>
+            <a:fillRect/>
+          </a:stretch>
+        </p:blipFill>
+        <p:spPr>
+          <a:xfrm>
+            <a:off x="730885" y="4026535"/>
+            <a:ext cx="10962640" cy="979805"/>
           </a:xfrm>
           <a:prstGeom prst="rect">
             <a:avLst/>
@@ -6968,8 +6791,10 @@
           <a:p>
             <a:pPr algn="ctr"/>
             <a:r>
-              <a:rPr lang="en-US"/>
-              <a:t>Benchmark Modes </a:t>
+              <a:rPr lang="en-US">
+                <a:sym typeface="+mn-ea"/>
+              </a:rPr>
+              <a:t>Blackhole to the Rescue</a:t>
             </a:r>
             <a:endParaRPr lang="en-US"/>
           </a:p>
@@ -7014,8 +6839,56 @@
         </p:blipFill>
         <p:spPr>
           <a:xfrm>
-            <a:off x="838200" y="1691005"/>
-            <a:ext cx="10584180" cy="3790950"/>
+            <a:off x="702310" y="1795145"/>
+            <a:ext cx="10330815" cy="986155"/>
+          </a:xfrm>
+          <a:prstGeom prst="rect">
+            <a:avLst/>
+          </a:prstGeom>
+        </p:spPr>
+      </p:pic>
+      <p:pic>
+        <p:nvPicPr>
+          <p:cNvPr id="6" name="Picture 5"/>
+          <p:cNvPicPr>
+            <a:picLocks noChangeAspect="1"/>
+          </p:cNvPicPr>
+          <p:nvPr/>
+        </p:nvPicPr>
+        <p:blipFill>
+          <a:blip r:embed="rId2"/>
+          <a:stretch>
+            <a:fillRect/>
+          </a:stretch>
+        </p:blipFill>
+        <p:spPr>
+          <a:xfrm>
+            <a:off x="702310" y="3087370"/>
+            <a:ext cx="10330815" cy="986155"/>
+          </a:xfrm>
+          <a:prstGeom prst="rect">
+            <a:avLst/>
+          </a:prstGeom>
+        </p:spPr>
+      </p:pic>
+      <p:pic>
+        <p:nvPicPr>
+          <p:cNvPr id="7" name="Picture 6"/>
+          <p:cNvPicPr>
+            <a:picLocks noChangeAspect="1"/>
+          </p:cNvPicPr>
+          <p:nvPr/>
+        </p:nvPicPr>
+        <p:blipFill>
+          <a:blip r:embed="rId3"/>
+          <a:stretch>
+            <a:fillRect/>
+          </a:stretch>
+        </p:blipFill>
+        <p:spPr>
+          <a:xfrm>
+            <a:off x="702310" y="4379595"/>
+            <a:ext cx="10331450" cy="935990"/>
           </a:xfrm>
           <a:prstGeom prst="rect">
             <a:avLst/>
@@ -7053,13 +6926,13 @@
         <p:spPr/>
         <p:txBody>
           <a:bodyPr>
-            <a:normAutofit fontScale="90000"/>
+            <a:normAutofit/>
           </a:bodyPr>
           <a:p>
             <a:pPr algn="ctr"/>
             <a:r>
               <a:rPr lang="en-US"/>
-              <a:t>Blackhole - benchmark without JVM interference</a:t>
+              <a:t>@State annotation </a:t>
             </a:r>
             <a:endParaRPr lang="en-US"/>
           </a:p>
@@ -7098,39 +6971,14 @@
         </p:nvPicPr>
         <p:blipFill>
           <a:blip r:embed="rId1"/>
-          <a:srcRect l="-5421" t="-2082" r="5421" b="21888"/>
           <a:stretch>
             <a:fillRect/>
           </a:stretch>
         </p:blipFill>
         <p:spPr>
           <a:xfrm>
-            <a:off x="73025" y="1662430"/>
-            <a:ext cx="11620500" cy="1100455"/>
-          </a:xfrm>
-          <a:prstGeom prst="rect">
-            <a:avLst/>
-          </a:prstGeom>
-        </p:spPr>
-      </p:pic>
-      <p:pic>
-        <p:nvPicPr>
-          <p:cNvPr id="6" name="Picture 5"/>
-          <p:cNvPicPr>
-            <a:picLocks noChangeAspect="1"/>
-          </p:cNvPicPr>
-          <p:nvPr/>
-        </p:nvPicPr>
-        <p:blipFill>
-          <a:blip r:embed="rId2"/>
-          <a:stretch>
-            <a:fillRect/>
-          </a:stretch>
-        </p:blipFill>
-        <p:spPr>
-          <a:xfrm>
-            <a:off x="730885" y="4026535"/>
-            <a:ext cx="10962640" cy="979805"/>
+            <a:off x="0" y="2258060"/>
+            <a:ext cx="12191365" cy="2341245"/>
           </a:xfrm>
           <a:prstGeom prst="rect">
             <a:avLst/>
@@ -7165,16 +7013,19 @@
             <p:ph type="title"/>
           </p:nvPr>
         </p:nvSpPr>
-        <p:spPr/>
+        <p:spPr>
+          <a:xfrm>
+            <a:off x="838200" y="225425"/>
+            <a:ext cx="10515600" cy="1325563"/>
+          </a:xfrm>
+        </p:spPr>
         <p:txBody>
           <a:bodyPr/>
           <a:p>
             <a:pPr algn="ctr"/>
             <a:r>
-              <a:rPr lang="en-US">
-                <a:sym typeface="+mn-ea"/>
-              </a:rPr>
-              <a:t>Blackhole to the Rescue</a:t>
+              <a:rPr lang="en-US"/>
+              <a:t>Comparing two benchmark methods</a:t>
             </a:r>
             <a:endParaRPr lang="en-US"/>
           </a:p>
@@ -7208,7 +7059,7 @@
             <a:picLocks noChangeAspect="1"/>
           </p:cNvPicPr>
           <p:nvPr>
-            <p:ph idx="1"/>
+            <p:ph sz="half" idx="1"/>
           </p:nvPr>
         </p:nvPicPr>
         <p:blipFill>
@@ -7219,8 +7070,8 @@
         </p:blipFill>
         <p:spPr>
           <a:xfrm>
-            <a:off x="702310" y="1795145"/>
-            <a:ext cx="10330815" cy="986155"/>
+            <a:off x="1447800" y="1593215"/>
+            <a:ext cx="3819525" cy="1514475"/>
           </a:xfrm>
           <a:prstGeom prst="rect">
             <a:avLst/>
@@ -7229,11 +7080,13 @@
       </p:pic>
       <p:pic>
         <p:nvPicPr>
-          <p:cNvPr id="6" name="Picture 5"/>
+          <p:cNvPr id="6" name="Content Placeholder 5"/>
           <p:cNvPicPr>
             <a:picLocks noChangeAspect="1"/>
           </p:cNvPicPr>
-          <p:nvPr/>
+          <p:nvPr>
+            <p:ph sz="half" idx="2"/>
+          </p:nvPr>
         </p:nvPicPr>
         <p:blipFill>
           <a:blip r:embed="rId2"/>
@@ -7243,8 +7096,8 @@
         </p:blipFill>
         <p:spPr>
           <a:xfrm>
-            <a:off x="702310" y="3087370"/>
-            <a:ext cx="10330815" cy="986155"/>
+            <a:off x="6299835" y="1592580"/>
+            <a:ext cx="4495800" cy="1515110"/>
           </a:xfrm>
           <a:prstGeom prst="rect">
             <a:avLst/>
@@ -7267,8 +7120,8 @@
         </p:blipFill>
         <p:spPr>
           <a:xfrm>
-            <a:off x="702310" y="4379595"/>
-            <a:ext cx="10331450" cy="935990"/>
+            <a:off x="2862580" y="3244850"/>
+            <a:ext cx="6981825" cy="3476625"/>
           </a:xfrm>
           <a:prstGeom prst="rect">
             <a:avLst/>
@@ -7292,222 +7145,143 @@
         <p:cNvGrpSpPr/>
         <p:nvPr/>
       </p:nvGrpSpPr>
-      <p:grpSpPr/>
-      <p:sp>
-        <p:nvSpPr>
-          <p:cNvPr id="2" name="Title 1"/>
-          <p:cNvSpPr>
-            <a:spLocks noGrp="1"/>
-          </p:cNvSpPr>
-          <p:nvPr>
-            <p:ph type="title"/>
-          </p:nvPr>
-        </p:nvSpPr>
-        <p:spPr/>
-        <p:txBody>
-          <a:bodyPr>
-            <a:normAutofit/>
-          </a:bodyPr>
-          <a:p>
-            <a:pPr algn="ctr"/>
-            <a:r>
-              <a:rPr lang="en-US"/>
-              <a:t>@State annotation </a:t>
-            </a:r>
-            <a:endParaRPr lang="en-US"/>
-          </a:p>
-        </p:txBody>
-      </p:sp>
-      <p:sp>
-        <p:nvSpPr>
-          <p:cNvPr id="4" name="Slide Number Placeholder 3"/>
-          <p:cNvSpPr>
-            <a:spLocks noGrp="1"/>
-          </p:cNvSpPr>
-          <p:nvPr>
-            <p:ph type="sldNum" sz="quarter" idx="12"/>
-          </p:nvPr>
-        </p:nvSpPr>
-        <p:spPr/>
-        <p:txBody>
-          <a:bodyPr/>
-          <a:p>
-            <a:fld id="{9B618960-8005-486C-9A75-10CB2AAC16F9}" type="slidenum">
-              <a:rPr lang="en-US" smtClean="0"/>
-            </a:fld>
-            <a:endParaRPr lang="en-US"/>
-          </a:p>
-        </p:txBody>
-      </p:sp>
+      <p:grpSpPr>
+        <a:xfrm>
+          <a:off x="0" y="0"/>
+          <a:ext cx="0" cy="0"/>
+          <a:chOff x="0" y="0"/>
+          <a:chExt cx="0" cy="0"/>
+        </a:xfrm>
+      </p:grpSpPr>
       <p:pic>
         <p:nvPicPr>
-          <p:cNvPr id="5" name="Content Placeholder 4"/>
-          <p:cNvPicPr>
-            <a:picLocks noChangeAspect="1"/>
-          </p:cNvPicPr>
-          <p:nvPr>
-            <p:ph idx="1"/>
-          </p:nvPr>
+          <p:cNvPr id="2" name="object 2"/>
+          <p:cNvPicPr/>
+          <p:nvPr/>
         </p:nvPicPr>
         <p:blipFill>
-          <a:blip r:embed="rId1"/>
+          <a:blip r:embed="rId1" cstate="print"/>
           <a:stretch>
             <a:fillRect/>
           </a:stretch>
         </p:blipFill>
         <p:spPr>
           <a:xfrm>
-            <a:off x="0" y="2258060"/>
-            <a:ext cx="12191365" cy="2341245"/>
+            <a:off x="0" y="0"/>
+            <a:ext cx="4636008" cy="6858000"/>
           </a:xfrm>
           <a:prstGeom prst="rect">
             <a:avLst/>
           </a:prstGeom>
         </p:spPr>
       </p:pic>
-    </p:spTree>
-  </p:cSld>
-  <p:clrMapOvr>
-    <a:masterClrMapping/>
-  </p:clrMapOvr>
-</p:sld>
-</file>
-
-<file path=ppt/slides/slide29.xml><?xml version="1.0" encoding="utf-8"?>
-<p:sld xmlns:a="http://schemas.openxmlformats.org/drawingml/2006/main" xmlns:r="http://schemas.openxmlformats.org/officeDocument/2006/relationships" xmlns:p="http://schemas.openxmlformats.org/presentationml/2006/main">
-  <p:cSld>
-    <p:spTree>
-      <p:nvGrpSpPr>
-        <p:cNvPr id="1" name=""/>
-        <p:cNvGrpSpPr/>
-        <p:nvPr/>
-      </p:nvGrpSpPr>
-      <p:grpSpPr/>
-      <p:sp>
-        <p:nvSpPr>
-          <p:cNvPr id="2" name="Title 1"/>
-          <p:cNvSpPr>
-            <a:spLocks noGrp="1"/>
-          </p:cNvSpPr>
-          <p:nvPr>
-            <p:ph type="title"/>
-          </p:nvPr>
+      <p:sp>
+        <p:nvSpPr>
+          <p:cNvPr id="17" name="Slide Number Placeholder 16"/>
+          <p:cNvSpPr>
+            <a:spLocks noGrp="1"/>
+          </p:cNvSpPr>
+          <p:nvPr>
+            <p:ph type="sldNum" sz="quarter" idx="7"/>
+          </p:nvPr>
+        </p:nvSpPr>
+        <p:spPr/>
+        <p:txBody>
+          <a:bodyPr/>
+          <a:p>
+            <a:fld id="{B6F15528-21DE-4FAA-801E-634DDDAF4B2B}" type="slidenum">
+              <a:rPr/>
+            </a:fld>
+            <a:endParaRPr/>
+          </a:p>
+        </p:txBody>
+      </p:sp>
+      <p:sp>
+        <p:nvSpPr>
+          <p:cNvPr id="19" name="object 3"/>
+          <p:cNvSpPr txBox="1"/>
+          <p:nvPr/>
         </p:nvSpPr>
         <p:spPr>
           <a:xfrm>
-            <a:off x="838200" y="225425"/>
-            <a:ext cx="10515600" cy="1325563"/>
-          </a:xfrm>
-        </p:spPr>
-        <p:txBody>
-          <a:bodyPr/>
-          <a:p>
-            <a:pPr algn="ctr"/>
-            <a:r>
-              <a:rPr lang="en-US"/>
-              <a:t>Comparing two benchmark methods</a:t>
-            </a:r>
-            <a:endParaRPr lang="en-US"/>
-          </a:p>
-        </p:txBody>
-      </p:sp>
-      <p:sp>
-        <p:nvSpPr>
-          <p:cNvPr id="4" name="Slide Number Placeholder 3"/>
-          <p:cNvSpPr>
-            <a:spLocks noGrp="1"/>
-          </p:cNvSpPr>
-          <p:nvPr>
-            <p:ph type="sldNum" sz="quarter" idx="12"/>
-          </p:nvPr>
-        </p:nvSpPr>
-        <p:spPr/>
-        <p:txBody>
-          <a:bodyPr/>
-          <a:p>
-            <a:fld id="{9B618960-8005-486C-9A75-10CB2AAC16F9}" type="slidenum">
-              <a:rPr lang="en-US" smtClean="0"/>
-            </a:fld>
-            <a:endParaRPr lang="en-US"/>
-          </a:p>
-        </p:txBody>
-      </p:sp>
-      <p:pic>
-        <p:nvPicPr>
-          <p:cNvPr id="5" name="Content Placeholder 4"/>
-          <p:cNvPicPr>
-            <a:picLocks noChangeAspect="1"/>
-          </p:cNvPicPr>
-          <p:nvPr>
-            <p:ph sz="half" idx="1"/>
-          </p:nvPr>
-        </p:nvPicPr>
-        <p:blipFill>
-          <a:blip r:embed="rId1"/>
-          <a:stretch>
-            <a:fillRect/>
-          </a:stretch>
-        </p:blipFill>
-        <p:spPr>
-          <a:xfrm>
-            <a:off x="1447800" y="1593215"/>
-            <a:ext cx="3819525" cy="1514475"/>
+            <a:off x="4872990" y="1551940"/>
+            <a:ext cx="7188835" cy="2418080"/>
           </a:xfrm>
           <a:prstGeom prst="rect">
             <a:avLst/>
           </a:prstGeom>
         </p:spPr>
-      </p:pic>
-      <p:pic>
-        <p:nvPicPr>
-          <p:cNvPr id="6" name="Content Placeholder 5"/>
-          <p:cNvPicPr>
-            <a:picLocks noChangeAspect="1"/>
-          </p:cNvPicPr>
-          <p:nvPr>
-            <p:ph sz="half" idx="2"/>
-          </p:nvPr>
-        </p:nvPicPr>
-        <p:blipFill>
-          <a:blip r:embed="rId2"/>
-          <a:stretch>
-            <a:fillRect/>
-          </a:stretch>
-        </p:blipFill>
+        <p:txBody>
+          <a:bodyPr vert="horz" wrap="square" lIns="0" tIns="12700" rIns="0" bIns="0" rtlCol="0">
+            <a:spAutoFit/>
+          </a:bodyPr>
+          <a:p>
+            <a:pPr marL="12700" marR="5080" algn="l">
+              <a:lnSpc>
+                <a:spcPct val="163000"/>
+              </a:lnSpc>
+              <a:buClrTx/>
+              <a:buSzTx/>
+              <a:buFontTx/>
+            </a:pPr>
+            <a:r>
+              <a:rPr sz="2400" dirty="0">
+                <a:solidFill>
+                  <a:srgbClr val="EF5A28"/>
+                </a:solidFill>
+                <a:latin typeface="Verdana" panose="020B0604030504040204"/>
+                <a:cs typeface="Verdana" panose="020B0604030504040204"/>
+                <a:sym typeface="+mn-ea"/>
+              </a:rPr>
+              <a:t>JMH is a Java harness for building, running, and analysing nano/micro/milli/macro benchmarks written in Java and other languages targeting the JVM.</a:t>
+            </a:r>
+            <a:endParaRPr sz="2400" dirty="0">
+              <a:solidFill>
+                <a:srgbClr val="EF5A28"/>
+              </a:solidFill>
+              <a:latin typeface="Verdana" panose="020B0604030504040204"/>
+              <a:cs typeface="Verdana" panose="020B0604030504040204"/>
+            </a:endParaRPr>
+          </a:p>
+        </p:txBody>
+      </p:sp>
+      <p:sp>
+        <p:nvSpPr>
+          <p:cNvPr id="3" name="Text Box 2"/>
+          <p:cNvSpPr txBox="1"/>
+          <p:nvPr/>
+        </p:nvSpPr>
         <p:spPr>
           <a:xfrm>
-            <a:off x="6299835" y="1592580"/>
-            <a:ext cx="4495800" cy="1515110"/>
+            <a:off x="1112520" y="1760220"/>
+            <a:ext cx="2792095" cy="768350"/>
           </a:xfrm>
           <a:prstGeom prst="rect">
             <a:avLst/>
           </a:prstGeom>
+          <a:noFill/>
         </p:spPr>
-      </p:pic>
-      <p:pic>
-        <p:nvPicPr>
-          <p:cNvPr id="7" name="Picture 6"/>
-          <p:cNvPicPr>
-            <a:picLocks noChangeAspect="1"/>
-          </p:cNvPicPr>
-          <p:nvPr/>
-        </p:nvPicPr>
-        <p:blipFill>
-          <a:blip r:embed="rId3"/>
-          <a:stretch>
-            <a:fillRect/>
-          </a:stretch>
-        </p:blipFill>
-        <p:spPr>
-          <a:xfrm>
-            <a:off x="2862580" y="3244850"/>
-            <a:ext cx="6981825" cy="3476625"/>
-          </a:xfrm>
-          <a:prstGeom prst="rect">
-            <a:avLst/>
-          </a:prstGeom>
-        </p:spPr>
-      </p:pic>
+        <p:txBody>
+          <a:bodyPr wrap="square" rtlCol="0">
+            <a:spAutoFit/>
+          </a:bodyPr>
+          <a:p>
+            <a:r>
+              <a:rPr lang="en-US" sz="4400">
+                <a:solidFill>
+                  <a:schemeClr val="bg1"/>
+                </a:solidFill>
+              </a:rPr>
+              <a:t>Summary</a:t>
+            </a:r>
+            <a:endParaRPr lang="en-US" sz="4400">
+              <a:solidFill>
+                <a:schemeClr val="bg1"/>
+              </a:solidFill>
+            </a:endParaRPr>
+          </a:p>
+        </p:txBody>
+      </p:sp>
     </p:spTree>
   </p:cSld>
   <p:clrMapOvr>
@@ -7938,160 +7712,6 @@
               </a:solidFill>
               <a:latin typeface="Verdana" panose="020B0604030504040204"/>
               <a:cs typeface="Verdana" panose="020B0604030504040204"/>
-            </a:endParaRPr>
-          </a:p>
-        </p:txBody>
-      </p:sp>
-    </p:spTree>
-  </p:cSld>
-  <p:clrMapOvr>
-    <a:masterClrMapping/>
-  </p:clrMapOvr>
-</p:sld>
-</file>
-
-<file path=ppt/slides/slide30.xml><?xml version="1.0" encoding="utf-8"?>
-<p:sld xmlns:a="http://schemas.openxmlformats.org/drawingml/2006/main" xmlns:r="http://schemas.openxmlformats.org/officeDocument/2006/relationships" xmlns:p="http://schemas.openxmlformats.org/presentationml/2006/main">
-  <p:cSld>
-    <p:spTree>
-      <p:nvGrpSpPr>
-        <p:cNvPr id="1" name=""/>
-        <p:cNvGrpSpPr/>
-        <p:nvPr/>
-      </p:nvGrpSpPr>
-      <p:grpSpPr>
-        <a:xfrm>
-          <a:off x="0" y="0"/>
-          <a:ext cx="0" cy="0"/>
-          <a:chOff x="0" y="0"/>
-          <a:chExt cx="0" cy="0"/>
-        </a:xfrm>
-      </p:grpSpPr>
-      <p:pic>
-        <p:nvPicPr>
-          <p:cNvPr id="2" name="object 2"/>
-          <p:cNvPicPr/>
-          <p:nvPr/>
-        </p:nvPicPr>
-        <p:blipFill>
-          <a:blip r:embed="rId1" cstate="print"/>
-          <a:stretch>
-            <a:fillRect/>
-          </a:stretch>
-        </p:blipFill>
-        <p:spPr>
-          <a:xfrm>
-            <a:off x="0" y="0"/>
-            <a:ext cx="4636008" cy="6858000"/>
-          </a:xfrm>
-          <a:prstGeom prst="rect">
-            <a:avLst/>
-          </a:prstGeom>
-        </p:spPr>
-      </p:pic>
-      <p:sp>
-        <p:nvSpPr>
-          <p:cNvPr id="17" name="Slide Number Placeholder 16"/>
-          <p:cNvSpPr>
-            <a:spLocks noGrp="1"/>
-          </p:cNvSpPr>
-          <p:nvPr>
-            <p:ph type="sldNum" sz="quarter" idx="7"/>
-          </p:nvPr>
-        </p:nvSpPr>
-        <p:spPr/>
-        <p:txBody>
-          <a:bodyPr/>
-          <a:p>
-            <a:fld id="{B6F15528-21DE-4FAA-801E-634DDDAF4B2B}" type="slidenum">
-              <a:rPr/>
-            </a:fld>
-            <a:endParaRPr/>
-          </a:p>
-        </p:txBody>
-      </p:sp>
-      <p:sp>
-        <p:nvSpPr>
-          <p:cNvPr id="19" name="object 3"/>
-          <p:cNvSpPr txBox="1"/>
-          <p:nvPr/>
-        </p:nvSpPr>
-        <p:spPr>
-          <a:xfrm>
-            <a:off x="4872990" y="1551940"/>
-            <a:ext cx="7188835" cy="2418080"/>
-          </a:xfrm>
-          <a:prstGeom prst="rect">
-            <a:avLst/>
-          </a:prstGeom>
-        </p:spPr>
-        <p:txBody>
-          <a:bodyPr vert="horz" wrap="square" lIns="0" tIns="12700" rIns="0" bIns="0" rtlCol="0">
-            <a:spAutoFit/>
-          </a:bodyPr>
-          <a:p>
-            <a:pPr marL="12700" marR="5080" algn="l">
-              <a:lnSpc>
-                <a:spcPct val="163000"/>
-              </a:lnSpc>
-              <a:buClrTx/>
-              <a:buSzTx/>
-              <a:buFontTx/>
-            </a:pPr>
-            <a:r>
-              <a:rPr sz="2400" dirty="0">
-                <a:solidFill>
-                  <a:srgbClr val="EF5A28"/>
-                </a:solidFill>
-                <a:latin typeface="Verdana" panose="020B0604030504040204"/>
-                <a:cs typeface="Verdana" panose="020B0604030504040204"/>
-                <a:sym typeface="+mn-ea"/>
-              </a:rPr>
-              <a:t>JMH is a Java harness for building, running, and analysing nano/micro/milli/macro benchmarks written in Java and other languages targeting the JVM.</a:t>
-            </a:r>
-            <a:endParaRPr sz="2400" dirty="0">
-              <a:solidFill>
-                <a:srgbClr val="EF5A28"/>
-              </a:solidFill>
-              <a:latin typeface="Verdana" panose="020B0604030504040204"/>
-              <a:cs typeface="Verdana" panose="020B0604030504040204"/>
-            </a:endParaRPr>
-          </a:p>
-        </p:txBody>
-      </p:sp>
-      <p:sp>
-        <p:nvSpPr>
-          <p:cNvPr id="3" name="Text Box 2"/>
-          <p:cNvSpPr txBox="1"/>
-          <p:nvPr/>
-        </p:nvSpPr>
-        <p:spPr>
-          <a:xfrm>
-            <a:off x="1112520" y="1760220"/>
-            <a:ext cx="2792095" cy="768350"/>
-          </a:xfrm>
-          <a:prstGeom prst="rect">
-            <a:avLst/>
-          </a:prstGeom>
-          <a:noFill/>
-        </p:spPr>
-        <p:txBody>
-          <a:bodyPr wrap="square" rtlCol="0">
-            <a:spAutoFit/>
-          </a:bodyPr>
-          <a:p>
-            <a:r>
-              <a:rPr lang="en-US" sz="4400">
-                <a:solidFill>
-                  <a:schemeClr val="bg1"/>
-                </a:solidFill>
-              </a:rPr>
-              <a:t>Summary</a:t>
-            </a:r>
-            <a:endParaRPr lang="en-US" sz="4400">
-              <a:solidFill>
-                <a:schemeClr val="bg1"/>
-              </a:solidFill>
             </a:endParaRPr>
           </a:p>
         </p:txBody>

</xml_diff>

<commit_message>
Added Slides and Supporting Materials for Day 5
</commit_message>
<xml_diff>
--- a/Day 5/Slides/1. JUnit 4/junit4-for-unit-testing-slides.pptx
+++ b/Day 5/Slides/1. JUnit 4/junit4-for-unit-testing-slides.pptx
@@ -5,7 +5,7 @@
     <p:sldMasterId id="2147483648" r:id="rId1"/>
   </p:sldMasterIdLst>
   <p:notesMasterIdLst>
-    <p:notesMasterId r:id="rId31"/>
+    <p:notesMasterId r:id="rId33"/>
   </p:notesMasterIdLst>
   <p:sldIdLst>
     <p:sldId id="258" r:id="rId3"/>
@@ -22,20 +22,22 @@
     <p:sldId id="275" r:id="rId14"/>
     <p:sldId id="270" r:id="rId15"/>
     <p:sldId id="274" r:id="rId16"/>
-    <p:sldId id="278" r:id="rId17"/>
-    <p:sldId id="271" r:id="rId18"/>
-    <p:sldId id="267" r:id="rId19"/>
-    <p:sldId id="268" r:id="rId20"/>
-    <p:sldId id="284" r:id="rId21"/>
-    <p:sldId id="285" r:id="rId22"/>
-    <p:sldId id="287" r:id="rId23"/>
-    <p:sldId id="286" r:id="rId24"/>
-    <p:sldId id="288" r:id="rId25"/>
-    <p:sldId id="289" r:id="rId26"/>
-    <p:sldId id="290" r:id="rId27"/>
-    <p:sldId id="291" r:id="rId28"/>
-    <p:sldId id="292" r:id="rId29"/>
-    <p:sldId id="295" r:id="rId30"/>
+    <p:sldId id="276" r:id="rId17"/>
+    <p:sldId id="277" r:id="rId18"/>
+    <p:sldId id="278" r:id="rId19"/>
+    <p:sldId id="271" r:id="rId20"/>
+    <p:sldId id="267" r:id="rId21"/>
+    <p:sldId id="268" r:id="rId22"/>
+    <p:sldId id="284" r:id="rId23"/>
+    <p:sldId id="285" r:id="rId24"/>
+    <p:sldId id="287" r:id="rId25"/>
+    <p:sldId id="286" r:id="rId26"/>
+    <p:sldId id="288" r:id="rId27"/>
+    <p:sldId id="289" r:id="rId28"/>
+    <p:sldId id="290" r:id="rId29"/>
+    <p:sldId id="291" r:id="rId30"/>
+    <p:sldId id="292" r:id="rId31"/>
+    <p:sldId id="295" r:id="rId32"/>
   </p:sldIdLst>
   <p:sldSz cx="12192000" cy="6858000"/>
   <p:notesSz cx="6858000" cy="9144000"/>
@@ -4415,677 +4417,6 @@
           <a:chExt cx="0" cy="0"/>
         </a:xfrm>
       </p:grpSpPr>
-      <p:sp>
-        <p:nvSpPr>
-          <p:cNvPr id="2" name="Title 1"/>
-          <p:cNvSpPr>
-            <a:spLocks noGrp="1"/>
-          </p:cNvSpPr>
-          <p:nvPr>
-            <p:ph type="ctrTitle"/>
-          </p:nvPr>
-        </p:nvSpPr>
-        <p:spPr>
-          <a:xfrm>
-            <a:off x="1524000" y="249555"/>
-            <a:ext cx="9144000" cy="554990"/>
-          </a:xfrm>
-        </p:spPr>
-        <p:txBody>
-          <a:bodyPr>
-            <a:normAutofit fontScale="90000"/>
-          </a:bodyPr>
-          <a:lstStyle/>
-          <a:p>
-            <a:pPr marL="12700" algn="ctr">
-              <a:lnSpc>
-                <a:spcPct val="100000"/>
-              </a:lnSpc>
-              <a:spcBef>
-                <a:spcPts val="100"/>
-              </a:spcBef>
-              <a:buClrTx/>
-              <a:buSzTx/>
-              <a:buFontTx/>
-            </a:pPr>
-            <a:r>
-              <a:rPr sz="3600" kern="0" spc="35" dirty="0">
-                <a:solidFill>
-                  <a:srgbClr val="404040"/>
-                </a:solidFill>
-                <a:latin typeface="Verdana" panose="020B0604030504040204"/>
-                <a:cs typeface="Verdana" panose="020B0604030504040204"/>
-              </a:rPr>
-              <a:t>Test </a:t>
-            </a:r>
-            <a:r>
-              <a:rPr lang="en-US" sz="3600" kern="0" spc="35" dirty="0">
-                <a:solidFill>
-                  <a:srgbClr val="404040"/>
-                </a:solidFill>
-                <a:latin typeface="Verdana" panose="020B0604030504040204"/>
-                <a:cs typeface="Verdana" panose="020B0604030504040204"/>
-              </a:rPr>
-              <a:t>Suites</a:t>
-            </a:r>
-            <a:endParaRPr lang="en-US" sz="3600" kern="0" spc="35" dirty="0">
-              <a:solidFill>
-                <a:srgbClr val="404040"/>
-              </a:solidFill>
-              <a:latin typeface="Verdana" panose="020B0604030504040204"/>
-              <a:cs typeface="Verdana" panose="020B0604030504040204"/>
-            </a:endParaRPr>
-          </a:p>
-        </p:txBody>
-      </p:sp>
-      <p:sp>
-        <p:nvSpPr>
-          <p:cNvPr id="4" name="Slide Number Placeholder 3"/>
-          <p:cNvSpPr>
-            <a:spLocks noGrp="1"/>
-          </p:cNvSpPr>
-          <p:nvPr>
-            <p:ph type="sldNum" sz="quarter" idx="12"/>
-          </p:nvPr>
-        </p:nvSpPr>
-        <p:spPr/>
-        <p:txBody>
-          <a:bodyPr/>
-          <a:p>
-            <a:fld id="{9B618960-8005-486C-9A75-10CB2AAC16F9}" type="slidenum">
-              <a:rPr lang="en-US" smtClean="0"/>
-            </a:fld>
-            <a:endParaRPr lang="en-US"/>
-          </a:p>
-        </p:txBody>
-      </p:sp>
-      <p:graphicFrame>
-        <p:nvGraphicFramePr>
-          <p:cNvPr id="5" name="Object 4"/>
-          <p:cNvGraphicFramePr/>
-          <p:nvPr/>
-        </p:nvGraphicFramePr>
-        <p:xfrm>
-          <a:off x="2853690" y="1170305"/>
-          <a:ext cx="6941185" cy="4819650"/>
-        </p:xfrm>
-        <a:graphic>
-          <a:graphicData uri="http://schemas.openxmlformats.org/presentationml/2006/ole">
-            <mc:AlternateContent xmlns:mc="http://schemas.openxmlformats.org/markup-compatibility/2006">
-              <mc:Choice xmlns:v="urn:schemas-microsoft-com:vml" Requires="v">
-                <p:oleObj spid="_x0000_s6" name="" r:id="rId1" imgW="5191125" imgH="3781425" progId="Paint.Picture">
-                  <p:embed/>
-                </p:oleObj>
-              </mc:Choice>
-              <mc:Fallback>
-                <p:oleObj name="" r:id="rId1" imgW="5191125" imgH="3781425" progId="Paint.Picture">
-                  <p:embed/>
-                  <p:pic>
-                    <p:nvPicPr>
-                      <p:cNvPr id="0" name="Picture 5"/>
-                      <p:cNvPicPr/>
-                      <p:nvPr/>
-                    </p:nvPicPr>
-                    <p:blipFill>
-                      <a:blip r:embed="rId2"/>
-                      <a:stretch>
-                        <a:fillRect/>
-                      </a:stretch>
-                    </p:blipFill>
-                    <p:spPr>
-                      <a:xfrm>
-                        <a:off x="2853690" y="1170305"/>
-                        <a:ext cx="6941185" cy="4819650"/>
-                      </a:xfrm>
-                      <a:prstGeom prst="rect">
-                        <a:avLst/>
-                      </a:prstGeom>
-                    </p:spPr>
-                  </p:pic>
-                </p:oleObj>
-              </mc:Fallback>
-            </mc:AlternateContent>
-          </a:graphicData>
-        </a:graphic>
-      </p:graphicFrame>
-    </p:spTree>
-  </p:cSld>
-  <p:clrMapOvr>
-    <a:masterClrMapping/>
-  </p:clrMapOvr>
-</p:sld>
-</file>
-
-<file path=ppt/slides/slide17.xml><?xml version="1.0" encoding="utf-8"?>
-<p:sld xmlns:a="http://schemas.openxmlformats.org/drawingml/2006/main" xmlns:r="http://schemas.openxmlformats.org/officeDocument/2006/relationships" xmlns:p="http://schemas.openxmlformats.org/presentationml/2006/main">
-  <p:cSld>
-    <p:spTree>
-      <p:nvGrpSpPr>
-        <p:cNvPr id="1" name=""/>
-        <p:cNvGrpSpPr/>
-        <p:nvPr/>
-      </p:nvGrpSpPr>
-      <p:grpSpPr>
-        <a:xfrm>
-          <a:off x="0" y="0"/>
-          <a:ext cx="0" cy="0"/>
-          <a:chOff x="0" y="0"/>
-          <a:chExt cx="0" cy="0"/>
-        </a:xfrm>
-      </p:grpSpPr>
-      <p:sp>
-        <p:nvSpPr>
-          <p:cNvPr id="2" name="Title 1"/>
-          <p:cNvSpPr>
-            <a:spLocks noGrp="1"/>
-          </p:cNvSpPr>
-          <p:nvPr>
-            <p:ph type="ctrTitle"/>
-          </p:nvPr>
-        </p:nvSpPr>
-        <p:spPr>
-          <a:xfrm>
-            <a:off x="1524000" y="249555"/>
-            <a:ext cx="9144000" cy="554990"/>
-          </a:xfrm>
-        </p:spPr>
-        <p:txBody>
-          <a:bodyPr>
-            <a:normAutofit fontScale="90000"/>
-          </a:bodyPr>
-          <a:lstStyle/>
-          <a:p>
-            <a:pPr marL="12700" algn="ctr">
-              <a:lnSpc>
-                <a:spcPct val="100000"/>
-              </a:lnSpc>
-              <a:spcBef>
-                <a:spcPts val="100"/>
-              </a:spcBef>
-              <a:buClrTx/>
-              <a:buSzTx/>
-              <a:buFontTx/>
-            </a:pPr>
-            <a:r>
-              <a:rPr sz="3600" kern="0" spc="35" dirty="0">
-                <a:solidFill>
-                  <a:srgbClr val="404040"/>
-                </a:solidFill>
-                <a:latin typeface="Verdana" panose="020B0604030504040204"/>
-                <a:cs typeface="Verdana" panose="020B0604030504040204"/>
-              </a:rPr>
-              <a:t>What Is a Parameterized Test?</a:t>
-            </a:r>
-            <a:endParaRPr sz="3600" kern="0" spc="35" dirty="0">
-              <a:solidFill>
-                <a:srgbClr val="404040"/>
-              </a:solidFill>
-              <a:latin typeface="Verdana" panose="020B0604030504040204"/>
-              <a:cs typeface="Verdana" panose="020B0604030504040204"/>
-            </a:endParaRPr>
-          </a:p>
-        </p:txBody>
-      </p:sp>
-      <p:sp>
-        <p:nvSpPr>
-          <p:cNvPr id="4" name="Slide Number Placeholder 3"/>
-          <p:cNvSpPr>
-            <a:spLocks noGrp="1"/>
-          </p:cNvSpPr>
-          <p:nvPr>
-            <p:ph type="sldNum" sz="quarter" idx="12"/>
-          </p:nvPr>
-        </p:nvSpPr>
-        <p:spPr/>
-        <p:txBody>
-          <a:bodyPr/>
-          <a:p>
-            <a:fld id="{9B618960-8005-486C-9A75-10CB2AAC16F9}" type="slidenum">
-              <a:rPr lang="en-US" smtClean="0"/>
-            </a:fld>
-            <a:endParaRPr lang="en-US"/>
-          </a:p>
-        </p:txBody>
-      </p:sp>
-      <p:sp>
-        <p:nvSpPr>
-          <p:cNvPr id="19" name="object 3"/>
-          <p:cNvSpPr txBox="1"/>
-          <p:nvPr/>
-        </p:nvSpPr>
-        <p:spPr>
-          <a:xfrm>
-            <a:off x="2266950" y="928370"/>
-            <a:ext cx="9351645" cy="5729605"/>
-          </a:xfrm>
-          <a:prstGeom prst="rect">
-            <a:avLst/>
-          </a:prstGeom>
-        </p:spPr>
-        <p:txBody>
-          <a:bodyPr vert="horz" wrap="square" lIns="0" tIns="12700" rIns="0" bIns="0" rtlCol="0">
-            <a:spAutoFit/>
-          </a:bodyPr>
-          <a:p>
-            <a:pPr marL="12700" marR="5080" algn="l">
-              <a:lnSpc>
-                <a:spcPct val="163000"/>
-              </a:lnSpc>
-              <a:buClrTx/>
-              <a:buSzTx/>
-              <a:buFontTx/>
-            </a:pPr>
-            <a:r>
-              <a:rPr lang="en-US" sz="2400" dirty="0">
-                <a:solidFill>
-                  <a:srgbClr val="EF5A28"/>
-                </a:solidFill>
-                <a:latin typeface="Verdana" panose="020B0604030504040204"/>
-                <a:cs typeface="Verdana" panose="020B0604030504040204"/>
-              </a:rPr>
-              <a:t>W</a:t>
-            </a:r>
-            <a:r>
-              <a:rPr sz="2400" dirty="0">
-                <a:solidFill>
-                  <a:srgbClr val="EF5A28"/>
-                </a:solidFill>
-                <a:latin typeface="Verdana" panose="020B0604030504040204"/>
-                <a:cs typeface="Verdana" panose="020B0604030504040204"/>
-              </a:rPr>
-              <a:t>hen it fullfills all the following requirements:</a:t>
-            </a:r>
-            <a:r>
-              <a:rPr lang="en-US" sz="1800" spc="40" dirty="0">
-                <a:solidFill>
-                  <a:srgbClr val="EF5A28"/>
-                </a:solidFill>
-                <a:latin typeface="Verdana" panose="020B0604030504040204"/>
-                <a:cs typeface="Verdana" panose="020B0604030504040204"/>
-              </a:rPr>
-              <a:t>	</a:t>
-            </a:r>
-            <a:endParaRPr lang="en-US" sz="1800" spc="40" dirty="0">
-              <a:solidFill>
-                <a:srgbClr val="EF5A28"/>
-              </a:solidFill>
-              <a:latin typeface="Verdana" panose="020B0604030504040204"/>
-              <a:cs typeface="Verdana" panose="020B0604030504040204"/>
-            </a:endParaRPr>
-          </a:p>
-          <a:p>
-            <a:pPr marL="12700" marR="5080" algn="l">
-              <a:lnSpc>
-                <a:spcPct val="163000"/>
-              </a:lnSpc>
-              <a:buClrTx/>
-              <a:buSzTx/>
-              <a:buFontTx/>
-            </a:pPr>
-            <a:endParaRPr lang="en-US" sz="1800" spc="40" dirty="0">
-              <a:solidFill>
-                <a:srgbClr val="EF5A28"/>
-              </a:solidFill>
-              <a:latin typeface="Verdana" panose="020B0604030504040204"/>
-              <a:cs typeface="Verdana" panose="020B0604030504040204"/>
-            </a:endParaRPr>
-          </a:p>
-          <a:p>
-            <a:pPr marL="12700" marR="5080" algn="l">
-              <a:lnSpc>
-                <a:spcPct val="163000"/>
-              </a:lnSpc>
-              <a:buClrTx/>
-              <a:buSzTx/>
-              <a:buFontTx/>
-            </a:pPr>
-            <a:r>
-              <a:rPr lang="en-US" sz="1800" spc="40" dirty="0">
-                <a:solidFill>
-                  <a:srgbClr val="EF5A28"/>
-                </a:solidFill>
-                <a:latin typeface="Verdana" panose="020B0604030504040204"/>
-                <a:cs typeface="Verdana" panose="020B0604030504040204"/>
-              </a:rPr>
-              <a:t>	- The class is annotated with @RunWith(Parameterized.class).</a:t>
-            </a:r>
-            <a:endParaRPr lang="en-US" sz="1800" spc="40" dirty="0">
-              <a:solidFill>
-                <a:srgbClr val="EF5A28"/>
-              </a:solidFill>
-              <a:latin typeface="Verdana" panose="020B0604030504040204"/>
-              <a:cs typeface="Verdana" panose="020B0604030504040204"/>
-            </a:endParaRPr>
-          </a:p>
-          <a:p>
-            <a:pPr marL="12700" marR="5080" algn="l">
-              <a:lnSpc>
-                <a:spcPct val="163000"/>
-              </a:lnSpc>
-              <a:buClrTx/>
-              <a:buSzTx/>
-              <a:buFontTx/>
-            </a:pPr>
-            <a:endParaRPr lang="en-US" sz="1800" spc="40" dirty="0">
-              <a:solidFill>
-                <a:srgbClr val="EF5A28"/>
-              </a:solidFill>
-              <a:latin typeface="Verdana" panose="020B0604030504040204"/>
-              <a:cs typeface="Verdana" panose="020B0604030504040204"/>
-            </a:endParaRPr>
-          </a:p>
-          <a:p>
-            <a:pPr marL="12700" marR="5080" algn="l">
-              <a:lnSpc>
-                <a:spcPct val="163000"/>
-              </a:lnSpc>
-              <a:buClrTx/>
-              <a:buSzTx/>
-              <a:buFontTx/>
-            </a:pPr>
-            <a:r>
-              <a:rPr lang="en-US" sz="1800" spc="40" dirty="0">
-                <a:solidFill>
-                  <a:srgbClr val="EF5A28"/>
-                </a:solidFill>
-                <a:latin typeface="Verdana" panose="020B0604030504040204"/>
-                <a:cs typeface="Verdana" panose="020B0604030504040204"/>
-              </a:rPr>
-              <a:t>	- The class has a single constructor that stores the test data</a:t>
-            </a:r>
-            <a:endParaRPr lang="en-US" sz="1800" spc="40" dirty="0">
-              <a:solidFill>
-                <a:srgbClr val="EF5A28"/>
-              </a:solidFill>
-              <a:latin typeface="Verdana" panose="020B0604030504040204"/>
-              <a:cs typeface="Verdana" panose="020B0604030504040204"/>
-            </a:endParaRPr>
-          </a:p>
-          <a:p>
-            <a:pPr marL="12700" marR="5080" algn="l">
-              <a:lnSpc>
-                <a:spcPct val="163000"/>
-              </a:lnSpc>
-              <a:buClrTx/>
-              <a:buSzTx/>
-              <a:buFontTx/>
-            </a:pPr>
-            <a:endParaRPr lang="en-US" sz="1800" spc="40" dirty="0">
-              <a:solidFill>
-                <a:srgbClr val="EF5A28"/>
-              </a:solidFill>
-              <a:latin typeface="Verdana" panose="020B0604030504040204"/>
-              <a:cs typeface="Verdana" panose="020B0604030504040204"/>
-            </a:endParaRPr>
-          </a:p>
-          <a:p>
-            <a:pPr marL="12700" marR="5080" algn="l">
-              <a:lnSpc>
-                <a:spcPct val="163000"/>
-              </a:lnSpc>
-              <a:buClrTx/>
-              <a:buSzTx/>
-              <a:buFontTx/>
-            </a:pPr>
-            <a:r>
-              <a:rPr sz="2400" dirty="0">
-                <a:solidFill>
-                  <a:srgbClr val="EF5A28"/>
-                </a:solidFill>
-                <a:latin typeface="Verdana" panose="020B0604030504040204"/>
-                <a:cs typeface="Verdana" panose="020B0604030504040204"/>
-              </a:rPr>
-              <a:t>	</a:t>
-            </a:r>
-            <a:r>
-              <a:rPr lang="en-US" sz="2400" dirty="0">
-                <a:solidFill>
-                  <a:srgbClr val="EF5A28"/>
-                </a:solidFill>
-                <a:latin typeface="Verdana" panose="020B0604030504040204"/>
-                <a:cs typeface="Verdana" panose="020B0604030504040204"/>
-              </a:rPr>
-              <a:t>- </a:t>
-            </a:r>
-            <a:r>
-              <a:rPr lang="en-US" sz="1800" spc="40" dirty="0">
-                <a:solidFill>
-                  <a:srgbClr val="EF5A28"/>
-                </a:solidFill>
-                <a:latin typeface="Verdana" panose="020B0604030504040204"/>
-                <a:cs typeface="Verdana" panose="020B0604030504040204"/>
-              </a:rPr>
-              <a:t>The class has a static method that generates and returns test data   	   and is annotated with the @Parameters annotation.</a:t>
-            </a:r>
-            <a:endParaRPr lang="en-US" sz="1800" spc="40" dirty="0">
-              <a:solidFill>
-                <a:srgbClr val="EF5A28"/>
-              </a:solidFill>
-              <a:latin typeface="Verdana" panose="020B0604030504040204"/>
-              <a:cs typeface="Verdana" panose="020B0604030504040204"/>
-            </a:endParaRPr>
-          </a:p>
-          <a:p>
-            <a:pPr marL="12700" marR="5080" algn="l">
-              <a:lnSpc>
-                <a:spcPct val="163000"/>
-              </a:lnSpc>
-              <a:buClrTx/>
-              <a:buSzTx/>
-              <a:buFontTx/>
-            </a:pPr>
-            <a:endParaRPr lang="en-US" sz="1800" spc="40" dirty="0">
-              <a:solidFill>
-                <a:srgbClr val="EF5A28"/>
-              </a:solidFill>
-              <a:latin typeface="Verdana" panose="020B0604030504040204"/>
-              <a:cs typeface="Verdana" panose="020B0604030504040204"/>
-            </a:endParaRPr>
-          </a:p>
-          <a:p>
-            <a:pPr marL="12700" marR="5080" algn="l">
-              <a:lnSpc>
-                <a:spcPct val="163000"/>
-              </a:lnSpc>
-              <a:buClrTx/>
-              <a:buSzTx/>
-              <a:buFontTx/>
-            </a:pPr>
-            <a:r>
-              <a:rPr lang="en-US" sz="1800" spc="40" dirty="0">
-                <a:solidFill>
-                  <a:srgbClr val="EF5A28"/>
-                </a:solidFill>
-                <a:latin typeface="Verdana" panose="020B0604030504040204"/>
-                <a:cs typeface="Verdana" panose="020B0604030504040204"/>
-              </a:rPr>
-              <a:t>	- The class has a test, which obviously means that it needs a method          	   annotated with the @Test annotation.</a:t>
-            </a:r>
-            <a:endParaRPr lang="en-US" sz="1800" spc="40" dirty="0">
-              <a:solidFill>
-                <a:srgbClr val="EF5A28"/>
-              </a:solidFill>
-              <a:latin typeface="Verdana" panose="020B0604030504040204"/>
-              <a:cs typeface="Verdana" panose="020B0604030504040204"/>
-            </a:endParaRPr>
-          </a:p>
-          <a:p>
-            <a:pPr marL="12700" marR="5080" algn="l">
-              <a:lnSpc>
-                <a:spcPct val="163000"/>
-              </a:lnSpc>
-              <a:buClrTx/>
-              <a:buSzTx/>
-              <a:buFontTx/>
-            </a:pPr>
-            <a:r>
-              <a:rPr lang="en-US" sz="1800" spc="40" dirty="0">
-                <a:solidFill>
-                  <a:srgbClr val="EF5A28"/>
-                </a:solidFill>
-                <a:latin typeface="Verdana" panose="020B0604030504040204"/>
-                <a:cs typeface="Verdana" panose="020B0604030504040204"/>
-              </a:rPr>
-              <a:t>	</a:t>
-            </a:r>
-            <a:endParaRPr sz="2400" dirty="0">
-              <a:solidFill>
-                <a:srgbClr val="EF5A28"/>
-              </a:solidFill>
-              <a:latin typeface="Verdana" panose="020B0604030504040204"/>
-              <a:cs typeface="Verdana" panose="020B0604030504040204"/>
-            </a:endParaRPr>
-          </a:p>
-        </p:txBody>
-      </p:sp>
-    </p:spTree>
-  </p:cSld>
-  <p:clrMapOvr>
-    <a:masterClrMapping/>
-  </p:clrMapOvr>
-</p:sld>
-</file>
-
-<file path=ppt/slides/slide18.xml><?xml version="1.0" encoding="utf-8"?>
-<p:sld xmlns:a="http://schemas.openxmlformats.org/drawingml/2006/main" xmlns:r="http://schemas.openxmlformats.org/officeDocument/2006/relationships" xmlns:p="http://schemas.openxmlformats.org/presentationml/2006/main">
-  <p:cSld>
-    <p:spTree>
-      <p:nvGrpSpPr>
-        <p:cNvPr id="1" name=""/>
-        <p:cNvGrpSpPr/>
-        <p:nvPr/>
-      </p:nvGrpSpPr>
-      <p:grpSpPr>
-        <a:xfrm>
-          <a:off x="0" y="0"/>
-          <a:ext cx="0" cy="0"/>
-          <a:chOff x="0" y="0"/>
-          <a:chExt cx="0" cy="0"/>
-        </a:xfrm>
-      </p:grpSpPr>
-      <p:sp>
-        <p:nvSpPr>
-          <p:cNvPr id="2" name="Title 1"/>
-          <p:cNvSpPr>
-            <a:spLocks noGrp="1"/>
-          </p:cNvSpPr>
-          <p:nvPr>
-            <p:ph type="ctrTitle"/>
-          </p:nvPr>
-        </p:nvSpPr>
-        <p:spPr>
-          <a:xfrm>
-            <a:off x="1524000" y="249555"/>
-            <a:ext cx="9144000" cy="554990"/>
-          </a:xfrm>
-        </p:spPr>
-        <p:txBody>
-          <a:bodyPr>
-            <a:normAutofit fontScale="90000"/>
-          </a:bodyPr>
-          <a:lstStyle/>
-          <a:p>
-            <a:pPr marL="12700" algn="ctr">
-              <a:lnSpc>
-                <a:spcPct val="100000"/>
-              </a:lnSpc>
-              <a:spcBef>
-                <a:spcPts val="100"/>
-              </a:spcBef>
-              <a:buClrTx/>
-              <a:buSzTx/>
-              <a:buFontTx/>
-            </a:pPr>
-            <a:r>
-              <a:rPr lang="en-US" sz="3600" kern="0" spc="35" dirty="0">
-                <a:solidFill>
-                  <a:srgbClr val="404040"/>
-                </a:solidFill>
-                <a:latin typeface="Verdana" panose="020B0604030504040204"/>
-                <a:cs typeface="Verdana" panose="020B0604030504040204"/>
-              </a:rPr>
-              <a:t>Rules</a:t>
-            </a:r>
-            <a:endParaRPr lang="en-US" sz="3600" kern="0" spc="35" dirty="0">
-              <a:solidFill>
-                <a:srgbClr val="404040"/>
-              </a:solidFill>
-              <a:latin typeface="Verdana" panose="020B0604030504040204"/>
-              <a:cs typeface="Verdana" panose="020B0604030504040204"/>
-            </a:endParaRPr>
-          </a:p>
-        </p:txBody>
-      </p:sp>
-      <p:sp>
-        <p:nvSpPr>
-          <p:cNvPr id="4" name="Slide Number Placeholder 3"/>
-          <p:cNvSpPr>
-            <a:spLocks noGrp="1"/>
-          </p:cNvSpPr>
-          <p:nvPr>
-            <p:ph type="sldNum" sz="quarter" idx="12"/>
-          </p:nvPr>
-        </p:nvSpPr>
-        <p:spPr/>
-        <p:txBody>
-          <a:bodyPr/>
-          <a:p>
-            <a:fld id="{9B618960-8005-486C-9A75-10CB2AAC16F9}" type="slidenum">
-              <a:rPr lang="en-US" smtClean="0"/>
-            </a:fld>
-            <a:endParaRPr lang="en-US"/>
-          </a:p>
-        </p:txBody>
-      </p:sp>
-      <p:pic>
-        <p:nvPicPr>
-          <p:cNvPr id="5" name="Picture 4"/>
-          <p:cNvPicPr>
-            <a:picLocks noChangeAspect="1"/>
-          </p:cNvPicPr>
-          <p:nvPr/>
-        </p:nvPicPr>
-        <p:blipFill>
-          <a:blip r:embed="rId1"/>
-          <a:stretch>
-            <a:fillRect/>
-          </a:stretch>
-        </p:blipFill>
-        <p:spPr>
-          <a:xfrm>
-            <a:off x="3718560" y="806450"/>
-            <a:ext cx="5857240" cy="5815330"/>
-          </a:xfrm>
-          <a:prstGeom prst="rect">
-            <a:avLst/>
-          </a:prstGeom>
-        </p:spPr>
-      </p:pic>
-    </p:spTree>
-  </p:cSld>
-  <p:clrMapOvr>
-    <a:masterClrMapping/>
-  </p:clrMapOvr>
-</p:sld>
-</file>
-
-<file path=ppt/slides/slide19.xml><?xml version="1.0" encoding="utf-8"?>
-<p:sld xmlns:a="http://schemas.openxmlformats.org/drawingml/2006/main" xmlns:r="http://schemas.openxmlformats.org/officeDocument/2006/relationships" xmlns:p="http://schemas.openxmlformats.org/presentationml/2006/main">
-  <p:cSld>
-    <p:spTree>
-      <p:nvGrpSpPr>
-        <p:cNvPr id="1" name=""/>
-        <p:cNvGrpSpPr/>
-        <p:nvPr/>
-      </p:nvGrpSpPr>
-      <p:grpSpPr>
-        <a:xfrm>
-          <a:off x="0" y="0"/>
-          <a:ext cx="0" cy="0"/>
-          <a:chOff x="0" y="0"/>
-          <a:chExt cx="0" cy="0"/>
-        </a:xfrm>
-      </p:grpSpPr>
       <p:grpSp>
         <p:nvGrpSpPr>
           <p:cNvPr id="2" name="object 2"/>
@@ -5177,12 +4508,7 @@
             <p:ph type="sldNum" sz="quarter" idx="7"/>
           </p:nvPr>
         </p:nvSpPr>
-        <p:spPr>
-          <a:xfrm>
-            <a:off x="8610600" y="4847590"/>
-            <a:ext cx="2743200" cy="365125"/>
-          </a:xfrm>
-        </p:spPr>
+        <p:spPr/>
         <p:txBody>
           <a:bodyPr/>
           <a:p>
@@ -5201,7 +4527,7 @@
         </p:nvSpPr>
         <p:spPr>
           <a:xfrm>
-            <a:off x="4756785" y="887095"/>
+            <a:off x="5024755" y="2905125"/>
             <a:ext cx="6628765" cy="592455"/>
           </a:xfrm>
           <a:prstGeom prst="rect">
@@ -5223,15 +4549,26 @@
               <a:buFontTx/>
             </a:pPr>
             <a:r>
-              <a:rPr lang="en-US" sz="2000" b="1" spc="40" dirty="0">
-                <a:solidFill>
-                  <a:srgbClr val="00B0F0"/>
+              <a:rPr lang="en-US" sz="2000" dirty="0">
+                <a:solidFill>
+                  <a:srgbClr val="EF5A28"/>
                 </a:solidFill>
                 <a:latin typeface="Verdana" panose="020B0604030504040204"/>
                 <a:cs typeface="Verdana" panose="020B0604030504040204"/>
                 <a:sym typeface="+mn-ea"/>
               </a:rPr>
-              <a:t>TestName Rule</a:t>
+              <a:t> </a:t>
+            </a:r>
+            <a:r>
+              <a:rPr lang="en-US" sz="2000" b="1" spc="40" dirty="0">
+                <a:solidFill>
+                  <a:srgbClr val="00B0F0"/>
+                </a:solidFill>
+                <a:latin typeface="Verdana" panose="020B0604030504040204"/>
+                <a:cs typeface="Verdana" panose="020B0604030504040204"/>
+                <a:sym typeface="+mn-ea"/>
+              </a:rPr>
+              <a:t>Using @Ignore annotation </a:t>
             </a:r>
             <a:endParaRPr lang="en-US" sz="2000" b="1" spc="40" dirty="0">
               <a:solidFill>
@@ -5244,16 +4581,143 @@
           </a:p>
         </p:txBody>
       </p:sp>
-      <p:sp>
-        <p:nvSpPr>
-          <p:cNvPr id="6" name="Text Box 5"/>
+    </p:spTree>
+  </p:cSld>
+  <p:clrMapOvr>
+    <a:masterClrMapping/>
+  </p:clrMapOvr>
+</p:sld>
+</file>
+
+<file path=ppt/slides/slide17.xml><?xml version="1.0" encoding="utf-8"?>
+<p:sld xmlns:a="http://schemas.openxmlformats.org/drawingml/2006/main" xmlns:r="http://schemas.openxmlformats.org/officeDocument/2006/relationships" xmlns:p="http://schemas.openxmlformats.org/presentationml/2006/main">
+  <p:cSld>
+    <p:spTree>
+      <p:nvGrpSpPr>
+        <p:cNvPr id="1" name=""/>
+        <p:cNvGrpSpPr/>
+        <p:nvPr/>
+      </p:nvGrpSpPr>
+      <p:grpSpPr>
+        <a:xfrm>
+          <a:off x="0" y="0"/>
+          <a:ext cx="0" cy="0"/>
+          <a:chOff x="0" y="0"/>
+          <a:chExt cx="0" cy="0"/>
+        </a:xfrm>
+      </p:grpSpPr>
+      <p:grpSp>
+        <p:nvGrpSpPr>
+          <p:cNvPr id="2" name="object 2"/>
+          <p:cNvGrpSpPr/>
+          <p:nvPr/>
+        </p:nvGrpSpPr>
+        <p:grpSpPr>
+          <a:xfrm>
+            <a:off x="0" y="0"/>
+            <a:ext cx="4636135" cy="6858000"/>
+            <a:chOff x="0" y="0"/>
+            <a:chExt cx="4636135" cy="6858000"/>
+          </a:xfrm>
+        </p:grpSpPr>
+        <p:pic>
+          <p:nvPicPr>
+            <p:cNvPr id="3" name="object 3"/>
+            <p:cNvPicPr/>
+            <p:nvPr/>
+          </p:nvPicPr>
+          <p:blipFill>
+            <a:blip r:embed="rId1" cstate="print"/>
+            <a:stretch>
+              <a:fillRect/>
+            </a:stretch>
+          </p:blipFill>
+          <p:spPr>
+            <a:xfrm>
+              <a:off x="0" y="0"/>
+              <a:ext cx="4636008" cy="6858000"/>
+            </a:xfrm>
+            <a:prstGeom prst="rect">
+              <a:avLst/>
+            </a:prstGeom>
+          </p:spPr>
+        </p:pic>
+        <p:pic>
+          <p:nvPicPr>
+            <p:cNvPr id="4" name="object 4"/>
+            <p:cNvPicPr/>
+            <p:nvPr/>
+          </p:nvPicPr>
+          <p:blipFill>
+            <a:blip r:embed="rId2" cstate="print"/>
+            <a:stretch>
+              <a:fillRect/>
+            </a:stretch>
+          </p:blipFill>
+          <p:spPr>
+            <a:xfrm>
+              <a:off x="1639189" y="1948560"/>
+              <a:ext cx="1689735" cy="548639"/>
+            </a:xfrm>
+            <a:prstGeom prst="rect">
+              <a:avLst/>
+            </a:prstGeom>
+          </p:spPr>
+        </p:pic>
+        <p:pic>
+          <p:nvPicPr>
+            <p:cNvPr id="5" name="object 5"/>
+            <p:cNvPicPr/>
+            <p:nvPr/>
+          </p:nvPicPr>
+          <p:blipFill>
+            <a:blip r:embed="rId3" cstate="print"/>
+            <a:stretch>
+              <a:fillRect/>
+            </a:stretch>
+          </p:blipFill>
+          <p:spPr>
+            <a:xfrm>
+              <a:off x="0" y="45719"/>
+              <a:ext cx="48463" cy="640333"/>
+            </a:xfrm>
+            <a:prstGeom prst="rect">
+              <a:avLst/>
+            </a:prstGeom>
+          </p:spPr>
+        </p:pic>
+      </p:grpSp>
+      <p:sp>
+        <p:nvSpPr>
+          <p:cNvPr id="9" name="Slide Number Placeholder 8"/>
+          <p:cNvSpPr>
+            <a:spLocks noGrp="1"/>
+          </p:cNvSpPr>
+          <p:nvPr>
+            <p:ph type="sldNum" sz="quarter" idx="7"/>
+          </p:nvPr>
+        </p:nvSpPr>
+        <p:spPr/>
+        <p:txBody>
+          <a:bodyPr/>
+          <a:p>
+            <a:fld id="{B6F15528-21DE-4FAA-801E-634DDDAF4B2B}" type="slidenum">
+              <a:rPr/>
+            </a:fld>
+            <a:endParaRPr/>
+          </a:p>
+        </p:txBody>
+      </p:sp>
+      <p:sp>
+        <p:nvSpPr>
+          <p:cNvPr id="10" name="Text Box 9"/>
           <p:cNvSpPr txBox="1"/>
           <p:nvPr/>
         </p:nvSpPr>
         <p:spPr>
           <a:xfrm>
-            <a:off x="4756785" y="1537335"/>
-            <a:ext cx="7555230" cy="592455"/>
+            <a:off x="5024755" y="2905125"/>
+            <a:ext cx="6628765" cy="592455"/>
           </a:xfrm>
           <a:prstGeom prst="rect">
             <a:avLst/>
@@ -5265,7 +4729,7 @@
             <a:spAutoFit/>
           </a:bodyPr>
           <a:p>
-            <a:pPr marL="12700" marR="5080" lvl="0" algn="l">
+            <a:pPr marL="12700" marR="5080" algn="l">
               <a:lnSpc>
                 <a:spcPct val="163000"/>
               </a:lnSpc>
@@ -5274,15 +4738,15 @@
               <a:buFontTx/>
             </a:pPr>
             <a:r>
-              <a:rPr lang="en-US" sz="2000" b="1" spc="40" dirty="0">
-                <a:solidFill>
-                  <a:srgbClr val="00B0F0"/>
+              <a:rPr lang="en-US" sz="2000" dirty="0">
+                <a:solidFill>
+                  <a:srgbClr val="EF5A28"/>
                 </a:solidFill>
                 <a:latin typeface="Verdana" panose="020B0604030504040204"/>
                 <a:cs typeface="Verdana" panose="020B0604030504040204"/>
                 <a:sym typeface="+mn-ea"/>
               </a:rPr>
-              <a:t>TemporaryFolder Rule - </a:t>
+              <a:t> </a:t>
             </a:r>
             <a:r>
               <a:rPr lang="en-US" sz="2000" b="1" spc="40" dirty="0">
@@ -5293,18 +4757,7 @@
                 <a:cs typeface="Verdana" panose="020B0604030504040204"/>
                 <a:sym typeface="+mn-ea"/>
               </a:rPr>
-              <a:t>How a JUnit Rule Works</a:t>
-            </a:r>
-            <a:r>
-              <a:rPr lang="en-US" sz="2000" b="1" spc="40" dirty="0">
-                <a:solidFill>
-                  <a:srgbClr val="00B0F0"/>
-                </a:solidFill>
-                <a:latin typeface="Verdana" panose="020B0604030504040204"/>
-                <a:cs typeface="Verdana" panose="020B0604030504040204"/>
-                <a:sym typeface="+mn-ea"/>
-              </a:rPr>
-              <a:t> </a:t>
+              <a:t>Using @Ignore annotation </a:t>
             </a:r>
             <a:endParaRPr lang="en-US" sz="2000" b="1" spc="40" dirty="0">
               <a:solidFill>
@@ -5317,40 +4770,87 @@
           </a:p>
         </p:txBody>
       </p:sp>
-      <p:sp>
-        <p:nvSpPr>
-          <p:cNvPr id="7" name="Text Box 6"/>
-          <p:cNvSpPr txBox="1"/>
-          <p:nvPr/>
+    </p:spTree>
+  </p:cSld>
+  <p:clrMapOvr>
+    <a:masterClrMapping/>
+  </p:clrMapOvr>
+</p:sld>
+</file>
+
+<file path=ppt/slides/slide18.xml><?xml version="1.0" encoding="utf-8"?>
+<p:sld xmlns:a="http://schemas.openxmlformats.org/drawingml/2006/main" xmlns:r="http://schemas.openxmlformats.org/officeDocument/2006/relationships" xmlns:p="http://schemas.openxmlformats.org/presentationml/2006/main">
+  <p:cSld>
+    <p:spTree>
+      <p:nvGrpSpPr>
+        <p:cNvPr id="1" name=""/>
+        <p:cNvGrpSpPr/>
+        <p:nvPr/>
+      </p:nvGrpSpPr>
+      <p:grpSpPr>
+        <a:xfrm>
+          <a:off x="0" y="0"/>
+          <a:ext cx="0" cy="0"/>
+          <a:chOff x="0" y="0"/>
+          <a:chExt cx="0" cy="0"/>
+        </a:xfrm>
+      </p:grpSpPr>
+      <p:sp>
+        <p:nvSpPr>
+          <p:cNvPr id="2" name="Title 1"/>
+          <p:cNvSpPr>
+            <a:spLocks noGrp="1"/>
+          </p:cNvSpPr>
+          <p:nvPr>
+            <p:ph type="ctrTitle"/>
+          </p:nvPr>
         </p:nvSpPr>
         <p:spPr>
           <a:xfrm>
-            <a:off x="4756785" y="2494915"/>
-            <a:ext cx="5912485" cy="398780"/>
-          </a:xfrm>
-          <a:prstGeom prst="rect">
-            <a:avLst/>
-          </a:prstGeom>
-          <a:noFill/>
+            <a:off x="1524000" y="249555"/>
+            <a:ext cx="9144000" cy="554990"/>
+          </a:xfrm>
         </p:spPr>
         <p:txBody>
-          <a:bodyPr wrap="square" rtlCol="0" anchor="t">
-            <a:spAutoFit/>
+          <a:bodyPr>
+            <a:normAutofit fontScale="90000"/>
           </a:bodyPr>
-          <a:p>
-            <a:r>
-              <a:rPr lang="en-US" sz="2000" b="1" spc="40" dirty="0">
-                <a:solidFill>
-                  <a:srgbClr val="00B0F0"/>
+          <a:lstStyle/>
+          <a:p>
+            <a:pPr marL="12700" algn="ctr">
+              <a:lnSpc>
+                <a:spcPct val="100000"/>
+              </a:lnSpc>
+              <a:spcBef>
+                <a:spcPts val="100"/>
+              </a:spcBef>
+              <a:buClrTx/>
+              <a:buSzTx/>
+              <a:buFontTx/>
+            </a:pPr>
+            <a:r>
+              <a:rPr sz="3600" kern="0" spc="35" dirty="0">
+                <a:solidFill>
+                  <a:srgbClr val="404040"/>
                 </a:solidFill>
                 <a:latin typeface="Verdana" panose="020B0604030504040204"/>
                 <a:cs typeface="Verdana" panose="020B0604030504040204"/>
               </a:rPr>
-              <a:t>ExpectedException Rule </a:t>
-            </a:r>
-            <a:endParaRPr lang="en-US" sz="2000" b="1" spc="40" dirty="0">
+              <a:t>Test </a:t>
+            </a:r>
+            <a:r>
+              <a:rPr lang="en-US" sz="3600" kern="0" spc="35" dirty="0">
+                <a:solidFill>
+                  <a:srgbClr val="404040"/>
+                </a:solidFill>
+                <a:latin typeface="Verdana" panose="020B0604030504040204"/>
+                <a:cs typeface="Verdana" panose="020B0604030504040204"/>
+              </a:rPr>
+              <a:t>Suites</a:t>
+            </a:r>
+            <a:endParaRPr lang="en-US" sz="3600" kern="0" spc="35" dirty="0">
               <a:solidFill>
-                <a:srgbClr val="00B0F0"/>
+                <a:srgbClr val="404040"/>
               </a:solidFill>
               <a:latin typeface="Verdana" panose="020B0604030504040204"/>
               <a:cs typeface="Verdana" panose="020B0604030504040204"/>
@@ -5360,43 +4860,145 @@
       </p:sp>
       <p:sp>
         <p:nvSpPr>
-          <p:cNvPr id="8" name="Text Box 7"/>
-          <p:cNvSpPr txBox="1"/>
+          <p:cNvPr id="4" name="Slide Number Placeholder 3"/>
+          <p:cNvSpPr>
+            <a:spLocks noGrp="1"/>
+          </p:cNvSpPr>
+          <p:nvPr>
+            <p:ph type="sldNum" sz="quarter" idx="12"/>
+          </p:nvPr>
+        </p:nvSpPr>
+        <p:spPr/>
+        <p:txBody>
+          <a:bodyPr/>
+          <a:p>
+            <a:fld id="{9B618960-8005-486C-9A75-10CB2AAC16F9}" type="slidenum">
+              <a:rPr lang="en-US" smtClean="0"/>
+            </a:fld>
+            <a:endParaRPr lang="en-US"/>
+          </a:p>
+        </p:txBody>
+      </p:sp>
+      <p:graphicFrame>
+        <p:nvGraphicFramePr>
+          <p:cNvPr id="5" name="Object 4"/>
+          <p:cNvGraphicFramePr/>
           <p:nvPr/>
+        </p:nvGraphicFramePr>
+        <p:xfrm>
+          <a:off x="2853690" y="1170305"/>
+          <a:ext cx="6941185" cy="4819650"/>
+        </p:xfrm>
+        <a:graphic>
+          <a:graphicData uri="http://schemas.openxmlformats.org/presentationml/2006/ole">
+            <mc:AlternateContent xmlns:mc="http://schemas.openxmlformats.org/markup-compatibility/2006">
+              <mc:Choice xmlns:v="urn:schemas-microsoft-com:vml" Requires="v">
+                <p:oleObj spid="_x0000_s6" name="" r:id="rId1" imgW="5191125" imgH="3781425" progId="Paint.Picture">
+                  <p:embed/>
+                </p:oleObj>
+              </mc:Choice>
+              <mc:Fallback>
+                <p:oleObj name="" r:id="rId1" imgW="5191125" imgH="3781425" progId="Paint.Picture">
+                  <p:embed/>
+                  <p:pic>
+                    <p:nvPicPr>
+                      <p:cNvPr id="0" name="Picture 5"/>
+                      <p:cNvPicPr/>
+                      <p:nvPr/>
+                    </p:nvPicPr>
+                    <p:blipFill>
+                      <a:blip r:embed="rId2"/>
+                      <a:stretch>
+                        <a:fillRect/>
+                      </a:stretch>
+                    </p:blipFill>
+                    <p:spPr>
+                      <a:xfrm>
+                        <a:off x="2853690" y="1170305"/>
+                        <a:ext cx="6941185" cy="4819650"/>
+                      </a:xfrm>
+                      <a:prstGeom prst="rect">
+                        <a:avLst/>
+                      </a:prstGeom>
+                    </p:spPr>
+                  </p:pic>
+                </p:oleObj>
+              </mc:Fallback>
+            </mc:AlternateContent>
+          </a:graphicData>
+        </a:graphic>
+      </p:graphicFrame>
+    </p:spTree>
+  </p:cSld>
+  <p:clrMapOvr>
+    <a:masterClrMapping/>
+  </p:clrMapOvr>
+</p:sld>
+</file>
+
+<file path=ppt/slides/slide19.xml><?xml version="1.0" encoding="utf-8"?>
+<p:sld xmlns:a="http://schemas.openxmlformats.org/drawingml/2006/main" xmlns:r="http://schemas.openxmlformats.org/officeDocument/2006/relationships" xmlns:p="http://schemas.openxmlformats.org/presentationml/2006/main">
+  <p:cSld>
+    <p:spTree>
+      <p:nvGrpSpPr>
+        <p:cNvPr id="1" name=""/>
+        <p:cNvGrpSpPr/>
+        <p:nvPr/>
+      </p:nvGrpSpPr>
+      <p:grpSpPr>
+        <a:xfrm>
+          <a:off x="0" y="0"/>
+          <a:ext cx="0" cy="0"/>
+          <a:chOff x="0" y="0"/>
+          <a:chExt cx="0" cy="0"/>
+        </a:xfrm>
+      </p:grpSpPr>
+      <p:sp>
+        <p:nvSpPr>
+          <p:cNvPr id="2" name="Title 1"/>
+          <p:cNvSpPr>
+            <a:spLocks noGrp="1"/>
+          </p:cNvSpPr>
+          <p:nvPr>
+            <p:ph type="ctrTitle"/>
+          </p:nvPr>
         </p:nvSpPr>
         <p:spPr>
           <a:xfrm>
-            <a:off x="4756785" y="4360545"/>
-            <a:ext cx="6338570" cy="398780"/>
-          </a:xfrm>
-          <a:prstGeom prst="rect">
-            <a:avLst/>
-          </a:prstGeom>
-          <a:noFill/>
+            <a:off x="1524000" y="249555"/>
+            <a:ext cx="9144000" cy="554990"/>
+          </a:xfrm>
         </p:spPr>
         <p:txBody>
-          <a:bodyPr wrap="square" rtlCol="0" anchor="t">
-            <a:spAutoFit/>
+          <a:bodyPr>
+            <a:normAutofit fontScale="90000"/>
           </a:bodyPr>
-          <a:p>
-            <a:pPr algn="l">
+          <a:lstStyle/>
+          <a:p>
+            <a:pPr marL="12700" algn="ctr">
+              <a:lnSpc>
+                <a:spcPct val="100000"/>
+              </a:lnSpc>
+              <a:spcBef>
+                <a:spcPts val="100"/>
+              </a:spcBef>
               <a:buClrTx/>
               <a:buSzTx/>
               <a:buFontTx/>
             </a:pPr>
             <a:r>
-              <a:rPr lang="en-US" sz="2000" b="1" spc="40" dirty="0">
-                <a:solidFill>
-                  <a:srgbClr val="00B0F0"/>
+              <a:rPr sz="3600" kern="0" spc="35" dirty="0">
+                <a:solidFill>
+                  <a:srgbClr val="404040"/>
                 </a:solidFill>
                 <a:latin typeface="Verdana" panose="020B0604030504040204"/>
                 <a:cs typeface="Verdana" panose="020B0604030504040204"/>
               </a:rPr>
-              <a:t>Creating a Custom JUnit Rule</a:t>
-            </a:r>
-            <a:endParaRPr lang="en-US" sz="2000" b="1" spc="40" dirty="0">
+              <a:t>What Is a Parameterized Test?</a:t>
+            </a:r>
+            <a:endParaRPr sz="3600" kern="0" spc="35" dirty="0">
               <a:solidFill>
-                <a:srgbClr val="00B0F0"/>
+                <a:srgbClr val="404040"/>
               </a:solidFill>
               <a:latin typeface="Verdana" panose="020B0604030504040204"/>
               <a:cs typeface="Verdana" panose="020B0604030504040204"/>
@@ -5406,89 +5008,309 @@
       </p:sp>
       <p:sp>
         <p:nvSpPr>
-          <p:cNvPr id="11" name="Text Box 10"/>
+          <p:cNvPr id="4" name="Slide Number Placeholder 3"/>
+          <p:cNvSpPr>
+            <a:spLocks noGrp="1"/>
+          </p:cNvSpPr>
+          <p:nvPr>
+            <p:ph type="sldNum" sz="quarter" idx="12"/>
+          </p:nvPr>
+        </p:nvSpPr>
+        <p:spPr/>
+        <p:txBody>
+          <a:bodyPr/>
+          <a:p>
+            <a:fld id="{9B618960-8005-486C-9A75-10CB2AAC16F9}" type="slidenum">
+              <a:rPr lang="en-US" smtClean="0"/>
+            </a:fld>
+            <a:endParaRPr lang="en-US"/>
+          </a:p>
+        </p:txBody>
+      </p:sp>
+      <p:sp>
+        <p:nvSpPr>
+          <p:cNvPr id="19" name="object 3"/>
           <p:cNvSpPr txBox="1"/>
           <p:nvPr/>
         </p:nvSpPr>
         <p:spPr>
           <a:xfrm>
-            <a:off x="4756785" y="3775075"/>
-            <a:ext cx="6338570" cy="398780"/>
+            <a:off x="2266950" y="928370"/>
+            <a:ext cx="9351645" cy="5729605"/>
           </a:xfrm>
           <a:prstGeom prst="rect">
             <a:avLst/>
           </a:prstGeom>
-          <a:noFill/>
         </p:spPr>
         <p:txBody>
-          <a:bodyPr wrap="square" rtlCol="0" anchor="t">
+          <a:bodyPr vert="horz" wrap="square" lIns="0" tIns="12700" rIns="0" bIns="0" rtlCol="0">
             <a:spAutoFit/>
           </a:bodyPr>
           <a:p>
-            <a:pPr algn="l">
+            <a:pPr marL="12700" marR="5080" algn="l">
+              <a:lnSpc>
+                <a:spcPct val="163000"/>
+              </a:lnSpc>
               <a:buClrTx/>
               <a:buSzTx/>
               <a:buFontTx/>
             </a:pPr>
             <a:r>
-              <a:rPr lang="en-US" sz="2000" b="1" spc="40" dirty="0">
-                <a:solidFill>
-                  <a:srgbClr val="00B0F0"/>
+              <a:rPr lang="en-US" sz="2400" dirty="0">
+                <a:solidFill>
+                  <a:srgbClr val="EF5A28"/>
                 </a:solidFill>
                 <a:latin typeface="Verdana" panose="020B0604030504040204"/>
                 <a:cs typeface="Verdana" panose="020B0604030504040204"/>
               </a:rPr>
-              <a:t>Error Collector Rule</a:t>
-            </a:r>
-            <a:endParaRPr lang="en-US" sz="2000" b="1" spc="40" dirty="0">
+              <a:t>W</a:t>
+            </a:r>
+            <a:r>
+              <a:rPr sz="2400" dirty="0">
+                <a:solidFill>
+                  <a:srgbClr val="EF5A28"/>
+                </a:solidFill>
+                <a:latin typeface="Verdana" panose="020B0604030504040204"/>
+                <a:cs typeface="Verdana" panose="020B0604030504040204"/>
+              </a:rPr>
+              <a:t>hen it fullfills all the following requirements:</a:t>
+            </a:r>
+            <a:r>
+              <a:rPr lang="en-US" sz="1800" spc="40" dirty="0">
+                <a:solidFill>
+                  <a:srgbClr val="EF5A28"/>
+                </a:solidFill>
+                <a:latin typeface="Verdana" panose="020B0604030504040204"/>
+                <a:cs typeface="Verdana" panose="020B0604030504040204"/>
+              </a:rPr>
+              <a:t>	</a:t>
+            </a:r>
+            <a:endParaRPr lang="en-US" sz="1800" spc="40" dirty="0">
               <a:solidFill>
-                <a:srgbClr val="00B0F0"/>
+                <a:srgbClr val="EF5A28"/>
               </a:solidFill>
               <a:latin typeface="Verdana" panose="020B0604030504040204"/>
               <a:cs typeface="Verdana" panose="020B0604030504040204"/>
             </a:endParaRPr>
           </a:p>
-        </p:txBody>
-      </p:sp>
-      <p:sp>
-        <p:nvSpPr>
-          <p:cNvPr id="12" name="Text Box 11"/>
-          <p:cNvSpPr txBox="1"/>
-          <p:nvPr/>
-        </p:nvSpPr>
-        <p:spPr>
-          <a:xfrm>
-            <a:off x="4756785" y="3133725"/>
-            <a:ext cx="6338570" cy="398780"/>
-          </a:xfrm>
-          <a:prstGeom prst="rect">
-            <a:avLst/>
-          </a:prstGeom>
-          <a:noFill/>
-        </p:spPr>
-        <p:txBody>
-          <a:bodyPr wrap="square" rtlCol="0" anchor="t">
-            <a:spAutoFit/>
-          </a:bodyPr>
-          <a:p>
-            <a:pPr algn="l">
+          <a:p>
+            <a:pPr marL="12700" marR="5080" algn="l">
+              <a:lnSpc>
+                <a:spcPct val="163000"/>
+              </a:lnSpc>
               <a:buClrTx/>
               <a:buSzTx/>
               <a:buFontTx/>
             </a:pPr>
-            <a:r>
-              <a:rPr lang="en-US" sz="2000" b="1" spc="40" dirty="0">
-                <a:solidFill>
-                  <a:srgbClr val="00B0F0"/>
+            <a:endParaRPr lang="en-US" sz="1800" spc="40" dirty="0">
+              <a:solidFill>
+                <a:srgbClr val="EF5A28"/>
+              </a:solidFill>
+              <a:latin typeface="Verdana" panose="020B0604030504040204"/>
+              <a:cs typeface="Verdana" panose="020B0604030504040204"/>
+            </a:endParaRPr>
+          </a:p>
+          <a:p>
+            <a:pPr marL="12700" marR="5080" algn="l">
+              <a:lnSpc>
+                <a:spcPct val="163000"/>
+              </a:lnSpc>
+              <a:buClrTx/>
+              <a:buSzTx/>
+              <a:buFontTx/>
+            </a:pPr>
+            <a:r>
+              <a:rPr lang="en-US" sz="1800" spc="40" dirty="0">
+                <a:solidFill>
+                  <a:srgbClr val="EF5A28"/>
                 </a:solidFill>
                 <a:latin typeface="Verdana" panose="020B0604030504040204"/>
                 <a:cs typeface="Verdana" panose="020B0604030504040204"/>
               </a:rPr>
-              <a:t>Timeout Rule</a:t>
-            </a:r>
-            <a:endParaRPr lang="en-US" sz="2000" b="1" spc="40" dirty="0">
+              <a:t>	- The class is annotated with @RunWith(Parameterized.class).</a:t>
+            </a:r>
+            <a:endParaRPr lang="en-US" sz="1800" spc="40" dirty="0">
               <a:solidFill>
-                <a:srgbClr val="00B0F0"/>
+                <a:srgbClr val="EF5A28"/>
+              </a:solidFill>
+              <a:latin typeface="Verdana" panose="020B0604030504040204"/>
+              <a:cs typeface="Verdana" panose="020B0604030504040204"/>
+            </a:endParaRPr>
+          </a:p>
+          <a:p>
+            <a:pPr marL="12700" marR="5080" algn="l">
+              <a:lnSpc>
+                <a:spcPct val="163000"/>
+              </a:lnSpc>
+              <a:buClrTx/>
+              <a:buSzTx/>
+              <a:buFontTx/>
+            </a:pPr>
+            <a:endParaRPr lang="en-US" sz="1800" spc="40" dirty="0">
+              <a:solidFill>
+                <a:srgbClr val="EF5A28"/>
+              </a:solidFill>
+              <a:latin typeface="Verdana" panose="020B0604030504040204"/>
+              <a:cs typeface="Verdana" panose="020B0604030504040204"/>
+            </a:endParaRPr>
+          </a:p>
+          <a:p>
+            <a:pPr marL="12700" marR="5080" algn="l">
+              <a:lnSpc>
+                <a:spcPct val="163000"/>
+              </a:lnSpc>
+              <a:buClrTx/>
+              <a:buSzTx/>
+              <a:buFontTx/>
+            </a:pPr>
+            <a:r>
+              <a:rPr lang="en-US" sz="1800" spc="40" dirty="0">
+                <a:solidFill>
+                  <a:srgbClr val="EF5A28"/>
+                </a:solidFill>
+                <a:latin typeface="Verdana" panose="020B0604030504040204"/>
+                <a:cs typeface="Verdana" panose="020B0604030504040204"/>
+              </a:rPr>
+              <a:t>	- The class has a single constructor that stores the test data</a:t>
+            </a:r>
+            <a:endParaRPr lang="en-US" sz="1800" spc="40" dirty="0">
+              <a:solidFill>
+                <a:srgbClr val="EF5A28"/>
+              </a:solidFill>
+              <a:latin typeface="Verdana" panose="020B0604030504040204"/>
+              <a:cs typeface="Verdana" panose="020B0604030504040204"/>
+            </a:endParaRPr>
+          </a:p>
+          <a:p>
+            <a:pPr marL="12700" marR="5080" algn="l">
+              <a:lnSpc>
+                <a:spcPct val="163000"/>
+              </a:lnSpc>
+              <a:buClrTx/>
+              <a:buSzTx/>
+              <a:buFontTx/>
+            </a:pPr>
+            <a:endParaRPr lang="en-US" sz="1800" spc="40" dirty="0">
+              <a:solidFill>
+                <a:srgbClr val="EF5A28"/>
+              </a:solidFill>
+              <a:latin typeface="Verdana" panose="020B0604030504040204"/>
+              <a:cs typeface="Verdana" panose="020B0604030504040204"/>
+            </a:endParaRPr>
+          </a:p>
+          <a:p>
+            <a:pPr marL="12700" marR="5080" algn="l">
+              <a:lnSpc>
+                <a:spcPct val="163000"/>
+              </a:lnSpc>
+              <a:buClrTx/>
+              <a:buSzTx/>
+              <a:buFontTx/>
+            </a:pPr>
+            <a:r>
+              <a:rPr sz="2400" dirty="0">
+                <a:solidFill>
+                  <a:srgbClr val="EF5A28"/>
+                </a:solidFill>
+                <a:latin typeface="Verdana" panose="020B0604030504040204"/>
+                <a:cs typeface="Verdana" panose="020B0604030504040204"/>
+              </a:rPr>
+              <a:t>	</a:t>
+            </a:r>
+            <a:r>
+              <a:rPr lang="en-US" sz="2400" dirty="0">
+                <a:solidFill>
+                  <a:srgbClr val="EF5A28"/>
+                </a:solidFill>
+                <a:latin typeface="Verdana" panose="020B0604030504040204"/>
+                <a:cs typeface="Verdana" panose="020B0604030504040204"/>
+              </a:rPr>
+              <a:t>- </a:t>
+            </a:r>
+            <a:r>
+              <a:rPr lang="en-US" sz="1800" spc="40" dirty="0">
+                <a:solidFill>
+                  <a:srgbClr val="EF5A28"/>
+                </a:solidFill>
+                <a:latin typeface="Verdana" panose="020B0604030504040204"/>
+                <a:cs typeface="Verdana" panose="020B0604030504040204"/>
+              </a:rPr>
+              <a:t>The class has a static method that generates and returns test data   	   and is annotated with the @Parameters annotation.</a:t>
+            </a:r>
+            <a:endParaRPr lang="en-US" sz="1800" spc="40" dirty="0">
+              <a:solidFill>
+                <a:srgbClr val="EF5A28"/>
+              </a:solidFill>
+              <a:latin typeface="Verdana" panose="020B0604030504040204"/>
+              <a:cs typeface="Verdana" panose="020B0604030504040204"/>
+            </a:endParaRPr>
+          </a:p>
+          <a:p>
+            <a:pPr marL="12700" marR="5080" algn="l">
+              <a:lnSpc>
+                <a:spcPct val="163000"/>
+              </a:lnSpc>
+              <a:buClrTx/>
+              <a:buSzTx/>
+              <a:buFontTx/>
+            </a:pPr>
+            <a:endParaRPr lang="en-US" sz="1800" spc="40" dirty="0">
+              <a:solidFill>
+                <a:srgbClr val="EF5A28"/>
+              </a:solidFill>
+              <a:latin typeface="Verdana" panose="020B0604030504040204"/>
+              <a:cs typeface="Verdana" panose="020B0604030504040204"/>
+            </a:endParaRPr>
+          </a:p>
+          <a:p>
+            <a:pPr marL="12700" marR="5080" algn="l">
+              <a:lnSpc>
+                <a:spcPct val="163000"/>
+              </a:lnSpc>
+              <a:buClrTx/>
+              <a:buSzTx/>
+              <a:buFontTx/>
+            </a:pPr>
+            <a:r>
+              <a:rPr lang="en-US" sz="1800" spc="40" dirty="0">
+                <a:solidFill>
+                  <a:srgbClr val="EF5A28"/>
+                </a:solidFill>
+                <a:latin typeface="Verdana" panose="020B0604030504040204"/>
+                <a:cs typeface="Verdana" panose="020B0604030504040204"/>
+              </a:rPr>
+              <a:t>	- The class has a test, which obviously means that it needs a method          	   annotated with the @Test annotation.</a:t>
+            </a:r>
+            <a:endParaRPr lang="en-US" sz="1800" spc="40" dirty="0">
+              <a:solidFill>
+                <a:srgbClr val="EF5A28"/>
+              </a:solidFill>
+              <a:latin typeface="Verdana" panose="020B0604030504040204"/>
+              <a:cs typeface="Verdana" panose="020B0604030504040204"/>
+            </a:endParaRPr>
+          </a:p>
+          <a:p>
+            <a:pPr marL="12700" marR="5080" algn="l">
+              <a:lnSpc>
+                <a:spcPct val="163000"/>
+              </a:lnSpc>
+              <a:buClrTx/>
+              <a:buSzTx/>
+              <a:buFontTx/>
+            </a:pPr>
+            <a:r>
+              <a:rPr lang="en-US" sz="1800" spc="40" dirty="0">
+                <a:solidFill>
+                  <a:srgbClr val="EF5A28"/>
+                </a:solidFill>
+                <a:latin typeface="Verdana" panose="020B0604030504040204"/>
+                <a:cs typeface="Verdana" panose="020B0604030504040204"/>
+              </a:rPr>
+              <a:t>	</a:t>
+            </a:r>
+            <a:endParaRPr sz="2400" dirty="0">
+              <a:solidFill>
+                <a:srgbClr val="EF5A28"/>
               </a:solidFill>
               <a:latin typeface="Verdana" panose="020B0604030504040204"/>
               <a:cs typeface="Verdana" panose="020B0604030504040204"/>
@@ -6039,16 +5861,16 @@
               <a:buFontTx/>
             </a:pPr>
             <a:r>
-              <a:rPr sz="3600" kern="0" spc="35" dirty="0">
+              <a:rPr lang="en-US" sz="3600" kern="0" spc="35" dirty="0">
                 <a:solidFill>
                   <a:srgbClr val="404040"/>
                 </a:solidFill>
                 <a:latin typeface="Verdana" panose="020B0604030504040204"/>
                 <a:cs typeface="Verdana" panose="020B0604030504040204"/>
               </a:rPr>
-              <a:t>What is JMH?</a:t>
-            </a:r>
-            <a:endParaRPr sz="3600" kern="0" spc="35" dirty="0">
+              <a:t>Rules</a:t>
+            </a:r>
+            <a:endParaRPr lang="en-US" sz="3600" kern="0" spc="35" dirty="0">
               <a:solidFill>
                 <a:srgbClr val="404040"/>
               </a:solidFill>
@@ -6079,305 +5901,30 @@
           </a:p>
         </p:txBody>
       </p:sp>
-      <p:sp>
-        <p:nvSpPr>
-          <p:cNvPr id="19" name="object 3"/>
-          <p:cNvSpPr txBox="1"/>
+      <p:pic>
+        <p:nvPicPr>
+          <p:cNvPr id="5" name="Picture 4"/>
+          <p:cNvPicPr>
+            <a:picLocks noChangeAspect="1"/>
+          </p:cNvPicPr>
           <p:nvPr/>
-        </p:nvSpPr>
+        </p:nvPicPr>
+        <p:blipFill>
+          <a:blip r:embed="rId1"/>
+          <a:stretch>
+            <a:fillRect/>
+          </a:stretch>
+        </p:blipFill>
         <p:spPr>
           <a:xfrm>
-            <a:off x="191770" y="804545"/>
-            <a:ext cx="12000865" cy="5128260"/>
+            <a:off x="3718560" y="806450"/>
+            <a:ext cx="5857240" cy="5815330"/>
           </a:xfrm>
           <a:prstGeom prst="rect">
             <a:avLst/>
           </a:prstGeom>
         </p:spPr>
-        <p:txBody>
-          <a:bodyPr vert="horz" wrap="square" lIns="0" tIns="12700" rIns="0" bIns="0" rtlCol="0">
-            <a:spAutoFit/>
-          </a:bodyPr>
-          <a:p>
-            <a:pPr marL="12700" marR="5080" algn="l">
-              <a:lnSpc>
-                <a:spcPct val="163000"/>
-              </a:lnSpc>
-              <a:buClrTx/>
-              <a:buSzTx/>
-              <a:buFontTx/>
-            </a:pPr>
-            <a:r>
-              <a:rPr lang="en-US" sz="1800" spc="40" dirty="0">
-                <a:solidFill>
-                  <a:srgbClr val="EF5A28"/>
-                </a:solidFill>
-                <a:latin typeface="Verdana" panose="020B0604030504040204"/>
-                <a:cs typeface="Verdana" panose="020B0604030504040204"/>
-              </a:rPr>
-              <a:t>	</a:t>
-            </a:r>
-            <a:endParaRPr lang="en-US" sz="1800" spc="40" dirty="0">
-              <a:solidFill>
-                <a:srgbClr val="EF5A28"/>
-              </a:solidFill>
-              <a:latin typeface="Verdana" panose="020B0604030504040204"/>
-              <a:cs typeface="Verdana" panose="020B0604030504040204"/>
-            </a:endParaRPr>
-          </a:p>
-          <a:p>
-            <a:pPr marL="12700" marR="5080" algn="l">
-              <a:lnSpc>
-                <a:spcPct val="163000"/>
-              </a:lnSpc>
-              <a:buClrTx/>
-              <a:buSzTx/>
-              <a:buFontTx/>
-            </a:pPr>
-            <a:endParaRPr lang="en-US" sz="1800" spc="40" dirty="0">
-              <a:solidFill>
-                <a:srgbClr val="EF5A28"/>
-              </a:solidFill>
-              <a:latin typeface="Verdana" panose="020B0604030504040204"/>
-              <a:cs typeface="Verdana" panose="020B0604030504040204"/>
-            </a:endParaRPr>
-          </a:p>
-          <a:p>
-            <a:pPr marL="12700" marR="5080" algn="l">
-              <a:lnSpc>
-                <a:spcPct val="163000"/>
-              </a:lnSpc>
-              <a:buClrTx/>
-              <a:buSzTx/>
-              <a:buFontTx/>
-            </a:pPr>
-            <a:r>
-              <a:rPr lang="en-US" sz="1800" spc="40" dirty="0">
-                <a:solidFill>
-                  <a:srgbClr val="EF5A28"/>
-                </a:solidFill>
-                <a:latin typeface="Verdana" panose="020B0604030504040204"/>
-                <a:cs typeface="Verdana" panose="020B0604030504040204"/>
-              </a:rPr>
-              <a:t>	- JMH is an Open JDK tool that helps to implement benchmarks correctly.</a:t>
-            </a:r>
-            <a:endParaRPr lang="en-US" sz="1800" spc="40" dirty="0">
-              <a:solidFill>
-                <a:srgbClr val="EF5A28"/>
-              </a:solidFill>
-              <a:latin typeface="Verdana" panose="020B0604030504040204"/>
-              <a:cs typeface="Verdana" panose="020B0604030504040204"/>
-            </a:endParaRPr>
-          </a:p>
-          <a:p>
-            <a:pPr marL="12700" marR="5080" algn="l">
-              <a:lnSpc>
-                <a:spcPct val="163000"/>
-              </a:lnSpc>
-              <a:buClrTx/>
-              <a:buSzTx/>
-              <a:buFontTx/>
-            </a:pPr>
-            <a:endParaRPr lang="en-US" sz="1800" spc="40" dirty="0">
-              <a:solidFill>
-                <a:srgbClr val="EF5A28"/>
-              </a:solidFill>
-              <a:latin typeface="Verdana" panose="020B0604030504040204"/>
-              <a:cs typeface="Verdana" panose="020B0604030504040204"/>
-            </a:endParaRPr>
-          </a:p>
-          <a:p>
-            <a:pPr marL="12700" marR="5080" algn="l">
-              <a:lnSpc>
-                <a:spcPct val="163000"/>
-              </a:lnSpc>
-              <a:buClrTx/>
-              <a:buSzTx/>
-              <a:buFontTx/>
-            </a:pPr>
-            <a:r>
-              <a:rPr lang="en-US" sz="1800" spc="40" dirty="0">
-                <a:solidFill>
-                  <a:srgbClr val="EF5A28"/>
-                </a:solidFill>
-                <a:latin typeface="Verdana" panose="020B0604030504040204"/>
-                <a:cs typeface="Verdana" panose="020B0604030504040204"/>
-              </a:rPr>
-              <a:t>	- JMH specializes in micro-benchmarks where low-level performance metrics are measured.</a:t>
-            </a:r>
-            <a:endParaRPr lang="en-US" sz="1800" spc="40" dirty="0">
-              <a:solidFill>
-                <a:srgbClr val="EF5A28"/>
-              </a:solidFill>
-              <a:latin typeface="Verdana" panose="020B0604030504040204"/>
-              <a:cs typeface="Verdana" panose="020B0604030504040204"/>
-            </a:endParaRPr>
-          </a:p>
-          <a:p>
-            <a:pPr marL="12700" marR="5080" algn="l">
-              <a:lnSpc>
-                <a:spcPct val="163000"/>
-              </a:lnSpc>
-              <a:buClrTx/>
-              <a:buSzTx/>
-              <a:buFontTx/>
-            </a:pPr>
-            <a:endParaRPr lang="en-US" sz="1800" spc="40" dirty="0">
-              <a:solidFill>
-                <a:srgbClr val="EF5A28"/>
-              </a:solidFill>
-              <a:latin typeface="Verdana" panose="020B0604030504040204"/>
-              <a:cs typeface="Verdana" panose="020B0604030504040204"/>
-            </a:endParaRPr>
-          </a:p>
-          <a:p>
-            <a:pPr marL="12700" marR="5080" algn="l">
-              <a:lnSpc>
-                <a:spcPct val="163000"/>
-              </a:lnSpc>
-              <a:buClrTx/>
-              <a:buSzTx/>
-              <a:buFontTx/>
-            </a:pPr>
-            <a:r>
-              <a:rPr sz="2400" dirty="0">
-                <a:solidFill>
-                  <a:srgbClr val="EF5A28"/>
-                </a:solidFill>
-                <a:latin typeface="Verdana" panose="020B0604030504040204"/>
-                <a:cs typeface="Verdana" panose="020B0604030504040204"/>
-              </a:rPr>
-              <a:t>	</a:t>
-            </a:r>
-            <a:r>
-              <a:rPr lang="en-US" sz="2400" dirty="0">
-                <a:solidFill>
-                  <a:srgbClr val="EF5A28"/>
-                </a:solidFill>
-                <a:latin typeface="Verdana" panose="020B0604030504040204"/>
-                <a:cs typeface="Verdana" panose="020B0604030504040204"/>
-              </a:rPr>
-              <a:t>- </a:t>
-            </a:r>
-            <a:r>
-              <a:rPr lang="en-US" sz="1800" spc="40" dirty="0">
-                <a:solidFill>
-                  <a:srgbClr val="EF5A28"/>
-                </a:solidFill>
-                <a:latin typeface="Verdana" panose="020B0604030504040204"/>
-                <a:cs typeface="Verdana" panose="020B0604030504040204"/>
-              </a:rPr>
-              <a:t>Micro-benchmarks are useful for in-depth analysis of performance issues. </a:t>
-            </a:r>
-            <a:endParaRPr lang="en-US" sz="1800" spc="40" dirty="0">
-              <a:solidFill>
-                <a:srgbClr val="EF5A28"/>
-              </a:solidFill>
-              <a:latin typeface="Verdana" panose="020B0604030504040204"/>
-              <a:cs typeface="Verdana" panose="020B0604030504040204"/>
-            </a:endParaRPr>
-          </a:p>
-          <a:p>
-            <a:pPr marL="12700" marR="5080" algn="l">
-              <a:lnSpc>
-                <a:spcPct val="163000"/>
-              </a:lnSpc>
-              <a:buClrTx/>
-              <a:buSzTx/>
-              <a:buFontTx/>
-            </a:pPr>
-            <a:endParaRPr lang="en-US" sz="1800" spc="40" dirty="0">
-              <a:solidFill>
-                <a:srgbClr val="EF5A28"/>
-              </a:solidFill>
-              <a:latin typeface="Verdana" panose="020B0604030504040204"/>
-              <a:cs typeface="Verdana" panose="020B0604030504040204"/>
-            </a:endParaRPr>
-          </a:p>
-          <a:p>
-            <a:pPr marL="12700" marR="5080" algn="l">
-              <a:lnSpc>
-                <a:spcPct val="163000"/>
-              </a:lnSpc>
-              <a:buClrTx/>
-              <a:buSzTx/>
-              <a:buFontTx/>
-            </a:pPr>
-            <a:r>
-              <a:rPr lang="en-US" sz="1800" spc="40" dirty="0">
-                <a:solidFill>
-                  <a:srgbClr val="EF5A28"/>
-                </a:solidFill>
-                <a:latin typeface="Verdana" panose="020B0604030504040204"/>
-                <a:cs typeface="Verdana" panose="020B0604030504040204"/>
-              </a:rPr>
-              <a:t>	-  Writing JMH benchmarks are similar to writing JUnit test cases.</a:t>
-            </a:r>
-            <a:endParaRPr lang="en-US" sz="1800" spc="40" dirty="0">
-              <a:solidFill>
-                <a:srgbClr val="EF5A28"/>
-              </a:solidFill>
-              <a:latin typeface="Verdana" panose="020B0604030504040204"/>
-              <a:cs typeface="Verdana" panose="020B0604030504040204"/>
-            </a:endParaRPr>
-          </a:p>
-          <a:p>
-            <a:pPr marL="12700" marR="5080" algn="l">
-              <a:lnSpc>
-                <a:spcPct val="163000"/>
-              </a:lnSpc>
-              <a:buClrTx/>
-              <a:buSzTx/>
-              <a:buFontTx/>
-            </a:pPr>
-            <a:endParaRPr lang="en-US" sz="1800" spc="40" dirty="0">
-              <a:solidFill>
-                <a:srgbClr val="EF5A28"/>
-              </a:solidFill>
-              <a:latin typeface="Verdana" panose="020B0604030504040204"/>
-              <a:cs typeface="Verdana" panose="020B0604030504040204"/>
-            </a:endParaRPr>
-          </a:p>
-          <a:p>
-            <a:pPr marL="12700" marR="5080" algn="l">
-              <a:lnSpc>
-                <a:spcPct val="163000"/>
-              </a:lnSpc>
-              <a:buClrTx/>
-              <a:buSzTx/>
-              <a:buFontTx/>
-            </a:pPr>
-            <a:r>
-              <a:rPr lang="en-US" spc="40" dirty="0">
-                <a:solidFill>
-                  <a:srgbClr val="EF5A28"/>
-                </a:solidFill>
-                <a:latin typeface="Verdana" panose="020B0604030504040204"/>
-                <a:cs typeface="Verdana" panose="020B0604030504040204"/>
-                <a:sym typeface="+mn-ea"/>
-              </a:rPr>
-              <a:t>	-  The only difference is with the annotations used in JMH.</a:t>
-            </a:r>
-            <a:r>
-              <a:rPr lang="en-US" sz="1800" spc="40" dirty="0">
-                <a:solidFill>
-                  <a:srgbClr val="EF5A28"/>
-                </a:solidFill>
-                <a:latin typeface="Verdana" panose="020B0604030504040204"/>
-                <a:cs typeface="Verdana" panose="020B0604030504040204"/>
-              </a:rPr>
-              <a:t>	</a:t>
-            </a:r>
-            <a:endParaRPr sz="2400" dirty="0">
-              <a:solidFill>
-                <a:srgbClr val="EF5A28"/>
-              </a:solidFill>
-              <a:latin typeface="Verdana" panose="020B0604030504040204"/>
-              <a:cs typeface="Verdana" panose="020B0604030504040204"/>
-            </a:endParaRPr>
-          </a:p>
-        </p:txBody>
-      </p:sp>
+      </p:pic>
     </p:spTree>
   </p:cSld>
   <p:clrMapOvr>
@@ -6395,77 +5942,424 @@
         <p:cNvGrpSpPr/>
         <p:nvPr/>
       </p:nvGrpSpPr>
-      <p:grpSpPr/>
-      <p:sp>
-        <p:nvSpPr>
-          <p:cNvPr id="2" name="Title 1"/>
-          <p:cNvSpPr>
-            <a:spLocks noGrp="1"/>
-          </p:cNvSpPr>
-          <p:nvPr>
-            <p:ph type="title"/>
-          </p:nvPr>
-        </p:nvSpPr>
-        <p:spPr/>
+      <p:grpSpPr>
+        <a:xfrm>
+          <a:off x="0" y="0"/>
+          <a:ext cx="0" cy="0"/>
+          <a:chOff x="0" y="0"/>
+          <a:chExt cx="0" cy="0"/>
+        </a:xfrm>
+      </p:grpSpPr>
+      <p:grpSp>
+        <p:nvGrpSpPr>
+          <p:cNvPr id="2" name="object 2"/>
+          <p:cNvGrpSpPr/>
+          <p:nvPr/>
+        </p:nvGrpSpPr>
+        <p:grpSpPr>
+          <a:xfrm>
+            <a:off x="0" y="0"/>
+            <a:ext cx="4636135" cy="6858000"/>
+            <a:chOff x="0" y="0"/>
+            <a:chExt cx="4636135" cy="6858000"/>
+          </a:xfrm>
+        </p:grpSpPr>
+        <p:pic>
+          <p:nvPicPr>
+            <p:cNvPr id="3" name="object 3"/>
+            <p:cNvPicPr/>
+            <p:nvPr/>
+          </p:nvPicPr>
+          <p:blipFill>
+            <a:blip r:embed="rId1" cstate="print"/>
+            <a:stretch>
+              <a:fillRect/>
+            </a:stretch>
+          </p:blipFill>
+          <p:spPr>
+            <a:xfrm>
+              <a:off x="0" y="0"/>
+              <a:ext cx="4636008" cy="6858000"/>
+            </a:xfrm>
+            <a:prstGeom prst="rect">
+              <a:avLst/>
+            </a:prstGeom>
+          </p:spPr>
+        </p:pic>
+        <p:pic>
+          <p:nvPicPr>
+            <p:cNvPr id="4" name="object 4"/>
+            <p:cNvPicPr/>
+            <p:nvPr/>
+          </p:nvPicPr>
+          <p:blipFill>
+            <a:blip r:embed="rId2" cstate="print"/>
+            <a:stretch>
+              <a:fillRect/>
+            </a:stretch>
+          </p:blipFill>
+          <p:spPr>
+            <a:xfrm>
+              <a:off x="1639189" y="1948560"/>
+              <a:ext cx="1689735" cy="548639"/>
+            </a:xfrm>
+            <a:prstGeom prst="rect">
+              <a:avLst/>
+            </a:prstGeom>
+          </p:spPr>
+        </p:pic>
+        <p:pic>
+          <p:nvPicPr>
+            <p:cNvPr id="5" name="object 5"/>
+            <p:cNvPicPr/>
+            <p:nvPr/>
+          </p:nvPicPr>
+          <p:blipFill>
+            <a:blip r:embed="rId3" cstate="print"/>
+            <a:stretch>
+              <a:fillRect/>
+            </a:stretch>
+          </p:blipFill>
+          <p:spPr>
+            <a:xfrm>
+              <a:off x="0" y="45719"/>
+              <a:ext cx="48463" cy="640333"/>
+            </a:xfrm>
+            <a:prstGeom prst="rect">
+              <a:avLst/>
+            </a:prstGeom>
+          </p:spPr>
+        </p:pic>
+      </p:grpSp>
+      <p:sp>
+        <p:nvSpPr>
+          <p:cNvPr id="9" name="Slide Number Placeholder 8"/>
+          <p:cNvSpPr>
+            <a:spLocks noGrp="1"/>
+          </p:cNvSpPr>
+          <p:nvPr>
+            <p:ph type="sldNum" sz="quarter" idx="7"/>
+          </p:nvPr>
+        </p:nvSpPr>
+        <p:spPr>
+          <a:xfrm>
+            <a:off x="8610600" y="4847590"/>
+            <a:ext cx="2743200" cy="365125"/>
+          </a:xfrm>
+        </p:spPr>
         <p:txBody>
           <a:bodyPr/>
           <a:p>
-            <a:pPr algn="ctr"/>
-            <a:r>
-              <a:rPr lang="en-US"/>
-              <a:t>Maven dependency</a:t>
-            </a:r>
-            <a:endParaRPr lang="en-US"/>
-          </a:p>
-        </p:txBody>
-      </p:sp>
-      <p:sp>
-        <p:nvSpPr>
-          <p:cNvPr id="4" name="Slide Number Placeholder 3"/>
-          <p:cNvSpPr>
-            <a:spLocks noGrp="1"/>
-          </p:cNvSpPr>
-          <p:nvPr>
-            <p:ph type="sldNum" sz="quarter" idx="12"/>
-          </p:nvPr>
-        </p:nvSpPr>
-        <p:spPr/>
-        <p:txBody>
-          <a:bodyPr/>
-          <a:p>
-            <a:fld id="{9B618960-8005-486C-9A75-10CB2AAC16F9}" type="slidenum">
-              <a:rPr lang="en-US" smtClean="0"/>
+            <a:fld id="{B6F15528-21DE-4FAA-801E-634DDDAF4B2B}" type="slidenum">
+              <a:rPr/>
             </a:fld>
-            <a:endParaRPr lang="en-US"/>
-          </a:p>
-        </p:txBody>
-      </p:sp>
-      <p:pic>
-        <p:nvPicPr>
-          <p:cNvPr id="5" name="Content Placeholder 4"/>
-          <p:cNvPicPr>
-            <a:picLocks noChangeAspect="1"/>
-          </p:cNvPicPr>
-          <p:nvPr>
-            <p:ph idx="1"/>
-          </p:nvPr>
-        </p:nvPicPr>
-        <p:blipFill>
-          <a:blip r:embed="rId1"/>
-          <a:stretch>
-            <a:fillRect/>
-          </a:stretch>
-        </p:blipFill>
+            <a:endParaRPr/>
+          </a:p>
+        </p:txBody>
+      </p:sp>
+      <p:sp>
+        <p:nvSpPr>
+          <p:cNvPr id="10" name="Text Box 9"/>
+          <p:cNvSpPr txBox="1"/>
+          <p:nvPr/>
+        </p:nvSpPr>
         <p:spPr>
           <a:xfrm>
-            <a:off x="1049020" y="2120265"/>
-            <a:ext cx="10093325" cy="2359025"/>
+            <a:off x="4756785" y="887095"/>
+            <a:ext cx="6628765" cy="592455"/>
           </a:xfrm>
           <a:prstGeom prst="rect">
             <a:avLst/>
           </a:prstGeom>
+          <a:noFill/>
         </p:spPr>
-      </p:pic>
+        <p:txBody>
+          <a:bodyPr wrap="square" rtlCol="0">
+            <a:spAutoFit/>
+          </a:bodyPr>
+          <a:p>
+            <a:pPr marL="12700" marR="5080" algn="l">
+              <a:lnSpc>
+                <a:spcPct val="163000"/>
+              </a:lnSpc>
+              <a:buClrTx/>
+              <a:buSzTx/>
+              <a:buFontTx/>
+            </a:pPr>
+            <a:r>
+              <a:rPr lang="en-US" sz="2000" b="1" spc="40" dirty="0">
+                <a:solidFill>
+                  <a:srgbClr val="00B0F0"/>
+                </a:solidFill>
+                <a:latin typeface="Verdana" panose="020B0604030504040204"/>
+                <a:cs typeface="Verdana" panose="020B0604030504040204"/>
+                <a:sym typeface="+mn-ea"/>
+              </a:rPr>
+              <a:t>TestName Rule</a:t>
+            </a:r>
+            <a:endParaRPr lang="en-US" sz="2000" b="1" spc="40" dirty="0">
+              <a:solidFill>
+                <a:srgbClr val="00B0F0"/>
+              </a:solidFill>
+              <a:latin typeface="Verdana" panose="020B0604030504040204"/>
+              <a:cs typeface="Verdana" panose="020B0604030504040204"/>
+              <a:sym typeface="+mn-ea"/>
+            </a:endParaRPr>
+          </a:p>
+        </p:txBody>
+      </p:sp>
+      <p:sp>
+        <p:nvSpPr>
+          <p:cNvPr id="6" name="Text Box 5"/>
+          <p:cNvSpPr txBox="1"/>
+          <p:nvPr/>
+        </p:nvSpPr>
+        <p:spPr>
+          <a:xfrm>
+            <a:off x="4756785" y="1537335"/>
+            <a:ext cx="7555230" cy="592455"/>
+          </a:xfrm>
+          <a:prstGeom prst="rect">
+            <a:avLst/>
+          </a:prstGeom>
+          <a:noFill/>
+        </p:spPr>
+        <p:txBody>
+          <a:bodyPr wrap="square" rtlCol="0">
+            <a:spAutoFit/>
+          </a:bodyPr>
+          <a:p>
+            <a:pPr marL="12700" marR="5080" lvl="0" algn="l">
+              <a:lnSpc>
+                <a:spcPct val="163000"/>
+              </a:lnSpc>
+              <a:buClrTx/>
+              <a:buSzTx/>
+              <a:buFontTx/>
+            </a:pPr>
+            <a:r>
+              <a:rPr lang="en-US" sz="2000" b="1" spc="40" dirty="0">
+                <a:solidFill>
+                  <a:srgbClr val="00B0F0"/>
+                </a:solidFill>
+                <a:latin typeface="Verdana" panose="020B0604030504040204"/>
+                <a:cs typeface="Verdana" panose="020B0604030504040204"/>
+                <a:sym typeface="+mn-ea"/>
+              </a:rPr>
+              <a:t>TemporaryFolder Rule - </a:t>
+            </a:r>
+            <a:r>
+              <a:rPr lang="en-US" sz="2000" b="1" spc="40" dirty="0">
+                <a:solidFill>
+                  <a:srgbClr val="00B0F0"/>
+                </a:solidFill>
+                <a:latin typeface="Verdana" panose="020B0604030504040204"/>
+                <a:cs typeface="Verdana" panose="020B0604030504040204"/>
+                <a:sym typeface="+mn-ea"/>
+              </a:rPr>
+              <a:t>How a JUnit Rule Works</a:t>
+            </a:r>
+            <a:r>
+              <a:rPr lang="en-US" sz="2000" b="1" spc="40" dirty="0">
+                <a:solidFill>
+                  <a:srgbClr val="00B0F0"/>
+                </a:solidFill>
+                <a:latin typeface="Verdana" panose="020B0604030504040204"/>
+                <a:cs typeface="Verdana" panose="020B0604030504040204"/>
+                <a:sym typeface="+mn-ea"/>
+              </a:rPr>
+              <a:t> </a:t>
+            </a:r>
+            <a:endParaRPr lang="en-US" sz="2000" b="1" spc="40" dirty="0">
+              <a:solidFill>
+                <a:srgbClr val="00B0F0"/>
+              </a:solidFill>
+              <a:latin typeface="Verdana" panose="020B0604030504040204"/>
+              <a:cs typeface="Verdana" panose="020B0604030504040204"/>
+              <a:sym typeface="+mn-ea"/>
+            </a:endParaRPr>
+          </a:p>
+        </p:txBody>
+      </p:sp>
+      <p:sp>
+        <p:nvSpPr>
+          <p:cNvPr id="7" name="Text Box 6"/>
+          <p:cNvSpPr txBox="1"/>
+          <p:nvPr/>
+        </p:nvSpPr>
+        <p:spPr>
+          <a:xfrm>
+            <a:off x="4756785" y="2494915"/>
+            <a:ext cx="5912485" cy="398780"/>
+          </a:xfrm>
+          <a:prstGeom prst="rect">
+            <a:avLst/>
+          </a:prstGeom>
+          <a:noFill/>
+        </p:spPr>
+        <p:txBody>
+          <a:bodyPr wrap="square" rtlCol="0" anchor="t">
+            <a:spAutoFit/>
+          </a:bodyPr>
+          <a:p>
+            <a:r>
+              <a:rPr lang="en-US" sz="2000" b="1" spc="40" dirty="0">
+                <a:solidFill>
+                  <a:srgbClr val="00B0F0"/>
+                </a:solidFill>
+                <a:latin typeface="Verdana" panose="020B0604030504040204"/>
+                <a:cs typeface="Verdana" panose="020B0604030504040204"/>
+              </a:rPr>
+              <a:t>ExpectedException Rule </a:t>
+            </a:r>
+            <a:endParaRPr lang="en-US" sz="2000" b="1" spc="40" dirty="0">
+              <a:solidFill>
+                <a:srgbClr val="00B0F0"/>
+              </a:solidFill>
+              <a:latin typeface="Verdana" panose="020B0604030504040204"/>
+              <a:cs typeface="Verdana" panose="020B0604030504040204"/>
+            </a:endParaRPr>
+          </a:p>
+        </p:txBody>
+      </p:sp>
+      <p:sp>
+        <p:nvSpPr>
+          <p:cNvPr id="8" name="Text Box 7"/>
+          <p:cNvSpPr txBox="1"/>
+          <p:nvPr/>
+        </p:nvSpPr>
+        <p:spPr>
+          <a:xfrm>
+            <a:off x="4756785" y="4360545"/>
+            <a:ext cx="6338570" cy="398780"/>
+          </a:xfrm>
+          <a:prstGeom prst="rect">
+            <a:avLst/>
+          </a:prstGeom>
+          <a:noFill/>
+        </p:spPr>
+        <p:txBody>
+          <a:bodyPr wrap="square" rtlCol="0" anchor="t">
+            <a:spAutoFit/>
+          </a:bodyPr>
+          <a:p>
+            <a:pPr algn="l">
+              <a:buClrTx/>
+              <a:buSzTx/>
+              <a:buFontTx/>
+            </a:pPr>
+            <a:r>
+              <a:rPr lang="en-US" sz="2000" b="1" spc="40" dirty="0">
+                <a:solidFill>
+                  <a:srgbClr val="00B0F0"/>
+                </a:solidFill>
+                <a:latin typeface="Verdana" panose="020B0604030504040204"/>
+                <a:cs typeface="Verdana" panose="020B0604030504040204"/>
+              </a:rPr>
+              <a:t>Creating a Custom JUnit Rule</a:t>
+            </a:r>
+            <a:endParaRPr lang="en-US" sz="2000" b="1" spc="40" dirty="0">
+              <a:solidFill>
+                <a:srgbClr val="00B0F0"/>
+              </a:solidFill>
+              <a:latin typeface="Verdana" panose="020B0604030504040204"/>
+              <a:cs typeface="Verdana" panose="020B0604030504040204"/>
+            </a:endParaRPr>
+          </a:p>
+        </p:txBody>
+      </p:sp>
+      <p:sp>
+        <p:nvSpPr>
+          <p:cNvPr id="11" name="Text Box 10"/>
+          <p:cNvSpPr txBox="1"/>
+          <p:nvPr/>
+        </p:nvSpPr>
+        <p:spPr>
+          <a:xfrm>
+            <a:off x="4756785" y="3775075"/>
+            <a:ext cx="6338570" cy="398780"/>
+          </a:xfrm>
+          <a:prstGeom prst="rect">
+            <a:avLst/>
+          </a:prstGeom>
+          <a:noFill/>
+        </p:spPr>
+        <p:txBody>
+          <a:bodyPr wrap="square" rtlCol="0" anchor="t">
+            <a:spAutoFit/>
+          </a:bodyPr>
+          <a:p>
+            <a:pPr algn="l">
+              <a:buClrTx/>
+              <a:buSzTx/>
+              <a:buFontTx/>
+            </a:pPr>
+            <a:r>
+              <a:rPr lang="en-US" sz="2000" b="1" spc="40" dirty="0">
+                <a:solidFill>
+                  <a:srgbClr val="00B0F0"/>
+                </a:solidFill>
+                <a:latin typeface="Verdana" panose="020B0604030504040204"/>
+                <a:cs typeface="Verdana" panose="020B0604030504040204"/>
+              </a:rPr>
+              <a:t>Error Collector Rule</a:t>
+            </a:r>
+            <a:endParaRPr lang="en-US" sz="2000" b="1" spc="40" dirty="0">
+              <a:solidFill>
+                <a:srgbClr val="00B0F0"/>
+              </a:solidFill>
+              <a:latin typeface="Verdana" panose="020B0604030504040204"/>
+              <a:cs typeface="Verdana" panose="020B0604030504040204"/>
+            </a:endParaRPr>
+          </a:p>
+        </p:txBody>
+      </p:sp>
+      <p:sp>
+        <p:nvSpPr>
+          <p:cNvPr id="12" name="Text Box 11"/>
+          <p:cNvSpPr txBox="1"/>
+          <p:nvPr/>
+        </p:nvSpPr>
+        <p:spPr>
+          <a:xfrm>
+            <a:off x="4756785" y="3133725"/>
+            <a:ext cx="6338570" cy="398780"/>
+          </a:xfrm>
+          <a:prstGeom prst="rect">
+            <a:avLst/>
+          </a:prstGeom>
+          <a:noFill/>
+        </p:spPr>
+        <p:txBody>
+          <a:bodyPr wrap="square" rtlCol="0" anchor="t">
+            <a:spAutoFit/>
+          </a:bodyPr>
+          <a:p>
+            <a:pPr algn="l">
+              <a:buClrTx/>
+              <a:buSzTx/>
+              <a:buFontTx/>
+            </a:pPr>
+            <a:r>
+              <a:rPr lang="en-US" sz="2000" b="1" spc="40" dirty="0">
+                <a:solidFill>
+                  <a:srgbClr val="00B0F0"/>
+                </a:solidFill>
+                <a:latin typeface="Verdana" panose="020B0604030504040204"/>
+                <a:cs typeface="Verdana" panose="020B0604030504040204"/>
+              </a:rPr>
+              <a:t>Timeout Rule</a:t>
+            </a:r>
+            <a:endParaRPr lang="en-US" sz="2000" b="1" spc="40" dirty="0">
+              <a:solidFill>
+                <a:srgbClr val="00B0F0"/>
+              </a:solidFill>
+              <a:latin typeface="Verdana" panose="020B0604030504040204"/>
+              <a:cs typeface="Verdana" panose="020B0604030504040204"/>
+            </a:endParaRPr>
+          </a:p>
+        </p:txBody>
+      </p:sp>
     </p:spTree>
   </p:cSld>
   <p:clrMapOvr>
@@ -6483,7 +6377,14 @@
         <p:cNvGrpSpPr/>
         <p:nvPr/>
       </p:nvGrpSpPr>
-      <p:grpSpPr/>
+      <p:grpSpPr>
+        <a:xfrm>
+          <a:off x="0" y="0"/>
+          <a:ext cx="0" cy="0"/>
+          <a:chOff x="0" y="0"/>
+          <a:chExt cx="0" cy="0"/>
+        </a:xfrm>
+      </p:grpSpPr>
       <p:sp>
         <p:nvSpPr>
           <p:cNvPr id="2" name="Title 1"/>
@@ -6491,19 +6392,49 @@
             <a:spLocks noGrp="1"/>
           </p:cNvSpPr>
           <p:nvPr>
-            <p:ph type="title"/>
-          </p:nvPr>
-        </p:nvSpPr>
-        <p:spPr/>
-        <p:txBody>
-          <a:bodyPr/>
-          <a:p>
-            <a:pPr algn="ctr"/>
-            <a:r>
-              <a:rPr lang="en-US"/>
-              <a:t>Writing your first JMH benchmark</a:t>
-            </a:r>
-            <a:endParaRPr lang="en-US"/>
+            <p:ph type="ctrTitle"/>
+          </p:nvPr>
+        </p:nvSpPr>
+        <p:spPr>
+          <a:xfrm>
+            <a:off x="1524000" y="249555"/>
+            <a:ext cx="9144000" cy="554990"/>
+          </a:xfrm>
+        </p:spPr>
+        <p:txBody>
+          <a:bodyPr>
+            <a:normAutofit fontScale="90000"/>
+          </a:bodyPr>
+          <a:lstStyle/>
+          <a:p>
+            <a:pPr marL="12700" algn="ctr">
+              <a:lnSpc>
+                <a:spcPct val="100000"/>
+              </a:lnSpc>
+              <a:spcBef>
+                <a:spcPts val="100"/>
+              </a:spcBef>
+              <a:buClrTx/>
+              <a:buSzTx/>
+              <a:buFontTx/>
+            </a:pPr>
+            <a:r>
+              <a:rPr sz="3600" kern="0" spc="35" dirty="0">
+                <a:solidFill>
+                  <a:srgbClr val="404040"/>
+                </a:solidFill>
+                <a:latin typeface="Verdana" panose="020B0604030504040204"/>
+                <a:cs typeface="Verdana" panose="020B0604030504040204"/>
+              </a:rPr>
+              <a:t>What is JMH?</a:t>
+            </a:r>
+            <a:endParaRPr sz="3600" kern="0" spc="35" dirty="0">
+              <a:solidFill>
+                <a:srgbClr val="404040"/>
+              </a:solidFill>
+              <a:latin typeface="Verdana" panose="020B0604030504040204"/>
+              <a:cs typeface="Verdana" panose="020B0604030504040204"/>
+            </a:endParaRPr>
           </a:p>
         </p:txBody>
       </p:sp>
@@ -6528,32 +6459,305 @@
           </a:p>
         </p:txBody>
       </p:sp>
-      <p:pic>
-        <p:nvPicPr>
-          <p:cNvPr id="7" name="Content Placeholder 6"/>
-          <p:cNvPicPr>
-            <a:picLocks noChangeAspect="1"/>
-          </p:cNvPicPr>
-          <p:nvPr>
-            <p:ph idx="1"/>
-          </p:nvPr>
-        </p:nvPicPr>
-        <p:blipFill>
-          <a:blip r:embed="rId1"/>
-          <a:stretch>
-            <a:fillRect/>
-          </a:stretch>
-        </p:blipFill>
+      <p:sp>
+        <p:nvSpPr>
+          <p:cNvPr id="19" name="object 3"/>
+          <p:cNvSpPr txBox="1"/>
+          <p:nvPr/>
+        </p:nvSpPr>
         <p:spPr>
           <a:xfrm>
-            <a:off x="85725" y="2136140"/>
-            <a:ext cx="12106275" cy="1739265"/>
+            <a:off x="191770" y="804545"/>
+            <a:ext cx="12000865" cy="5128260"/>
           </a:xfrm>
           <a:prstGeom prst="rect">
             <a:avLst/>
           </a:prstGeom>
         </p:spPr>
-      </p:pic>
+        <p:txBody>
+          <a:bodyPr vert="horz" wrap="square" lIns="0" tIns="12700" rIns="0" bIns="0" rtlCol="0">
+            <a:spAutoFit/>
+          </a:bodyPr>
+          <a:p>
+            <a:pPr marL="12700" marR="5080" algn="l">
+              <a:lnSpc>
+                <a:spcPct val="163000"/>
+              </a:lnSpc>
+              <a:buClrTx/>
+              <a:buSzTx/>
+              <a:buFontTx/>
+            </a:pPr>
+            <a:r>
+              <a:rPr lang="en-US" sz="1800" spc="40" dirty="0">
+                <a:solidFill>
+                  <a:srgbClr val="EF5A28"/>
+                </a:solidFill>
+                <a:latin typeface="Verdana" panose="020B0604030504040204"/>
+                <a:cs typeface="Verdana" panose="020B0604030504040204"/>
+              </a:rPr>
+              <a:t>	</a:t>
+            </a:r>
+            <a:endParaRPr lang="en-US" sz="1800" spc="40" dirty="0">
+              <a:solidFill>
+                <a:srgbClr val="EF5A28"/>
+              </a:solidFill>
+              <a:latin typeface="Verdana" panose="020B0604030504040204"/>
+              <a:cs typeface="Verdana" panose="020B0604030504040204"/>
+            </a:endParaRPr>
+          </a:p>
+          <a:p>
+            <a:pPr marL="12700" marR="5080" algn="l">
+              <a:lnSpc>
+                <a:spcPct val="163000"/>
+              </a:lnSpc>
+              <a:buClrTx/>
+              <a:buSzTx/>
+              <a:buFontTx/>
+            </a:pPr>
+            <a:endParaRPr lang="en-US" sz="1800" spc="40" dirty="0">
+              <a:solidFill>
+                <a:srgbClr val="EF5A28"/>
+              </a:solidFill>
+              <a:latin typeface="Verdana" panose="020B0604030504040204"/>
+              <a:cs typeface="Verdana" panose="020B0604030504040204"/>
+            </a:endParaRPr>
+          </a:p>
+          <a:p>
+            <a:pPr marL="12700" marR="5080" algn="l">
+              <a:lnSpc>
+                <a:spcPct val="163000"/>
+              </a:lnSpc>
+              <a:buClrTx/>
+              <a:buSzTx/>
+              <a:buFontTx/>
+            </a:pPr>
+            <a:r>
+              <a:rPr lang="en-US" sz="1800" spc="40" dirty="0">
+                <a:solidFill>
+                  <a:srgbClr val="EF5A28"/>
+                </a:solidFill>
+                <a:latin typeface="Verdana" panose="020B0604030504040204"/>
+                <a:cs typeface="Verdana" panose="020B0604030504040204"/>
+              </a:rPr>
+              <a:t>	- JMH is an Open JDK tool that helps to implement benchmarks correctly.</a:t>
+            </a:r>
+            <a:endParaRPr lang="en-US" sz="1800" spc="40" dirty="0">
+              <a:solidFill>
+                <a:srgbClr val="EF5A28"/>
+              </a:solidFill>
+              <a:latin typeface="Verdana" panose="020B0604030504040204"/>
+              <a:cs typeface="Verdana" panose="020B0604030504040204"/>
+            </a:endParaRPr>
+          </a:p>
+          <a:p>
+            <a:pPr marL="12700" marR="5080" algn="l">
+              <a:lnSpc>
+                <a:spcPct val="163000"/>
+              </a:lnSpc>
+              <a:buClrTx/>
+              <a:buSzTx/>
+              <a:buFontTx/>
+            </a:pPr>
+            <a:endParaRPr lang="en-US" sz="1800" spc="40" dirty="0">
+              <a:solidFill>
+                <a:srgbClr val="EF5A28"/>
+              </a:solidFill>
+              <a:latin typeface="Verdana" panose="020B0604030504040204"/>
+              <a:cs typeface="Verdana" panose="020B0604030504040204"/>
+            </a:endParaRPr>
+          </a:p>
+          <a:p>
+            <a:pPr marL="12700" marR="5080" algn="l">
+              <a:lnSpc>
+                <a:spcPct val="163000"/>
+              </a:lnSpc>
+              <a:buClrTx/>
+              <a:buSzTx/>
+              <a:buFontTx/>
+            </a:pPr>
+            <a:r>
+              <a:rPr lang="en-US" sz="1800" spc="40" dirty="0">
+                <a:solidFill>
+                  <a:srgbClr val="EF5A28"/>
+                </a:solidFill>
+                <a:latin typeface="Verdana" panose="020B0604030504040204"/>
+                <a:cs typeface="Verdana" panose="020B0604030504040204"/>
+              </a:rPr>
+              <a:t>	- JMH specializes in micro-benchmarks where low-level performance metrics are measured.</a:t>
+            </a:r>
+            <a:endParaRPr lang="en-US" sz="1800" spc="40" dirty="0">
+              <a:solidFill>
+                <a:srgbClr val="EF5A28"/>
+              </a:solidFill>
+              <a:latin typeface="Verdana" panose="020B0604030504040204"/>
+              <a:cs typeface="Verdana" panose="020B0604030504040204"/>
+            </a:endParaRPr>
+          </a:p>
+          <a:p>
+            <a:pPr marL="12700" marR="5080" algn="l">
+              <a:lnSpc>
+                <a:spcPct val="163000"/>
+              </a:lnSpc>
+              <a:buClrTx/>
+              <a:buSzTx/>
+              <a:buFontTx/>
+            </a:pPr>
+            <a:endParaRPr lang="en-US" sz="1800" spc="40" dirty="0">
+              <a:solidFill>
+                <a:srgbClr val="EF5A28"/>
+              </a:solidFill>
+              <a:latin typeface="Verdana" panose="020B0604030504040204"/>
+              <a:cs typeface="Verdana" panose="020B0604030504040204"/>
+            </a:endParaRPr>
+          </a:p>
+          <a:p>
+            <a:pPr marL="12700" marR="5080" algn="l">
+              <a:lnSpc>
+                <a:spcPct val="163000"/>
+              </a:lnSpc>
+              <a:buClrTx/>
+              <a:buSzTx/>
+              <a:buFontTx/>
+            </a:pPr>
+            <a:r>
+              <a:rPr sz="2400" dirty="0">
+                <a:solidFill>
+                  <a:srgbClr val="EF5A28"/>
+                </a:solidFill>
+                <a:latin typeface="Verdana" panose="020B0604030504040204"/>
+                <a:cs typeface="Verdana" panose="020B0604030504040204"/>
+              </a:rPr>
+              <a:t>	</a:t>
+            </a:r>
+            <a:r>
+              <a:rPr lang="en-US" sz="2400" dirty="0">
+                <a:solidFill>
+                  <a:srgbClr val="EF5A28"/>
+                </a:solidFill>
+                <a:latin typeface="Verdana" panose="020B0604030504040204"/>
+                <a:cs typeface="Verdana" panose="020B0604030504040204"/>
+              </a:rPr>
+              <a:t>- </a:t>
+            </a:r>
+            <a:r>
+              <a:rPr lang="en-US" sz="1800" spc="40" dirty="0">
+                <a:solidFill>
+                  <a:srgbClr val="EF5A28"/>
+                </a:solidFill>
+                <a:latin typeface="Verdana" panose="020B0604030504040204"/>
+                <a:cs typeface="Verdana" panose="020B0604030504040204"/>
+              </a:rPr>
+              <a:t>Micro-benchmarks are useful for in-depth analysis of performance issues. </a:t>
+            </a:r>
+            <a:endParaRPr lang="en-US" sz="1800" spc="40" dirty="0">
+              <a:solidFill>
+                <a:srgbClr val="EF5A28"/>
+              </a:solidFill>
+              <a:latin typeface="Verdana" panose="020B0604030504040204"/>
+              <a:cs typeface="Verdana" panose="020B0604030504040204"/>
+            </a:endParaRPr>
+          </a:p>
+          <a:p>
+            <a:pPr marL="12700" marR="5080" algn="l">
+              <a:lnSpc>
+                <a:spcPct val="163000"/>
+              </a:lnSpc>
+              <a:buClrTx/>
+              <a:buSzTx/>
+              <a:buFontTx/>
+            </a:pPr>
+            <a:endParaRPr lang="en-US" sz="1800" spc="40" dirty="0">
+              <a:solidFill>
+                <a:srgbClr val="EF5A28"/>
+              </a:solidFill>
+              <a:latin typeface="Verdana" panose="020B0604030504040204"/>
+              <a:cs typeface="Verdana" panose="020B0604030504040204"/>
+            </a:endParaRPr>
+          </a:p>
+          <a:p>
+            <a:pPr marL="12700" marR="5080" algn="l">
+              <a:lnSpc>
+                <a:spcPct val="163000"/>
+              </a:lnSpc>
+              <a:buClrTx/>
+              <a:buSzTx/>
+              <a:buFontTx/>
+            </a:pPr>
+            <a:r>
+              <a:rPr lang="en-US" sz="1800" spc="40" dirty="0">
+                <a:solidFill>
+                  <a:srgbClr val="EF5A28"/>
+                </a:solidFill>
+                <a:latin typeface="Verdana" panose="020B0604030504040204"/>
+                <a:cs typeface="Verdana" panose="020B0604030504040204"/>
+              </a:rPr>
+              <a:t>	-  Writing JMH benchmarks are similar to writing JUnit test cases.</a:t>
+            </a:r>
+            <a:endParaRPr lang="en-US" sz="1800" spc="40" dirty="0">
+              <a:solidFill>
+                <a:srgbClr val="EF5A28"/>
+              </a:solidFill>
+              <a:latin typeface="Verdana" panose="020B0604030504040204"/>
+              <a:cs typeface="Verdana" panose="020B0604030504040204"/>
+            </a:endParaRPr>
+          </a:p>
+          <a:p>
+            <a:pPr marL="12700" marR="5080" algn="l">
+              <a:lnSpc>
+                <a:spcPct val="163000"/>
+              </a:lnSpc>
+              <a:buClrTx/>
+              <a:buSzTx/>
+              <a:buFontTx/>
+            </a:pPr>
+            <a:endParaRPr lang="en-US" sz="1800" spc="40" dirty="0">
+              <a:solidFill>
+                <a:srgbClr val="EF5A28"/>
+              </a:solidFill>
+              <a:latin typeface="Verdana" panose="020B0604030504040204"/>
+              <a:cs typeface="Verdana" panose="020B0604030504040204"/>
+            </a:endParaRPr>
+          </a:p>
+          <a:p>
+            <a:pPr marL="12700" marR="5080" algn="l">
+              <a:lnSpc>
+                <a:spcPct val="163000"/>
+              </a:lnSpc>
+              <a:buClrTx/>
+              <a:buSzTx/>
+              <a:buFontTx/>
+            </a:pPr>
+            <a:r>
+              <a:rPr lang="en-US" spc="40" dirty="0">
+                <a:solidFill>
+                  <a:srgbClr val="EF5A28"/>
+                </a:solidFill>
+                <a:latin typeface="Verdana" panose="020B0604030504040204"/>
+                <a:cs typeface="Verdana" panose="020B0604030504040204"/>
+                <a:sym typeface="+mn-ea"/>
+              </a:rPr>
+              <a:t>	-  The only difference is with the annotations used in JMH.</a:t>
+            </a:r>
+            <a:r>
+              <a:rPr lang="en-US" sz="1800" spc="40" dirty="0">
+                <a:solidFill>
+                  <a:srgbClr val="EF5A28"/>
+                </a:solidFill>
+                <a:latin typeface="Verdana" panose="020B0604030504040204"/>
+                <a:cs typeface="Verdana" panose="020B0604030504040204"/>
+              </a:rPr>
+              <a:t>	</a:t>
+            </a:r>
+            <a:endParaRPr sz="2400" dirty="0">
+              <a:solidFill>
+                <a:srgbClr val="EF5A28"/>
+              </a:solidFill>
+              <a:latin typeface="Verdana" panose="020B0604030504040204"/>
+              <a:cs typeface="Verdana" panose="020B0604030504040204"/>
+            </a:endParaRPr>
+          </a:p>
+        </p:txBody>
+      </p:sp>
     </p:spTree>
   </p:cSld>
   <p:clrMapOvr>
@@ -6589,7 +6793,7 @@
             <a:pPr algn="ctr"/>
             <a:r>
               <a:rPr lang="en-US"/>
-              <a:t>Benchmark Modes </a:t>
+              <a:t>Maven dependency</a:t>
             </a:r>
             <a:endParaRPr lang="en-US"/>
           </a:p>
@@ -6634,8 +6838,8 @@
         </p:blipFill>
         <p:spPr>
           <a:xfrm>
-            <a:off x="838200" y="1691005"/>
-            <a:ext cx="10584180" cy="3790950"/>
+            <a:off x="1049020" y="2120265"/>
+            <a:ext cx="10093325" cy="2359025"/>
           </a:xfrm>
           <a:prstGeom prst="rect">
             <a:avLst/>
@@ -6672,14 +6876,12 @@
         </p:nvSpPr>
         <p:spPr/>
         <p:txBody>
-          <a:bodyPr>
-            <a:normAutofit fontScale="90000"/>
-          </a:bodyPr>
+          <a:bodyPr/>
           <a:p>
             <a:pPr algn="ctr"/>
             <a:r>
               <a:rPr lang="en-US"/>
-              <a:t>Blackhole - benchmark without JVM interference</a:t>
+              <a:t>Writing your first JMH benchmark</a:t>
             </a:r>
             <a:endParaRPr lang="en-US"/>
           </a:p>
@@ -6708,7 +6910,7 @@
       </p:sp>
       <p:pic>
         <p:nvPicPr>
-          <p:cNvPr id="5" name="Content Placeholder 4"/>
+          <p:cNvPr id="7" name="Content Placeholder 6"/>
           <p:cNvPicPr>
             <a:picLocks noChangeAspect="1"/>
           </p:cNvPicPr>
@@ -6718,39 +6920,14 @@
         </p:nvPicPr>
         <p:blipFill>
           <a:blip r:embed="rId1"/>
-          <a:srcRect l="-5421" t="-2082" r="5421" b="21888"/>
           <a:stretch>
             <a:fillRect/>
           </a:stretch>
         </p:blipFill>
         <p:spPr>
           <a:xfrm>
-            <a:off x="73025" y="1662430"/>
-            <a:ext cx="11620500" cy="1100455"/>
-          </a:xfrm>
-          <a:prstGeom prst="rect">
-            <a:avLst/>
-          </a:prstGeom>
-        </p:spPr>
-      </p:pic>
-      <p:pic>
-        <p:nvPicPr>
-          <p:cNvPr id="6" name="Picture 5"/>
-          <p:cNvPicPr>
-            <a:picLocks noChangeAspect="1"/>
-          </p:cNvPicPr>
-          <p:nvPr/>
-        </p:nvPicPr>
-        <p:blipFill>
-          <a:blip r:embed="rId2"/>
-          <a:stretch>
-            <a:fillRect/>
-          </a:stretch>
-        </p:blipFill>
-        <p:spPr>
-          <a:xfrm>
-            <a:off x="730885" y="4026535"/>
-            <a:ext cx="10962640" cy="979805"/>
+            <a:off x="85725" y="2136140"/>
+            <a:ext cx="12106275" cy="1739265"/>
           </a:xfrm>
           <a:prstGeom prst="rect">
             <a:avLst/>
@@ -6791,10 +6968,8 @@
           <a:p>
             <a:pPr algn="ctr"/>
             <a:r>
-              <a:rPr lang="en-US">
-                <a:sym typeface="+mn-ea"/>
-              </a:rPr>
-              <a:t>Blackhole to the Rescue</a:t>
+              <a:rPr lang="en-US"/>
+              <a:t>Benchmark Modes </a:t>
             </a:r>
             <a:endParaRPr lang="en-US"/>
           </a:p>
@@ -6839,56 +7014,8 @@
         </p:blipFill>
         <p:spPr>
           <a:xfrm>
-            <a:off x="702310" y="1795145"/>
-            <a:ext cx="10330815" cy="986155"/>
-          </a:xfrm>
-          <a:prstGeom prst="rect">
-            <a:avLst/>
-          </a:prstGeom>
-        </p:spPr>
-      </p:pic>
-      <p:pic>
-        <p:nvPicPr>
-          <p:cNvPr id="6" name="Picture 5"/>
-          <p:cNvPicPr>
-            <a:picLocks noChangeAspect="1"/>
-          </p:cNvPicPr>
-          <p:nvPr/>
-        </p:nvPicPr>
-        <p:blipFill>
-          <a:blip r:embed="rId2"/>
-          <a:stretch>
-            <a:fillRect/>
-          </a:stretch>
-        </p:blipFill>
-        <p:spPr>
-          <a:xfrm>
-            <a:off x="702310" y="3087370"/>
-            <a:ext cx="10330815" cy="986155"/>
-          </a:xfrm>
-          <a:prstGeom prst="rect">
-            <a:avLst/>
-          </a:prstGeom>
-        </p:spPr>
-      </p:pic>
-      <p:pic>
-        <p:nvPicPr>
-          <p:cNvPr id="7" name="Picture 6"/>
-          <p:cNvPicPr>
-            <a:picLocks noChangeAspect="1"/>
-          </p:cNvPicPr>
-          <p:nvPr/>
-        </p:nvPicPr>
-        <p:blipFill>
-          <a:blip r:embed="rId3"/>
-          <a:stretch>
-            <a:fillRect/>
-          </a:stretch>
-        </p:blipFill>
-        <p:spPr>
-          <a:xfrm>
-            <a:off x="702310" y="4379595"/>
-            <a:ext cx="10331450" cy="935990"/>
+            <a:off x="838200" y="1691005"/>
+            <a:ext cx="10584180" cy="3790950"/>
           </a:xfrm>
           <a:prstGeom prst="rect">
             <a:avLst/>
@@ -6926,13 +7053,13 @@
         <p:spPr/>
         <p:txBody>
           <a:bodyPr>
-            <a:normAutofit/>
+            <a:normAutofit fontScale="90000"/>
           </a:bodyPr>
           <a:p>
             <a:pPr algn="ctr"/>
             <a:r>
               <a:rPr lang="en-US"/>
-              <a:t>@State annotation </a:t>
+              <a:t>Blackhole - benchmark without JVM interference</a:t>
             </a:r>
             <a:endParaRPr lang="en-US"/>
           </a:p>
@@ -6971,14 +7098,39 @@
         </p:nvPicPr>
         <p:blipFill>
           <a:blip r:embed="rId1"/>
+          <a:srcRect l="-5421" t="-2082" r="5421" b="21888"/>
           <a:stretch>
             <a:fillRect/>
           </a:stretch>
         </p:blipFill>
         <p:spPr>
           <a:xfrm>
-            <a:off x="0" y="2258060"/>
-            <a:ext cx="12191365" cy="2341245"/>
+            <a:off x="73025" y="1662430"/>
+            <a:ext cx="11620500" cy="1100455"/>
+          </a:xfrm>
+          <a:prstGeom prst="rect">
+            <a:avLst/>
+          </a:prstGeom>
+        </p:spPr>
+      </p:pic>
+      <p:pic>
+        <p:nvPicPr>
+          <p:cNvPr id="6" name="Picture 5"/>
+          <p:cNvPicPr>
+            <a:picLocks noChangeAspect="1"/>
+          </p:cNvPicPr>
+          <p:nvPr/>
+        </p:nvPicPr>
+        <p:blipFill>
+          <a:blip r:embed="rId2"/>
+          <a:stretch>
+            <a:fillRect/>
+          </a:stretch>
+        </p:blipFill>
+        <p:spPr>
+          <a:xfrm>
+            <a:off x="730885" y="4026535"/>
+            <a:ext cx="10962640" cy="979805"/>
           </a:xfrm>
           <a:prstGeom prst="rect">
             <a:avLst/>
@@ -7013,19 +7165,16 @@
             <p:ph type="title"/>
           </p:nvPr>
         </p:nvSpPr>
-        <p:spPr>
-          <a:xfrm>
-            <a:off x="838200" y="225425"/>
-            <a:ext cx="10515600" cy="1325563"/>
-          </a:xfrm>
-        </p:spPr>
+        <p:spPr/>
         <p:txBody>
           <a:bodyPr/>
           <a:p>
             <a:pPr algn="ctr"/>
             <a:r>
-              <a:rPr lang="en-US"/>
-              <a:t>Comparing two benchmark methods</a:t>
+              <a:rPr lang="en-US">
+                <a:sym typeface="+mn-ea"/>
+              </a:rPr>
+              <a:t>Blackhole to the Rescue</a:t>
             </a:r>
             <a:endParaRPr lang="en-US"/>
           </a:p>
@@ -7059,7 +7208,7 @@
             <a:picLocks noChangeAspect="1"/>
           </p:cNvPicPr>
           <p:nvPr>
-            <p:ph sz="half" idx="1"/>
+            <p:ph idx="1"/>
           </p:nvPr>
         </p:nvPicPr>
         <p:blipFill>
@@ -7070,8 +7219,8 @@
         </p:blipFill>
         <p:spPr>
           <a:xfrm>
-            <a:off x="1447800" y="1593215"/>
-            <a:ext cx="3819525" cy="1514475"/>
+            <a:off x="702310" y="1795145"/>
+            <a:ext cx="10330815" cy="986155"/>
           </a:xfrm>
           <a:prstGeom prst="rect">
             <a:avLst/>
@@ -7080,13 +7229,11 @@
       </p:pic>
       <p:pic>
         <p:nvPicPr>
-          <p:cNvPr id="6" name="Content Placeholder 5"/>
+          <p:cNvPr id="6" name="Picture 5"/>
           <p:cNvPicPr>
             <a:picLocks noChangeAspect="1"/>
           </p:cNvPicPr>
-          <p:nvPr>
-            <p:ph sz="half" idx="2"/>
-          </p:nvPr>
+          <p:nvPr/>
         </p:nvPicPr>
         <p:blipFill>
           <a:blip r:embed="rId2"/>
@@ -7096,8 +7243,8 @@
         </p:blipFill>
         <p:spPr>
           <a:xfrm>
-            <a:off x="6299835" y="1592580"/>
-            <a:ext cx="4495800" cy="1515110"/>
+            <a:off x="702310" y="3087370"/>
+            <a:ext cx="10330815" cy="986155"/>
           </a:xfrm>
           <a:prstGeom prst="rect">
             <a:avLst/>
@@ -7120,8 +7267,8 @@
         </p:blipFill>
         <p:spPr>
           <a:xfrm>
-            <a:off x="2862580" y="3244850"/>
-            <a:ext cx="6981825" cy="3476625"/>
+            <a:off x="702310" y="4379595"/>
+            <a:ext cx="10331450" cy="935990"/>
           </a:xfrm>
           <a:prstGeom prst="rect">
             <a:avLst/>
@@ -7145,143 +7292,222 @@
         <p:cNvGrpSpPr/>
         <p:nvPr/>
       </p:nvGrpSpPr>
-      <p:grpSpPr>
-        <a:xfrm>
-          <a:off x="0" y="0"/>
-          <a:ext cx="0" cy="0"/>
-          <a:chOff x="0" y="0"/>
-          <a:chExt cx="0" cy="0"/>
-        </a:xfrm>
-      </p:grpSpPr>
+      <p:grpSpPr/>
+      <p:sp>
+        <p:nvSpPr>
+          <p:cNvPr id="2" name="Title 1"/>
+          <p:cNvSpPr>
+            <a:spLocks noGrp="1"/>
+          </p:cNvSpPr>
+          <p:nvPr>
+            <p:ph type="title"/>
+          </p:nvPr>
+        </p:nvSpPr>
+        <p:spPr/>
+        <p:txBody>
+          <a:bodyPr>
+            <a:normAutofit/>
+          </a:bodyPr>
+          <a:p>
+            <a:pPr algn="ctr"/>
+            <a:r>
+              <a:rPr lang="en-US"/>
+              <a:t>@State annotation </a:t>
+            </a:r>
+            <a:endParaRPr lang="en-US"/>
+          </a:p>
+        </p:txBody>
+      </p:sp>
+      <p:sp>
+        <p:nvSpPr>
+          <p:cNvPr id="4" name="Slide Number Placeholder 3"/>
+          <p:cNvSpPr>
+            <a:spLocks noGrp="1"/>
+          </p:cNvSpPr>
+          <p:nvPr>
+            <p:ph type="sldNum" sz="quarter" idx="12"/>
+          </p:nvPr>
+        </p:nvSpPr>
+        <p:spPr/>
+        <p:txBody>
+          <a:bodyPr/>
+          <a:p>
+            <a:fld id="{9B618960-8005-486C-9A75-10CB2AAC16F9}" type="slidenum">
+              <a:rPr lang="en-US" smtClean="0"/>
+            </a:fld>
+            <a:endParaRPr lang="en-US"/>
+          </a:p>
+        </p:txBody>
+      </p:sp>
       <p:pic>
         <p:nvPicPr>
-          <p:cNvPr id="2" name="object 2"/>
-          <p:cNvPicPr/>
-          <p:nvPr/>
+          <p:cNvPr id="5" name="Content Placeholder 4"/>
+          <p:cNvPicPr>
+            <a:picLocks noChangeAspect="1"/>
+          </p:cNvPicPr>
+          <p:nvPr>
+            <p:ph idx="1"/>
+          </p:nvPr>
         </p:nvPicPr>
         <p:blipFill>
-          <a:blip r:embed="rId1" cstate="print"/>
+          <a:blip r:embed="rId1"/>
           <a:stretch>
             <a:fillRect/>
           </a:stretch>
         </p:blipFill>
         <p:spPr>
           <a:xfrm>
-            <a:off x="0" y="0"/>
-            <a:ext cx="4636008" cy="6858000"/>
+            <a:off x="0" y="2258060"/>
+            <a:ext cx="12191365" cy="2341245"/>
           </a:xfrm>
           <a:prstGeom prst="rect">
             <a:avLst/>
           </a:prstGeom>
         </p:spPr>
       </p:pic>
-      <p:sp>
-        <p:nvSpPr>
-          <p:cNvPr id="17" name="Slide Number Placeholder 16"/>
-          <p:cNvSpPr>
-            <a:spLocks noGrp="1"/>
-          </p:cNvSpPr>
-          <p:nvPr>
-            <p:ph type="sldNum" sz="quarter" idx="7"/>
+    </p:spTree>
+  </p:cSld>
+  <p:clrMapOvr>
+    <a:masterClrMapping/>
+  </p:clrMapOvr>
+</p:sld>
+</file>
+
+<file path=ppt/slides/slide29.xml><?xml version="1.0" encoding="utf-8"?>
+<p:sld xmlns:a="http://schemas.openxmlformats.org/drawingml/2006/main" xmlns:r="http://schemas.openxmlformats.org/officeDocument/2006/relationships" xmlns:p="http://schemas.openxmlformats.org/presentationml/2006/main">
+  <p:cSld>
+    <p:spTree>
+      <p:nvGrpSpPr>
+        <p:cNvPr id="1" name=""/>
+        <p:cNvGrpSpPr/>
+        <p:nvPr/>
+      </p:nvGrpSpPr>
+      <p:grpSpPr/>
+      <p:sp>
+        <p:nvSpPr>
+          <p:cNvPr id="2" name="Title 1"/>
+          <p:cNvSpPr>
+            <a:spLocks noGrp="1"/>
+          </p:cNvSpPr>
+          <p:nvPr>
+            <p:ph type="title"/>
+          </p:nvPr>
+        </p:nvSpPr>
+        <p:spPr>
+          <a:xfrm>
+            <a:off x="838200" y="225425"/>
+            <a:ext cx="10515600" cy="1325563"/>
+          </a:xfrm>
+        </p:spPr>
+        <p:txBody>
+          <a:bodyPr/>
+          <a:p>
+            <a:pPr algn="ctr"/>
+            <a:r>
+              <a:rPr lang="en-US"/>
+              <a:t>Comparing two benchmark methods</a:t>
+            </a:r>
+            <a:endParaRPr lang="en-US"/>
+          </a:p>
+        </p:txBody>
+      </p:sp>
+      <p:sp>
+        <p:nvSpPr>
+          <p:cNvPr id="4" name="Slide Number Placeholder 3"/>
+          <p:cNvSpPr>
+            <a:spLocks noGrp="1"/>
+          </p:cNvSpPr>
+          <p:nvPr>
+            <p:ph type="sldNum" sz="quarter" idx="12"/>
           </p:nvPr>
         </p:nvSpPr>
         <p:spPr/>
         <p:txBody>
           <a:bodyPr/>
           <a:p>
-            <a:fld id="{B6F15528-21DE-4FAA-801E-634DDDAF4B2B}" type="slidenum">
-              <a:rPr/>
+            <a:fld id="{9B618960-8005-486C-9A75-10CB2AAC16F9}" type="slidenum">
+              <a:rPr lang="en-US" smtClean="0"/>
             </a:fld>
-            <a:endParaRPr/>
-          </a:p>
-        </p:txBody>
-      </p:sp>
-      <p:sp>
-        <p:nvSpPr>
-          <p:cNvPr id="19" name="object 3"/>
-          <p:cNvSpPr txBox="1"/>
-          <p:nvPr/>
-        </p:nvSpPr>
+            <a:endParaRPr lang="en-US"/>
+          </a:p>
+        </p:txBody>
+      </p:sp>
+      <p:pic>
+        <p:nvPicPr>
+          <p:cNvPr id="5" name="Content Placeholder 4"/>
+          <p:cNvPicPr>
+            <a:picLocks noChangeAspect="1"/>
+          </p:cNvPicPr>
+          <p:nvPr>
+            <p:ph sz="half" idx="1"/>
+          </p:nvPr>
+        </p:nvPicPr>
+        <p:blipFill>
+          <a:blip r:embed="rId1"/>
+          <a:stretch>
+            <a:fillRect/>
+          </a:stretch>
+        </p:blipFill>
         <p:spPr>
           <a:xfrm>
-            <a:off x="4872990" y="1551940"/>
-            <a:ext cx="7188835" cy="2418080"/>
+            <a:off x="1447800" y="1593215"/>
+            <a:ext cx="3819525" cy="1514475"/>
           </a:xfrm>
           <a:prstGeom prst="rect">
             <a:avLst/>
           </a:prstGeom>
         </p:spPr>
-        <p:txBody>
-          <a:bodyPr vert="horz" wrap="square" lIns="0" tIns="12700" rIns="0" bIns="0" rtlCol="0">
-            <a:spAutoFit/>
-          </a:bodyPr>
-          <a:p>
-            <a:pPr marL="12700" marR="5080" algn="l">
-              <a:lnSpc>
-                <a:spcPct val="163000"/>
-              </a:lnSpc>
-              <a:buClrTx/>
-              <a:buSzTx/>
-              <a:buFontTx/>
-            </a:pPr>
-            <a:r>
-              <a:rPr sz="2400" dirty="0">
-                <a:solidFill>
-                  <a:srgbClr val="EF5A28"/>
-                </a:solidFill>
-                <a:latin typeface="Verdana" panose="020B0604030504040204"/>
-                <a:cs typeface="Verdana" panose="020B0604030504040204"/>
-                <a:sym typeface="+mn-ea"/>
-              </a:rPr>
-              <a:t>JMH is a Java harness for building, running, and analysing nano/micro/milli/macro benchmarks written in Java and other languages targeting the JVM.</a:t>
-            </a:r>
-            <a:endParaRPr sz="2400" dirty="0">
-              <a:solidFill>
-                <a:srgbClr val="EF5A28"/>
-              </a:solidFill>
-              <a:latin typeface="Verdana" panose="020B0604030504040204"/>
-              <a:cs typeface="Verdana" panose="020B0604030504040204"/>
-            </a:endParaRPr>
-          </a:p>
-        </p:txBody>
-      </p:sp>
-      <p:sp>
-        <p:nvSpPr>
-          <p:cNvPr id="3" name="Text Box 2"/>
-          <p:cNvSpPr txBox="1"/>
-          <p:nvPr/>
-        </p:nvSpPr>
+      </p:pic>
+      <p:pic>
+        <p:nvPicPr>
+          <p:cNvPr id="6" name="Content Placeholder 5"/>
+          <p:cNvPicPr>
+            <a:picLocks noChangeAspect="1"/>
+          </p:cNvPicPr>
+          <p:nvPr>
+            <p:ph sz="half" idx="2"/>
+          </p:nvPr>
+        </p:nvPicPr>
+        <p:blipFill>
+          <a:blip r:embed="rId2"/>
+          <a:stretch>
+            <a:fillRect/>
+          </a:stretch>
+        </p:blipFill>
         <p:spPr>
           <a:xfrm>
-            <a:off x="1112520" y="1760220"/>
-            <a:ext cx="2792095" cy="768350"/>
+            <a:off x="6299835" y="1592580"/>
+            <a:ext cx="4495800" cy="1515110"/>
           </a:xfrm>
           <a:prstGeom prst="rect">
             <a:avLst/>
           </a:prstGeom>
-          <a:noFill/>
         </p:spPr>
-        <p:txBody>
-          <a:bodyPr wrap="square" rtlCol="0">
-            <a:spAutoFit/>
-          </a:bodyPr>
-          <a:p>
-            <a:r>
-              <a:rPr lang="en-US" sz="4400">
-                <a:solidFill>
-                  <a:schemeClr val="bg1"/>
-                </a:solidFill>
-              </a:rPr>
-              <a:t>Summary</a:t>
-            </a:r>
-            <a:endParaRPr lang="en-US" sz="4400">
-              <a:solidFill>
-                <a:schemeClr val="bg1"/>
-              </a:solidFill>
-            </a:endParaRPr>
-          </a:p>
-        </p:txBody>
-      </p:sp>
+      </p:pic>
+      <p:pic>
+        <p:nvPicPr>
+          <p:cNvPr id="7" name="Picture 6"/>
+          <p:cNvPicPr>
+            <a:picLocks noChangeAspect="1"/>
+          </p:cNvPicPr>
+          <p:nvPr/>
+        </p:nvPicPr>
+        <p:blipFill>
+          <a:blip r:embed="rId3"/>
+          <a:stretch>
+            <a:fillRect/>
+          </a:stretch>
+        </p:blipFill>
+        <p:spPr>
+          <a:xfrm>
+            <a:off x="2862580" y="3244850"/>
+            <a:ext cx="6981825" cy="3476625"/>
+          </a:xfrm>
+          <a:prstGeom prst="rect">
+            <a:avLst/>
+          </a:prstGeom>
+        </p:spPr>
+      </p:pic>
     </p:spTree>
   </p:cSld>
   <p:clrMapOvr>
@@ -7712,6 +7938,160 @@
               </a:solidFill>
               <a:latin typeface="Verdana" panose="020B0604030504040204"/>
               <a:cs typeface="Verdana" panose="020B0604030504040204"/>
+            </a:endParaRPr>
+          </a:p>
+        </p:txBody>
+      </p:sp>
+    </p:spTree>
+  </p:cSld>
+  <p:clrMapOvr>
+    <a:masterClrMapping/>
+  </p:clrMapOvr>
+</p:sld>
+</file>
+
+<file path=ppt/slides/slide30.xml><?xml version="1.0" encoding="utf-8"?>
+<p:sld xmlns:a="http://schemas.openxmlformats.org/drawingml/2006/main" xmlns:r="http://schemas.openxmlformats.org/officeDocument/2006/relationships" xmlns:p="http://schemas.openxmlformats.org/presentationml/2006/main">
+  <p:cSld>
+    <p:spTree>
+      <p:nvGrpSpPr>
+        <p:cNvPr id="1" name=""/>
+        <p:cNvGrpSpPr/>
+        <p:nvPr/>
+      </p:nvGrpSpPr>
+      <p:grpSpPr>
+        <a:xfrm>
+          <a:off x="0" y="0"/>
+          <a:ext cx="0" cy="0"/>
+          <a:chOff x="0" y="0"/>
+          <a:chExt cx="0" cy="0"/>
+        </a:xfrm>
+      </p:grpSpPr>
+      <p:pic>
+        <p:nvPicPr>
+          <p:cNvPr id="2" name="object 2"/>
+          <p:cNvPicPr/>
+          <p:nvPr/>
+        </p:nvPicPr>
+        <p:blipFill>
+          <a:blip r:embed="rId1" cstate="print"/>
+          <a:stretch>
+            <a:fillRect/>
+          </a:stretch>
+        </p:blipFill>
+        <p:spPr>
+          <a:xfrm>
+            <a:off x="0" y="0"/>
+            <a:ext cx="4636008" cy="6858000"/>
+          </a:xfrm>
+          <a:prstGeom prst="rect">
+            <a:avLst/>
+          </a:prstGeom>
+        </p:spPr>
+      </p:pic>
+      <p:sp>
+        <p:nvSpPr>
+          <p:cNvPr id="17" name="Slide Number Placeholder 16"/>
+          <p:cNvSpPr>
+            <a:spLocks noGrp="1"/>
+          </p:cNvSpPr>
+          <p:nvPr>
+            <p:ph type="sldNum" sz="quarter" idx="7"/>
+          </p:nvPr>
+        </p:nvSpPr>
+        <p:spPr/>
+        <p:txBody>
+          <a:bodyPr/>
+          <a:p>
+            <a:fld id="{B6F15528-21DE-4FAA-801E-634DDDAF4B2B}" type="slidenum">
+              <a:rPr/>
+            </a:fld>
+            <a:endParaRPr/>
+          </a:p>
+        </p:txBody>
+      </p:sp>
+      <p:sp>
+        <p:nvSpPr>
+          <p:cNvPr id="19" name="object 3"/>
+          <p:cNvSpPr txBox="1"/>
+          <p:nvPr/>
+        </p:nvSpPr>
+        <p:spPr>
+          <a:xfrm>
+            <a:off x="4872990" y="1551940"/>
+            <a:ext cx="7188835" cy="2418080"/>
+          </a:xfrm>
+          <a:prstGeom prst="rect">
+            <a:avLst/>
+          </a:prstGeom>
+        </p:spPr>
+        <p:txBody>
+          <a:bodyPr vert="horz" wrap="square" lIns="0" tIns="12700" rIns="0" bIns="0" rtlCol="0">
+            <a:spAutoFit/>
+          </a:bodyPr>
+          <a:p>
+            <a:pPr marL="12700" marR="5080" algn="l">
+              <a:lnSpc>
+                <a:spcPct val="163000"/>
+              </a:lnSpc>
+              <a:buClrTx/>
+              <a:buSzTx/>
+              <a:buFontTx/>
+            </a:pPr>
+            <a:r>
+              <a:rPr sz="2400" dirty="0">
+                <a:solidFill>
+                  <a:srgbClr val="EF5A28"/>
+                </a:solidFill>
+                <a:latin typeface="Verdana" panose="020B0604030504040204"/>
+                <a:cs typeface="Verdana" panose="020B0604030504040204"/>
+                <a:sym typeface="+mn-ea"/>
+              </a:rPr>
+              <a:t>JMH is a Java harness for building, running, and analysing nano/micro/milli/macro benchmarks written in Java and other languages targeting the JVM.</a:t>
+            </a:r>
+            <a:endParaRPr sz="2400" dirty="0">
+              <a:solidFill>
+                <a:srgbClr val="EF5A28"/>
+              </a:solidFill>
+              <a:latin typeface="Verdana" panose="020B0604030504040204"/>
+              <a:cs typeface="Verdana" panose="020B0604030504040204"/>
+            </a:endParaRPr>
+          </a:p>
+        </p:txBody>
+      </p:sp>
+      <p:sp>
+        <p:nvSpPr>
+          <p:cNvPr id="3" name="Text Box 2"/>
+          <p:cNvSpPr txBox="1"/>
+          <p:nvPr/>
+        </p:nvSpPr>
+        <p:spPr>
+          <a:xfrm>
+            <a:off x="1112520" y="1760220"/>
+            <a:ext cx="2792095" cy="768350"/>
+          </a:xfrm>
+          <a:prstGeom prst="rect">
+            <a:avLst/>
+          </a:prstGeom>
+          <a:noFill/>
+        </p:spPr>
+        <p:txBody>
+          <a:bodyPr wrap="square" rtlCol="0">
+            <a:spAutoFit/>
+          </a:bodyPr>
+          <a:p>
+            <a:r>
+              <a:rPr lang="en-US" sz="4400">
+                <a:solidFill>
+                  <a:schemeClr val="bg1"/>
+                </a:solidFill>
+              </a:rPr>
+              <a:t>Summary</a:t>
+            </a:r>
+            <a:endParaRPr lang="en-US" sz="4400">
+              <a:solidFill>
+                <a:schemeClr val="bg1"/>
+              </a:solidFill>
             </a:endParaRPr>
           </a:p>
         </p:txBody>

</xml_diff>